<commit_message>
updated source powerpoint for images
</commit_message>
<xml_diff>
--- a/assets/images/relationships/source-tables.pptx
+++ b/assets/images/relationships/source-tables.pptx
@@ -6,6 +6,8 @@
   </p:sldMasterIdLst>
   <p:sldIdLst>
     <p:sldId id="256" r:id="rId2"/>
+    <p:sldId id="257" r:id="rId3"/>
+    <p:sldId id="258" r:id="rId4"/>
   </p:sldIdLst>
   <p:sldSz cx="12192000" cy="6858000"/>
   <p:notesSz cx="6858000" cy="9144000"/>
@@ -4051,6 +4053,1621 @@
 </p:sld>
 </file>
 
+<file path=ppt/slides/slide2.xml><?xml version="1.0" encoding="utf-8"?>
+<p:sld xmlns:a="http://schemas.openxmlformats.org/drawingml/2006/main" xmlns:r="http://schemas.openxmlformats.org/officeDocument/2006/relationships" xmlns:p="http://schemas.openxmlformats.org/presentationml/2006/main">
+  <p:cSld>
+    <p:spTree>
+      <p:nvGrpSpPr>
+        <p:cNvPr id="1" name=""/>
+        <p:cNvGrpSpPr/>
+        <p:nvPr/>
+      </p:nvGrpSpPr>
+      <p:grpSpPr>
+        <a:xfrm>
+          <a:off x="0" y="0"/>
+          <a:ext cx="0" cy="0"/>
+          <a:chOff x="0" y="0"/>
+          <a:chExt cx="0" cy="0"/>
+        </a:xfrm>
+      </p:grpSpPr>
+      <p:graphicFrame>
+        <p:nvGraphicFramePr>
+          <p:cNvPr id="10" name="Table 9">
+            <a:extLst>
+              <a:ext uri="{FF2B5EF4-FFF2-40B4-BE49-F238E27FC236}">
+                <a16:creationId xmlns:a16="http://schemas.microsoft.com/office/drawing/2014/main" id="{799EA228-3090-514D-B56C-1EA6BBBFF0DC}"/>
+              </a:ext>
+            </a:extLst>
+          </p:cNvPr>
+          <p:cNvGraphicFramePr>
+            <a:graphicFrameLocks noGrp="1"/>
+          </p:cNvGraphicFramePr>
+          <p:nvPr/>
+        </p:nvGraphicFramePr>
+        <p:xfrm>
+          <a:off x="1579418" y="1228723"/>
+          <a:ext cx="2364993" cy="4400552"/>
+        </p:xfrm>
+        <a:graphic>
+          <a:graphicData uri="http://schemas.openxmlformats.org/drawingml/2006/table">
+            <a:tbl>
+              <a:tblPr firstRow="1" bandRow="1">
+                <a:tableStyleId>{5C22544A-7EE6-4342-B048-85BDC9FD1C3A}</a:tableStyleId>
+              </a:tblPr>
+              <a:tblGrid>
+                <a:gridCol w="1116688">
+                  <a:extLst>
+                    <a:ext uri="{9D8B030D-6E8A-4147-A177-3AD203B41FA5}">
+                      <a16:colId xmlns:a16="http://schemas.microsoft.com/office/drawing/2014/main" val="1814196662"/>
+                    </a:ext>
+                  </a:extLst>
+                </a:gridCol>
+                <a:gridCol w="1248305">
+                  <a:extLst>
+                    <a:ext uri="{9D8B030D-6E8A-4147-A177-3AD203B41FA5}">
+                      <a16:colId xmlns:a16="http://schemas.microsoft.com/office/drawing/2014/main" val="254236435"/>
+                    </a:ext>
+                  </a:extLst>
+                </a:gridCol>
+              </a:tblGrid>
+              <a:tr h="550069">
+                <a:tc>
+                  <a:txBody>
+                    <a:bodyPr/>
+                    <a:lstStyle/>
+                    <a:p>
+                      <a:r>
+                        <a:rPr lang="en-US" dirty="0"/>
+                        <a:t>id</a:t>
+                      </a:r>
+                    </a:p>
+                  </a:txBody>
+                  <a:tcPr/>
+                </a:tc>
+                <a:tc>
+                  <a:txBody>
+                    <a:bodyPr/>
+                    <a:lstStyle/>
+                    <a:p>
+                      <a:r>
+                        <a:rPr lang="en-US" dirty="0"/>
+                        <a:t>name</a:t>
+                      </a:r>
+                    </a:p>
+                  </a:txBody>
+                  <a:tcPr/>
+                </a:tc>
+                <a:extLst>
+                  <a:ext uri="{0D108BD9-81ED-4DB2-BD59-A6C34878D82A}">
+                    <a16:rowId xmlns:a16="http://schemas.microsoft.com/office/drawing/2014/main" val="3375024876"/>
+                  </a:ext>
+                </a:extLst>
+              </a:tr>
+              <a:tr h="550069">
+                <a:tc>
+                  <a:txBody>
+                    <a:bodyPr/>
+                    <a:lstStyle/>
+                    <a:p>
+                      <a:r>
+                        <a:rPr lang="en-US" dirty="0"/>
+                        <a:t>1</a:t>
+                      </a:r>
+                    </a:p>
+                  </a:txBody>
+                  <a:tcPr/>
+                </a:tc>
+                <a:tc>
+                  <a:txBody>
+                    <a:bodyPr/>
+                    <a:lstStyle/>
+                    <a:p>
+                      <a:r>
+                        <a:rPr lang="en-US" dirty="0"/>
+                        <a:t>Mary</a:t>
+                      </a:r>
+                    </a:p>
+                  </a:txBody>
+                  <a:tcPr/>
+                </a:tc>
+                <a:extLst>
+                  <a:ext uri="{0D108BD9-81ED-4DB2-BD59-A6C34878D82A}">
+                    <a16:rowId xmlns:a16="http://schemas.microsoft.com/office/drawing/2014/main" val="1096633820"/>
+                  </a:ext>
+                </a:extLst>
+              </a:tr>
+              <a:tr h="550069">
+                <a:tc>
+                  <a:txBody>
+                    <a:bodyPr/>
+                    <a:lstStyle/>
+                    <a:p>
+                      <a:r>
+                        <a:rPr lang="en-US" dirty="0"/>
+                        <a:t>2</a:t>
+                      </a:r>
+                    </a:p>
+                  </a:txBody>
+                  <a:tcPr/>
+                </a:tc>
+                <a:tc>
+                  <a:txBody>
+                    <a:bodyPr/>
+                    <a:lstStyle/>
+                    <a:p>
+                      <a:r>
+                        <a:rPr lang="en-US" dirty="0"/>
+                        <a:t>Jane</a:t>
+                      </a:r>
+                    </a:p>
+                  </a:txBody>
+                  <a:tcPr/>
+                </a:tc>
+                <a:extLst>
+                  <a:ext uri="{0D108BD9-81ED-4DB2-BD59-A6C34878D82A}">
+                    <a16:rowId xmlns:a16="http://schemas.microsoft.com/office/drawing/2014/main" val="2502785895"/>
+                  </a:ext>
+                </a:extLst>
+              </a:tr>
+              <a:tr h="550069">
+                <a:tc>
+                  <a:txBody>
+                    <a:bodyPr/>
+                    <a:lstStyle/>
+                    <a:p>
+                      <a:r>
+                        <a:rPr lang="en-US" dirty="0"/>
+                        <a:t>3</a:t>
+                      </a:r>
+                    </a:p>
+                  </a:txBody>
+                  <a:tcPr/>
+                </a:tc>
+                <a:tc>
+                  <a:txBody>
+                    <a:bodyPr/>
+                    <a:lstStyle/>
+                    <a:p>
+                      <a:r>
+                        <a:rPr lang="en-US" dirty="0"/>
+                        <a:t>Mark</a:t>
+                      </a:r>
+                    </a:p>
+                  </a:txBody>
+                  <a:tcPr/>
+                </a:tc>
+                <a:extLst>
+                  <a:ext uri="{0D108BD9-81ED-4DB2-BD59-A6C34878D82A}">
+                    <a16:rowId xmlns:a16="http://schemas.microsoft.com/office/drawing/2014/main" val="3585364205"/>
+                  </a:ext>
+                </a:extLst>
+              </a:tr>
+              <a:tr h="550069">
+                <a:tc>
+                  <a:txBody>
+                    <a:bodyPr/>
+                    <a:lstStyle/>
+                    <a:p>
+                      <a:r>
+                        <a:rPr lang="en-US" dirty="0"/>
+                        <a:t>4</a:t>
+                      </a:r>
+                    </a:p>
+                  </a:txBody>
+                  <a:tcPr/>
+                </a:tc>
+                <a:tc>
+                  <a:txBody>
+                    <a:bodyPr/>
+                    <a:lstStyle/>
+                    <a:p>
+                      <a:r>
+                        <a:rPr lang="en-US" dirty="0"/>
+                        <a:t>Luke</a:t>
+                      </a:r>
+                    </a:p>
+                  </a:txBody>
+                  <a:tcPr/>
+                </a:tc>
+                <a:extLst>
+                  <a:ext uri="{0D108BD9-81ED-4DB2-BD59-A6C34878D82A}">
+                    <a16:rowId xmlns:a16="http://schemas.microsoft.com/office/drawing/2014/main" val="1151712161"/>
+                  </a:ext>
+                </a:extLst>
+              </a:tr>
+              <a:tr h="550069">
+                <a:tc>
+                  <a:txBody>
+                    <a:bodyPr/>
+                    <a:lstStyle/>
+                    <a:p>
+                      <a:r>
+                        <a:rPr lang="en-US" dirty="0"/>
+                        <a:t>5</a:t>
+                      </a:r>
+                    </a:p>
+                  </a:txBody>
+                  <a:tcPr/>
+                </a:tc>
+                <a:tc>
+                  <a:txBody>
+                    <a:bodyPr/>
+                    <a:lstStyle/>
+                    <a:p>
+                      <a:r>
+                        <a:rPr lang="en-US" dirty="0"/>
+                        <a:t>Joan</a:t>
+                      </a:r>
+                    </a:p>
+                  </a:txBody>
+                  <a:tcPr/>
+                </a:tc>
+                <a:extLst>
+                  <a:ext uri="{0D108BD9-81ED-4DB2-BD59-A6C34878D82A}">
+                    <a16:rowId xmlns:a16="http://schemas.microsoft.com/office/drawing/2014/main" val="1895924153"/>
+                  </a:ext>
+                </a:extLst>
+              </a:tr>
+              <a:tr h="550069">
+                <a:tc>
+                  <a:txBody>
+                    <a:bodyPr/>
+                    <a:lstStyle/>
+                    <a:p>
+                      <a:r>
+                        <a:rPr lang="en-US" dirty="0"/>
+                        <a:t>6</a:t>
+                      </a:r>
+                    </a:p>
+                  </a:txBody>
+                  <a:tcPr/>
+                </a:tc>
+                <a:tc>
+                  <a:txBody>
+                    <a:bodyPr/>
+                    <a:lstStyle/>
+                    <a:p>
+                      <a:r>
+                        <a:rPr lang="en-US" dirty="0"/>
+                        <a:t>John</a:t>
+                      </a:r>
+                    </a:p>
+                  </a:txBody>
+                  <a:tcPr/>
+                </a:tc>
+                <a:extLst>
+                  <a:ext uri="{0D108BD9-81ED-4DB2-BD59-A6C34878D82A}">
+                    <a16:rowId xmlns:a16="http://schemas.microsoft.com/office/drawing/2014/main" val="2073015313"/>
+                  </a:ext>
+                </a:extLst>
+              </a:tr>
+              <a:tr h="550069">
+                <a:tc>
+                  <a:txBody>
+                    <a:bodyPr/>
+                    <a:lstStyle/>
+                    <a:p>
+                      <a:r>
+                        <a:rPr lang="en-US" dirty="0"/>
+                        <a:t>7</a:t>
+                      </a:r>
+                    </a:p>
+                  </a:txBody>
+                  <a:tcPr/>
+                </a:tc>
+                <a:tc>
+                  <a:txBody>
+                    <a:bodyPr/>
+                    <a:lstStyle/>
+                    <a:p>
+                      <a:r>
+                        <a:rPr lang="en-US" dirty="0"/>
+                        <a:t>Sam</a:t>
+                      </a:r>
+                    </a:p>
+                  </a:txBody>
+                  <a:tcPr/>
+                </a:tc>
+                <a:extLst>
+                  <a:ext uri="{0D108BD9-81ED-4DB2-BD59-A6C34878D82A}">
+                    <a16:rowId xmlns:a16="http://schemas.microsoft.com/office/drawing/2014/main" val="2290738421"/>
+                  </a:ext>
+                </a:extLst>
+              </a:tr>
+            </a:tbl>
+          </a:graphicData>
+        </a:graphic>
+      </p:graphicFrame>
+      <p:graphicFrame>
+        <p:nvGraphicFramePr>
+          <p:cNvPr id="11" name="Table 10">
+            <a:extLst>
+              <a:ext uri="{FF2B5EF4-FFF2-40B4-BE49-F238E27FC236}">
+                <a16:creationId xmlns:a16="http://schemas.microsoft.com/office/drawing/2014/main" id="{544C7A9B-CB2A-3743-AFD2-7B6D9354F9D4}"/>
+              </a:ext>
+            </a:extLst>
+          </p:cNvPr>
+          <p:cNvGraphicFramePr>
+            <a:graphicFrameLocks noGrp="1"/>
+          </p:cNvGraphicFramePr>
+          <p:nvPr>
+            <p:extLst>
+              <p:ext uri="{D42A27DB-BD31-4B8C-83A1-F6EECF244321}">
+                <p14:modId xmlns:p14="http://schemas.microsoft.com/office/powerpoint/2010/main" val="901415303"/>
+              </p:ext>
+            </p:extLst>
+          </p:nvPr>
+        </p:nvGraphicFramePr>
+        <p:xfrm>
+          <a:off x="5800725" y="1228723"/>
+          <a:ext cx="4594874" cy="4950621"/>
+        </p:xfrm>
+        <a:graphic>
+          <a:graphicData uri="http://schemas.openxmlformats.org/drawingml/2006/table">
+            <a:tbl>
+              <a:tblPr firstRow="1" bandRow="1">
+                <a:tableStyleId>{5C22544A-7EE6-4342-B048-85BDC9FD1C3A}</a:tableStyleId>
+              </a:tblPr>
+              <a:tblGrid>
+                <a:gridCol w="695991">
+                  <a:extLst>
+                    <a:ext uri="{9D8B030D-6E8A-4147-A177-3AD203B41FA5}">
+                      <a16:colId xmlns:a16="http://schemas.microsoft.com/office/drawing/2014/main" val="1814196662"/>
+                    </a:ext>
+                  </a:extLst>
+                </a:gridCol>
+                <a:gridCol w="2429874">
+                  <a:extLst>
+                    <a:ext uri="{9D8B030D-6E8A-4147-A177-3AD203B41FA5}">
+                      <a16:colId xmlns:a16="http://schemas.microsoft.com/office/drawing/2014/main" val="254236435"/>
+                    </a:ext>
+                  </a:extLst>
+                </a:gridCol>
+                <a:gridCol w="1469009">
+                  <a:extLst>
+                    <a:ext uri="{9D8B030D-6E8A-4147-A177-3AD203B41FA5}">
+                      <a16:colId xmlns:a16="http://schemas.microsoft.com/office/drawing/2014/main" val="144704008"/>
+                    </a:ext>
+                  </a:extLst>
+                </a:gridCol>
+              </a:tblGrid>
+              <a:tr h="550069">
+                <a:tc>
+                  <a:txBody>
+                    <a:bodyPr/>
+                    <a:lstStyle/>
+                    <a:p>
+                      <a:r>
+                        <a:rPr lang="en-US" dirty="0"/>
+                        <a:t>id</a:t>
+                      </a:r>
+                    </a:p>
+                  </a:txBody>
+                  <a:tcPr/>
+                </a:tc>
+                <a:tc>
+                  <a:txBody>
+                    <a:bodyPr/>
+                    <a:lstStyle/>
+                    <a:p>
+                      <a:r>
+                        <a:rPr lang="en-US" dirty="0" err="1"/>
+                        <a:t>plot_name</a:t>
+                      </a:r>
+                      <a:endParaRPr lang="en-US" dirty="0"/>
+                    </a:p>
+                  </a:txBody>
+                  <a:tcPr/>
+                </a:tc>
+                <a:tc>
+                  <a:txBody>
+                    <a:bodyPr/>
+                    <a:lstStyle/>
+                    <a:p>
+                      <a:r>
+                        <a:rPr lang="en-US" dirty="0"/>
+                        <a:t>farmer_id</a:t>
+                      </a:r>
+                    </a:p>
+                  </a:txBody>
+                  <a:tcPr/>
+                </a:tc>
+                <a:extLst>
+                  <a:ext uri="{0D108BD9-81ED-4DB2-BD59-A6C34878D82A}">
+                    <a16:rowId xmlns:a16="http://schemas.microsoft.com/office/drawing/2014/main" val="3375024876"/>
+                  </a:ext>
+                </a:extLst>
+              </a:tr>
+              <a:tr h="550069">
+                <a:tc>
+                  <a:txBody>
+                    <a:bodyPr/>
+                    <a:lstStyle/>
+                    <a:p>
+                      <a:r>
+                        <a:rPr lang="en-US" dirty="0"/>
+                        <a:t>1</a:t>
+                      </a:r>
+                    </a:p>
+                  </a:txBody>
+                  <a:tcPr/>
+                </a:tc>
+                <a:tc>
+                  <a:txBody>
+                    <a:bodyPr/>
+                    <a:lstStyle/>
+                    <a:p>
+                      <a:r>
+                        <a:rPr lang="en-US" dirty="0"/>
+                        <a:t>North-field</a:t>
+                      </a:r>
+                    </a:p>
+                  </a:txBody>
+                  <a:tcPr/>
+                </a:tc>
+                <a:tc>
+                  <a:txBody>
+                    <a:bodyPr/>
+                    <a:lstStyle/>
+                    <a:p>
+                      <a:r>
+                        <a:rPr lang="en-US" dirty="0"/>
+                        <a:t>1</a:t>
+                      </a:r>
+                    </a:p>
+                  </a:txBody>
+                  <a:tcPr/>
+                </a:tc>
+                <a:extLst>
+                  <a:ext uri="{0D108BD9-81ED-4DB2-BD59-A6C34878D82A}">
+                    <a16:rowId xmlns:a16="http://schemas.microsoft.com/office/drawing/2014/main" val="1096633820"/>
+                  </a:ext>
+                </a:extLst>
+              </a:tr>
+              <a:tr h="550069">
+                <a:tc>
+                  <a:txBody>
+                    <a:bodyPr/>
+                    <a:lstStyle/>
+                    <a:p>
+                      <a:r>
+                        <a:rPr lang="en-US" dirty="0"/>
+                        <a:t>2</a:t>
+                      </a:r>
+                    </a:p>
+                  </a:txBody>
+                  <a:tcPr/>
+                </a:tc>
+                <a:tc>
+                  <a:txBody>
+                    <a:bodyPr/>
+                    <a:lstStyle/>
+                    <a:p>
+                      <a:r>
+                        <a:rPr lang="en-US" dirty="0"/>
+                        <a:t>South-field</a:t>
+                      </a:r>
+                    </a:p>
+                  </a:txBody>
+                  <a:tcPr/>
+                </a:tc>
+                <a:tc>
+                  <a:txBody>
+                    <a:bodyPr/>
+                    <a:lstStyle/>
+                    <a:p>
+                      <a:r>
+                        <a:rPr lang="en-US" dirty="0"/>
+                        <a:t>1</a:t>
+                      </a:r>
+                    </a:p>
+                  </a:txBody>
+                  <a:tcPr/>
+                </a:tc>
+                <a:extLst>
+                  <a:ext uri="{0D108BD9-81ED-4DB2-BD59-A6C34878D82A}">
+                    <a16:rowId xmlns:a16="http://schemas.microsoft.com/office/drawing/2014/main" val="2502785895"/>
+                  </a:ext>
+                </a:extLst>
+              </a:tr>
+              <a:tr h="550069">
+                <a:tc>
+                  <a:txBody>
+                    <a:bodyPr/>
+                    <a:lstStyle/>
+                    <a:p>
+                      <a:r>
+                        <a:rPr lang="en-US" dirty="0"/>
+                        <a:t>3</a:t>
+                      </a:r>
+                    </a:p>
+                  </a:txBody>
+                  <a:tcPr/>
+                </a:tc>
+                <a:tc>
+                  <a:txBody>
+                    <a:bodyPr/>
+                    <a:lstStyle/>
+                    <a:p>
+                      <a:r>
+                        <a:rPr lang="en-US" dirty="0"/>
+                        <a:t>Behind farmhouse</a:t>
+                      </a:r>
+                    </a:p>
+                  </a:txBody>
+                  <a:tcPr/>
+                </a:tc>
+                <a:tc>
+                  <a:txBody>
+                    <a:bodyPr/>
+                    <a:lstStyle/>
+                    <a:p>
+                      <a:r>
+                        <a:rPr lang="en-US" dirty="0"/>
+                        <a:t>2</a:t>
+                      </a:r>
+                    </a:p>
+                  </a:txBody>
+                  <a:tcPr/>
+                </a:tc>
+                <a:extLst>
+                  <a:ext uri="{0D108BD9-81ED-4DB2-BD59-A6C34878D82A}">
+                    <a16:rowId xmlns:a16="http://schemas.microsoft.com/office/drawing/2014/main" val="3585364205"/>
+                  </a:ext>
+                </a:extLst>
+              </a:tr>
+              <a:tr h="550069">
+                <a:tc>
+                  <a:txBody>
+                    <a:bodyPr/>
+                    <a:lstStyle/>
+                    <a:p>
+                      <a:r>
+                        <a:rPr lang="en-US" dirty="0"/>
+                        <a:t>4</a:t>
+                      </a:r>
+                    </a:p>
+                  </a:txBody>
+                  <a:tcPr/>
+                </a:tc>
+                <a:tc>
+                  <a:txBody>
+                    <a:bodyPr/>
+                    <a:lstStyle/>
+                    <a:p>
+                      <a:r>
+                        <a:rPr lang="en-US" dirty="0"/>
+                        <a:t>Main plot</a:t>
+                      </a:r>
+                    </a:p>
+                  </a:txBody>
+                  <a:tcPr/>
+                </a:tc>
+                <a:tc>
+                  <a:txBody>
+                    <a:bodyPr/>
+                    <a:lstStyle/>
+                    <a:p>
+                      <a:r>
+                        <a:rPr lang="en-US" dirty="0"/>
+                        <a:t>3</a:t>
+                      </a:r>
+                    </a:p>
+                  </a:txBody>
+                  <a:tcPr/>
+                </a:tc>
+                <a:extLst>
+                  <a:ext uri="{0D108BD9-81ED-4DB2-BD59-A6C34878D82A}">
+                    <a16:rowId xmlns:a16="http://schemas.microsoft.com/office/drawing/2014/main" val="1151712161"/>
+                  </a:ext>
+                </a:extLst>
+              </a:tr>
+              <a:tr h="550069">
+                <a:tc>
+                  <a:txBody>
+                    <a:bodyPr/>
+                    <a:lstStyle/>
+                    <a:p>
+                      <a:r>
+                        <a:rPr lang="en-US" dirty="0"/>
+                        <a:t>5</a:t>
+                      </a:r>
+                    </a:p>
+                  </a:txBody>
+                  <a:tcPr/>
+                </a:tc>
+                <a:tc>
+                  <a:txBody>
+                    <a:bodyPr/>
+                    <a:lstStyle/>
+                    <a:p>
+                      <a:r>
+                        <a:rPr lang="en-US" dirty="0"/>
+                        <a:t>Second plot</a:t>
+                      </a:r>
+                    </a:p>
+                  </a:txBody>
+                  <a:tcPr/>
+                </a:tc>
+                <a:tc>
+                  <a:txBody>
+                    <a:bodyPr/>
+                    <a:lstStyle/>
+                    <a:p>
+                      <a:r>
+                        <a:rPr lang="en-US" dirty="0"/>
+                        <a:t>3</a:t>
+                      </a:r>
+                    </a:p>
+                  </a:txBody>
+                  <a:tcPr/>
+                </a:tc>
+                <a:extLst>
+                  <a:ext uri="{0D108BD9-81ED-4DB2-BD59-A6C34878D82A}">
+                    <a16:rowId xmlns:a16="http://schemas.microsoft.com/office/drawing/2014/main" val="1895924153"/>
+                  </a:ext>
+                </a:extLst>
+              </a:tr>
+              <a:tr h="550069">
+                <a:tc>
+                  <a:txBody>
+                    <a:bodyPr/>
+                    <a:lstStyle/>
+                    <a:p>
+                      <a:r>
+                        <a:rPr lang="en-US" dirty="0"/>
+                        <a:t>6</a:t>
+                      </a:r>
+                    </a:p>
+                  </a:txBody>
+                  <a:tcPr/>
+                </a:tc>
+                <a:tc>
+                  <a:txBody>
+                    <a:bodyPr/>
+                    <a:lstStyle/>
+                    <a:p>
+                      <a:r>
+                        <a:rPr lang="en-US" dirty="0"/>
+                        <a:t>Main plot</a:t>
+                      </a:r>
+                    </a:p>
+                  </a:txBody>
+                  <a:tcPr/>
+                </a:tc>
+                <a:tc>
+                  <a:txBody>
+                    <a:bodyPr/>
+                    <a:lstStyle/>
+                    <a:p>
+                      <a:r>
+                        <a:rPr lang="en-US" dirty="0"/>
+                        <a:t>4</a:t>
+                      </a:r>
+                    </a:p>
+                  </a:txBody>
+                  <a:tcPr/>
+                </a:tc>
+                <a:extLst>
+                  <a:ext uri="{0D108BD9-81ED-4DB2-BD59-A6C34878D82A}">
+                    <a16:rowId xmlns:a16="http://schemas.microsoft.com/office/drawing/2014/main" val="4013387143"/>
+                  </a:ext>
+                </a:extLst>
+              </a:tr>
+              <a:tr h="550069">
+                <a:tc>
+                  <a:txBody>
+                    <a:bodyPr/>
+                    <a:lstStyle/>
+                    <a:p>
+                      <a:r>
+                        <a:rPr lang="en-US" dirty="0"/>
+                        <a:t>7</a:t>
+                      </a:r>
+                    </a:p>
+                  </a:txBody>
+                  <a:tcPr/>
+                </a:tc>
+                <a:tc>
+                  <a:txBody>
+                    <a:bodyPr/>
+                    <a:lstStyle/>
+                    <a:p>
+                      <a:r>
+                        <a:rPr lang="en-US" dirty="0"/>
+                        <a:t>West field</a:t>
+                      </a:r>
+                    </a:p>
+                  </a:txBody>
+                  <a:tcPr/>
+                </a:tc>
+                <a:tc>
+                  <a:txBody>
+                    <a:bodyPr/>
+                    <a:lstStyle/>
+                    <a:p>
+                      <a:r>
+                        <a:rPr lang="en-US" dirty="0"/>
+                        <a:t>4</a:t>
+                      </a:r>
+                    </a:p>
+                  </a:txBody>
+                  <a:tcPr/>
+                </a:tc>
+                <a:extLst>
+                  <a:ext uri="{0D108BD9-81ED-4DB2-BD59-A6C34878D82A}">
+                    <a16:rowId xmlns:a16="http://schemas.microsoft.com/office/drawing/2014/main" val="3991791780"/>
+                  </a:ext>
+                </a:extLst>
+              </a:tr>
+              <a:tr h="550069">
+                <a:tc>
+                  <a:txBody>
+                    <a:bodyPr/>
+                    <a:lstStyle/>
+                    <a:p>
+                      <a:r>
+                        <a:rPr lang="en-US" dirty="0"/>
+                        <a:t>8</a:t>
+                      </a:r>
+                    </a:p>
+                  </a:txBody>
+                  <a:tcPr/>
+                </a:tc>
+                <a:tc>
+                  <a:txBody>
+                    <a:bodyPr/>
+                    <a:lstStyle/>
+                    <a:p>
+                      <a:r>
+                        <a:rPr lang="en-US" dirty="0"/>
+                        <a:t>East field</a:t>
+                      </a:r>
+                    </a:p>
+                  </a:txBody>
+                  <a:tcPr/>
+                </a:tc>
+                <a:tc>
+                  <a:txBody>
+                    <a:bodyPr/>
+                    <a:lstStyle/>
+                    <a:p>
+                      <a:r>
+                        <a:rPr lang="en-US" dirty="0"/>
+                        <a:t>4</a:t>
+                      </a:r>
+                    </a:p>
+                  </a:txBody>
+                  <a:tcPr/>
+                </a:tc>
+                <a:extLst>
+                  <a:ext uri="{0D108BD9-81ED-4DB2-BD59-A6C34878D82A}">
+                    <a16:rowId xmlns:a16="http://schemas.microsoft.com/office/drawing/2014/main" val="4244883252"/>
+                  </a:ext>
+                </a:extLst>
+              </a:tr>
+            </a:tbl>
+          </a:graphicData>
+        </a:graphic>
+      </p:graphicFrame>
+      <p:sp>
+        <p:nvSpPr>
+          <p:cNvPr id="12" name="TextBox 11">
+            <a:extLst>
+              <a:ext uri="{FF2B5EF4-FFF2-40B4-BE49-F238E27FC236}">
+                <a16:creationId xmlns:a16="http://schemas.microsoft.com/office/drawing/2014/main" id="{FC6DC9A1-82C1-994A-813A-5A2658AACA26}"/>
+              </a:ext>
+            </a:extLst>
+          </p:cNvPr>
+          <p:cNvSpPr txBox="1"/>
+          <p:nvPr/>
+        </p:nvSpPr>
+        <p:spPr>
+          <a:xfrm>
+            <a:off x="1945932" y="257175"/>
+            <a:ext cx="1500347" cy="584775"/>
+          </a:xfrm>
+          <a:prstGeom prst="rect">
+            <a:avLst/>
+          </a:prstGeom>
+          <a:noFill/>
+        </p:spPr>
+        <p:txBody>
+          <a:bodyPr wrap="none" rtlCol="0">
+            <a:spAutoFit/>
+          </a:bodyPr>
+          <a:lstStyle/>
+          <a:p>
+            <a:r>
+              <a:rPr lang="en-US" sz="3200" b="1" dirty="0"/>
+              <a:t>farmers</a:t>
+            </a:r>
+          </a:p>
+        </p:txBody>
+      </p:sp>
+      <p:sp>
+        <p:nvSpPr>
+          <p:cNvPr id="13" name="TextBox 12">
+            <a:extLst>
+              <a:ext uri="{FF2B5EF4-FFF2-40B4-BE49-F238E27FC236}">
+                <a16:creationId xmlns:a16="http://schemas.microsoft.com/office/drawing/2014/main" id="{28DCB725-B7B2-3445-A932-CECF62483DE8}"/>
+              </a:ext>
+            </a:extLst>
+          </p:cNvPr>
+          <p:cNvSpPr txBox="1"/>
+          <p:nvPr/>
+        </p:nvSpPr>
+        <p:spPr>
+          <a:xfrm>
+            <a:off x="6959923" y="257175"/>
+            <a:ext cx="1032655" cy="584775"/>
+          </a:xfrm>
+          <a:prstGeom prst="rect">
+            <a:avLst/>
+          </a:prstGeom>
+          <a:noFill/>
+        </p:spPr>
+        <p:txBody>
+          <a:bodyPr wrap="none" rtlCol="0">
+            <a:spAutoFit/>
+          </a:bodyPr>
+          <a:lstStyle/>
+          <a:p>
+            <a:r>
+              <a:rPr lang="en-US" sz="3200" b="1" dirty="0"/>
+              <a:t>plots</a:t>
+            </a:r>
+          </a:p>
+        </p:txBody>
+      </p:sp>
+    </p:spTree>
+    <p:extLst>
+      <p:ext uri="{BB962C8B-B14F-4D97-AF65-F5344CB8AC3E}">
+        <p14:creationId xmlns:p14="http://schemas.microsoft.com/office/powerpoint/2010/main" val="4276581232"/>
+      </p:ext>
+    </p:extLst>
+  </p:cSld>
+  <p:clrMapOvr>
+    <a:masterClrMapping/>
+  </p:clrMapOvr>
+</p:sld>
+</file>
+
+<file path=ppt/slides/slide3.xml><?xml version="1.0" encoding="utf-8"?>
+<p:sld xmlns:a="http://schemas.openxmlformats.org/drawingml/2006/main" xmlns:r="http://schemas.openxmlformats.org/officeDocument/2006/relationships" xmlns:p="http://schemas.openxmlformats.org/presentationml/2006/main">
+  <p:cSld>
+    <p:spTree>
+      <p:nvGrpSpPr>
+        <p:cNvPr id="1" name=""/>
+        <p:cNvGrpSpPr/>
+        <p:nvPr/>
+      </p:nvGrpSpPr>
+      <p:grpSpPr>
+        <a:xfrm>
+          <a:off x="0" y="0"/>
+          <a:ext cx="0" cy="0"/>
+          <a:chOff x="0" y="0"/>
+          <a:chExt cx="0" cy="0"/>
+        </a:xfrm>
+      </p:grpSpPr>
+      <p:graphicFrame>
+        <p:nvGraphicFramePr>
+          <p:cNvPr id="10" name="Table 9">
+            <a:extLst>
+              <a:ext uri="{FF2B5EF4-FFF2-40B4-BE49-F238E27FC236}">
+                <a16:creationId xmlns:a16="http://schemas.microsoft.com/office/drawing/2014/main" id="{799EA228-3090-514D-B56C-1EA6BBBFF0DC}"/>
+              </a:ext>
+            </a:extLst>
+          </p:cNvPr>
+          <p:cNvGraphicFramePr>
+            <a:graphicFrameLocks noGrp="1"/>
+          </p:cNvGraphicFramePr>
+          <p:nvPr/>
+        </p:nvGraphicFramePr>
+        <p:xfrm>
+          <a:off x="1579418" y="1228723"/>
+          <a:ext cx="2364993" cy="4400552"/>
+        </p:xfrm>
+        <a:graphic>
+          <a:graphicData uri="http://schemas.openxmlformats.org/drawingml/2006/table">
+            <a:tbl>
+              <a:tblPr firstRow="1" bandRow="1">
+                <a:tableStyleId>{5C22544A-7EE6-4342-B048-85BDC9FD1C3A}</a:tableStyleId>
+              </a:tblPr>
+              <a:tblGrid>
+                <a:gridCol w="1116688">
+                  <a:extLst>
+                    <a:ext uri="{9D8B030D-6E8A-4147-A177-3AD203B41FA5}">
+                      <a16:colId xmlns:a16="http://schemas.microsoft.com/office/drawing/2014/main" val="1814196662"/>
+                    </a:ext>
+                  </a:extLst>
+                </a:gridCol>
+                <a:gridCol w="1248305">
+                  <a:extLst>
+                    <a:ext uri="{9D8B030D-6E8A-4147-A177-3AD203B41FA5}">
+                      <a16:colId xmlns:a16="http://schemas.microsoft.com/office/drawing/2014/main" val="254236435"/>
+                    </a:ext>
+                  </a:extLst>
+                </a:gridCol>
+              </a:tblGrid>
+              <a:tr h="550069">
+                <a:tc>
+                  <a:txBody>
+                    <a:bodyPr/>
+                    <a:lstStyle/>
+                    <a:p>
+                      <a:r>
+                        <a:rPr lang="en-US" dirty="0"/>
+                        <a:t>id</a:t>
+                      </a:r>
+                    </a:p>
+                  </a:txBody>
+                  <a:tcPr/>
+                </a:tc>
+                <a:tc>
+                  <a:txBody>
+                    <a:bodyPr/>
+                    <a:lstStyle/>
+                    <a:p>
+                      <a:r>
+                        <a:rPr lang="en-US" dirty="0"/>
+                        <a:t>name</a:t>
+                      </a:r>
+                    </a:p>
+                  </a:txBody>
+                  <a:tcPr/>
+                </a:tc>
+                <a:extLst>
+                  <a:ext uri="{0D108BD9-81ED-4DB2-BD59-A6C34878D82A}">
+                    <a16:rowId xmlns:a16="http://schemas.microsoft.com/office/drawing/2014/main" val="3375024876"/>
+                  </a:ext>
+                </a:extLst>
+              </a:tr>
+              <a:tr h="550069">
+                <a:tc>
+                  <a:txBody>
+                    <a:bodyPr/>
+                    <a:lstStyle/>
+                    <a:p>
+                      <a:r>
+                        <a:rPr lang="en-US" dirty="0"/>
+                        <a:t>1</a:t>
+                      </a:r>
+                    </a:p>
+                  </a:txBody>
+                  <a:tcPr/>
+                </a:tc>
+                <a:tc>
+                  <a:txBody>
+                    <a:bodyPr/>
+                    <a:lstStyle/>
+                    <a:p>
+                      <a:r>
+                        <a:rPr lang="en-US" dirty="0"/>
+                        <a:t>Mary</a:t>
+                      </a:r>
+                    </a:p>
+                  </a:txBody>
+                  <a:tcPr/>
+                </a:tc>
+                <a:extLst>
+                  <a:ext uri="{0D108BD9-81ED-4DB2-BD59-A6C34878D82A}">
+                    <a16:rowId xmlns:a16="http://schemas.microsoft.com/office/drawing/2014/main" val="1096633820"/>
+                  </a:ext>
+                </a:extLst>
+              </a:tr>
+              <a:tr h="550069">
+                <a:tc>
+                  <a:txBody>
+                    <a:bodyPr/>
+                    <a:lstStyle/>
+                    <a:p>
+                      <a:r>
+                        <a:rPr lang="en-US" dirty="0"/>
+                        <a:t>2</a:t>
+                      </a:r>
+                    </a:p>
+                  </a:txBody>
+                  <a:tcPr/>
+                </a:tc>
+                <a:tc>
+                  <a:txBody>
+                    <a:bodyPr/>
+                    <a:lstStyle/>
+                    <a:p>
+                      <a:r>
+                        <a:rPr lang="en-US" dirty="0"/>
+                        <a:t>Jane</a:t>
+                      </a:r>
+                    </a:p>
+                  </a:txBody>
+                  <a:tcPr/>
+                </a:tc>
+                <a:extLst>
+                  <a:ext uri="{0D108BD9-81ED-4DB2-BD59-A6C34878D82A}">
+                    <a16:rowId xmlns:a16="http://schemas.microsoft.com/office/drawing/2014/main" val="2502785895"/>
+                  </a:ext>
+                </a:extLst>
+              </a:tr>
+              <a:tr h="550069">
+                <a:tc>
+                  <a:txBody>
+                    <a:bodyPr/>
+                    <a:lstStyle/>
+                    <a:p>
+                      <a:r>
+                        <a:rPr lang="en-US" dirty="0"/>
+                        <a:t>3</a:t>
+                      </a:r>
+                    </a:p>
+                  </a:txBody>
+                  <a:tcPr/>
+                </a:tc>
+                <a:tc>
+                  <a:txBody>
+                    <a:bodyPr/>
+                    <a:lstStyle/>
+                    <a:p>
+                      <a:r>
+                        <a:rPr lang="en-US" dirty="0"/>
+                        <a:t>Mark</a:t>
+                      </a:r>
+                    </a:p>
+                  </a:txBody>
+                  <a:tcPr/>
+                </a:tc>
+                <a:extLst>
+                  <a:ext uri="{0D108BD9-81ED-4DB2-BD59-A6C34878D82A}">
+                    <a16:rowId xmlns:a16="http://schemas.microsoft.com/office/drawing/2014/main" val="3585364205"/>
+                  </a:ext>
+                </a:extLst>
+              </a:tr>
+              <a:tr h="550069">
+                <a:tc>
+                  <a:txBody>
+                    <a:bodyPr/>
+                    <a:lstStyle/>
+                    <a:p>
+                      <a:r>
+                        <a:rPr lang="en-US" dirty="0"/>
+                        <a:t>4</a:t>
+                      </a:r>
+                    </a:p>
+                  </a:txBody>
+                  <a:tcPr/>
+                </a:tc>
+                <a:tc>
+                  <a:txBody>
+                    <a:bodyPr/>
+                    <a:lstStyle/>
+                    <a:p>
+                      <a:r>
+                        <a:rPr lang="en-US" dirty="0"/>
+                        <a:t>Luke</a:t>
+                      </a:r>
+                    </a:p>
+                  </a:txBody>
+                  <a:tcPr/>
+                </a:tc>
+                <a:extLst>
+                  <a:ext uri="{0D108BD9-81ED-4DB2-BD59-A6C34878D82A}">
+                    <a16:rowId xmlns:a16="http://schemas.microsoft.com/office/drawing/2014/main" val="1151712161"/>
+                  </a:ext>
+                </a:extLst>
+              </a:tr>
+              <a:tr h="550069">
+                <a:tc>
+                  <a:txBody>
+                    <a:bodyPr/>
+                    <a:lstStyle/>
+                    <a:p>
+                      <a:r>
+                        <a:rPr lang="en-US" dirty="0"/>
+                        <a:t>5</a:t>
+                      </a:r>
+                    </a:p>
+                  </a:txBody>
+                  <a:tcPr/>
+                </a:tc>
+                <a:tc>
+                  <a:txBody>
+                    <a:bodyPr/>
+                    <a:lstStyle/>
+                    <a:p>
+                      <a:r>
+                        <a:rPr lang="en-US" dirty="0"/>
+                        <a:t>Joan</a:t>
+                      </a:r>
+                    </a:p>
+                  </a:txBody>
+                  <a:tcPr/>
+                </a:tc>
+                <a:extLst>
+                  <a:ext uri="{0D108BD9-81ED-4DB2-BD59-A6C34878D82A}">
+                    <a16:rowId xmlns:a16="http://schemas.microsoft.com/office/drawing/2014/main" val="1895924153"/>
+                  </a:ext>
+                </a:extLst>
+              </a:tr>
+              <a:tr h="550069">
+                <a:tc>
+                  <a:txBody>
+                    <a:bodyPr/>
+                    <a:lstStyle/>
+                    <a:p>
+                      <a:r>
+                        <a:rPr lang="en-US" dirty="0"/>
+                        <a:t>6</a:t>
+                      </a:r>
+                    </a:p>
+                  </a:txBody>
+                  <a:tcPr/>
+                </a:tc>
+                <a:tc>
+                  <a:txBody>
+                    <a:bodyPr/>
+                    <a:lstStyle/>
+                    <a:p>
+                      <a:r>
+                        <a:rPr lang="en-US" dirty="0"/>
+                        <a:t>John</a:t>
+                      </a:r>
+                    </a:p>
+                  </a:txBody>
+                  <a:tcPr/>
+                </a:tc>
+                <a:extLst>
+                  <a:ext uri="{0D108BD9-81ED-4DB2-BD59-A6C34878D82A}">
+                    <a16:rowId xmlns:a16="http://schemas.microsoft.com/office/drawing/2014/main" val="2073015313"/>
+                  </a:ext>
+                </a:extLst>
+              </a:tr>
+              <a:tr h="550069">
+                <a:tc>
+                  <a:txBody>
+                    <a:bodyPr/>
+                    <a:lstStyle/>
+                    <a:p>
+                      <a:r>
+                        <a:rPr lang="en-US" dirty="0"/>
+                        <a:t>7</a:t>
+                      </a:r>
+                    </a:p>
+                  </a:txBody>
+                  <a:tcPr/>
+                </a:tc>
+                <a:tc>
+                  <a:txBody>
+                    <a:bodyPr/>
+                    <a:lstStyle/>
+                    <a:p>
+                      <a:r>
+                        <a:rPr lang="en-US" dirty="0"/>
+                        <a:t>Sam</a:t>
+                      </a:r>
+                    </a:p>
+                  </a:txBody>
+                  <a:tcPr/>
+                </a:tc>
+                <a:extLst>
+                  <a:ext uri="{0D108BD9-81ED-4DB2-BD59-A6C34878D82A}">
+                    <a16:rowId xmlns:a16="http://schemas.microsoft.com/office/drawing/2014/main" val="2290738421"/>
+                  </a:ext>
+                </a:extLst>
+              </a:tr>
+            </a:tbl>
+          </a:graphicData>
+        </a:graphic>
+      </p:graphicFrame>
+      <p:graphicFrame>
+        <p:nvGraphicFramePr>
+          <p:cNvPr id="11" name="Table 10">
+            <a:extLst>
+              <a:ext uri="{FF2B5EF4-FFF2-40B4-BE49-F238E27FC236}">
+                <a16:creationId xmlns:a16="http://schemas.microsoft.com/office/drawing/2014/main" id="{544C7A9B-CB2A-3743-AFD2-7B6D9354F9D4}"/>
+              </a:ext>
+            </a:extLst>
+          </p:cNvPr>
+          <p:cNvGraphicFramePr>
+            <a:graphicFrameLocks noGrp="1"/>
+          </p:cNvGraphicFramePr>
+          <p:nvPr/>
+        </p:nvGraphicFramePr>
+        <p:xfrm>
+          <a:off x="5800725" y="1228723"/>
+          <a:ext cx="4594874" cy="3300414"/>
+        </p:xfrm>
+        <a:graphic>
+          <a:graphicData uri="http://schemas.openxmlformats.org/drawingml/2006/table">
+            <a:tbl>
+              <a:tblPr firstRow="1" bandRow="1">
+                <a:tableStyleId>{5C22544A-7EE6-4342-B048-85BDC9FD1C3A}</a:tableStyleId>
+              </a:tblPr>
+              <a:tblGrid>
+                <a:gridCol w="695991">
+                  <a:extLst>
+                    <a:ext uri="{9D8B030D-6E8A-4147-A177-3AD203B41FA5}">
+                      <a16:colId xmlns:a16="http://schemas.microsoft.com/office/drawing/2014/main" val="1814196662"/>
+                    </a:ext>
+                  </a:extLst>
+                </a:gridCol>
+                <a:gridCol w="2429874">
+                  <a:extLst>
+                    <a:ext uri="{9D8B030D-6E8A-4147-A177-3AD203B41FA5}">
+                      <a16:colId xmlns:a16="http://schemas.microsoft.com/office/drawing/2014/main" val="254236435"/>
+                    </a:ext>
+                  </a:extLst>
+                </a:gridCol>
+                <a:gridCol w="1469009">
+                  <a:extLst>
+                    <a:ext uri="{9D8B030D-6E8A-4147-A177-3AD203B41FA5}">
+                      <a16:colId xmlns:a16="http://schemas.microsoft.com/office/drawing/2014/main" val="144704008"/>
+                    </a:ext>
+                  </a:extLst>
+                </a:gridCol>
+              </a:tblGrid>
+              <a:tr h="550069">
+                <a:tc>
+                  <a:txBody>
+                    <a:bodyPr/>
+                    <a:lstStyle/>
+                    <a:p>
+                      <a:r>
+                        <a:rPr lang="en-US" dirty="0"/>
+                        <a:t>id</a:t>
+                      </a:r>
+                    </a:p>
+                  </a:txBody>
+                  <a:tcPr/>
+                </a:tc>
+                <a:tc>
+                  <a:txBody>
+                    <a:bodyPr/>
+                    <a:lstStyle/>
+                    <a:p>
+                      <a:r>
+                        <a:rPr lang="en-US" dirty="0"/>
+                        <a:t>email</a:t>
+                      </a:r>
+                    </a:p>
+                  </a:txBody>
+                  <a:tcPr/>
+                </a:tc>
+                <a:tc>
+                  <a:txBody>
+                    <a:bodyPr/>
+                    <a:lstStyle/>
+                    <a:p>
+                      <a:r>
+                        <a:rPr lang="en-US" dirty="0"/>
+                        <a:t>farmer_id</a:t>
+                      </a:r>
+                    </a:p>
+                  </a:txBody>
+                  <a:tcPr/>
+                </a:tc>
+                <a:extLst>
+                  <a:ext uri="{0D108BD9-81ED-4DB2-BD59-A6C34878D82A}">
+                    <a16:rowId xmlns:a16="http://schemas.microsoft.com/office/drawing/2014/main" val="3375024876"/>
+                  </a:ext>
+                </a:extLst>
+              </a:tr>
+              <a:tr h="550069">
+                <a:tc>
+                  <a:txBody>
+                    <a:bodyPr/>
+                    <a:lstStyle/>
+                    <a:p>
+                      <a:r>
+                        <a:rPr lang="en-US" dirty="0"/>
+                        <a:t>1</a:t>
+                      </a:r>
+                    </a:p>
+                  </a:txBody>
+                  <a:tcPr/>
+                </a:tc>
+                <a:tc>
+                  <a:txBody>
+                    <a:bodyPr/>
+                    <a:lstStyle/>
+                    <a:p>
+                      <a:r>
+                        <a:rPr lang="en-US" dirty="0"/>
+                        <a:t>mary@example.com</a:t>
+                      </a:r>
+                    </a:p>
+                  </a:txBody>
+                  <a:tcPr/>
+                </a:tc>
+                <a:tc>
+                  <a:txBody>
+                    <a:bodyPr/>
+                    <a:lstStyle/>
+                    <a:p>
+                      <a:r>
+                        <a:rPr lang="en-US" dirty="0"/>
+                        <a:t>1</a:t>
+                      </a:r>
+                    </a:p>
+                  </a:txBody>
+                  <a:tcPr/>
+                </a:tc>
+                <a:extLst>
+                  <a:ext uri="{0D108BD9-81ED-4DB2-BD59-A6C34878D82A}">
+                    <a16:rowId xmlns:a16="http://schemas.microsoft.com/office/drawing/2014/main" val="1096633820"/>
+                  </a:ext>
+                </a:extLst>
+              </a:tr>
+              <a:tr h="550069">
+                <a:tc>
+                  <a:txBody>
+                    <a:bodyPr/>
+                    <a:lstStyle/>
+                    <a:p>
+                      <a:r>
+                        <a:rPr lang="en-US" dirty="0"/>
+                        <a:t>2</a:t>
+                      </a:r>
+                    </a:p>
+                  </a:txBody>
+                  <a:tcPr/>
+                </a:tc>
+                <a:tc>
+                  <a:txBody>
+                    <a:bodyPr/>
+                    <a:lstStyle/>
+                    <a:p>
+                      <a:r>
+                        <a:rPr lang="en-US" dirty="0"/>
+                        <a:t>mark@example.com</a:t>
+                      </a:r>
+                    </a:p>
+                  </a:txBody>
+                  <a:tcPr/>
+                </a:tc>
+                <a:tc>
+                  <a:txBody>
+                    <a:bodyPr/>
+                    <a:lstStyle/>
+                    <a:p>
+                      <a:r>
+                        <a:rPr lang="en-US" dirty="0"/>
+                        <a:t>3</a:t>
+                      </a:r>
+                    </a:p>
+                  </a:txBody>
+                  <a:tcPr/>
+                </a:tc>
+                <a:extLst>
+                  <a:ext uri="{0D108BD9-81ED-4DB2-BD59-A6C34878D82A}">
+                    <a16:rowId xmlns:a16="http://schemas.microsoft.com/office/drawing/2014/main" val="2502785895"/>
+                  </a:ext>
+                </a:extLst>
+              </a:tr>
+              <a:tr h="550069">
+                <a:tc>
+                  <a:txBody>
+                    <a:bodyPr/>
+                    <a:lstStyle/>
+                    <a:p>
+                      <a:r>
+                        <a:rPr lang="en-US" dirty="0"/>
+                        <a:t>3</a:t>
+                      </a:r>
+                    </a:p>
+                  </a:txBody>
+                  <a:tcPr/>
+                </a:tc>
+                <a:tc>
+                  <a:txBody>
+                    <a:bodyPr/>
+                    <a:lstStyle/>
+                    <a:p>
+                      <a:r>
+                        <a:rPr lang="en-US" dirty="0"/>
+                        <a:t>joan@example.com</a:t>
+                      </a:r>
+                    </a:p>
+                  </a:txBody>
+                  <a:tcPr/>
+                </a:tc>
+                <a:tc>
+                  <a:txBody>
+                    <a:bodyPr/>
+                    <a:lstStyle/>
+                    <a:p>
+                      <a:r>
+                        <a:rPr lang="en-US" dirty="0"/>
+                        <a:t>5</a:t>
+                      </a:r>
+                    </a:p>
+                  </a:txBody>
+                  <a:tcPr/>
+                </a:tc>
+                <a:extLst>
+                  <a:ext uri="{0D108BD9-81ED-4DB2-BD59-A6C34878D82A}">
+                    <a16:rowId xmlns:a16="http://schemas.microsoft.com/office/drawing/2014/main" val="3585364205"/>
+                  </a:ext>
+                </a:extLst>
+              </a:tr>
+              <a:tr h="550069">
+                <a:tc>
+                  <a:txBody>
+                    <a:bodyPr/>
+                    <a:lstStyle/>
+                    <a:p>
+                      <a:r>
+                        <a:rPr lang="en-US" dirty="0"/>
+                        <a:t>4</a:t>
+                      </a:r>
+                    </a:p>
+                  </a:txBody>
+                  <a:tcPr/>
+                </a:tc>
+                <a:tc>
+                  <a:txBody>
+                    <a:bodyPr/>
+                    <a:lstStyle/>
+                    <a:p>
+                      <a:r>
+                        <a:rPr lang="en-US" dirty="0"/>
+                        <a:t>john@example.com</a:t>
+                      </a:r>
+                    </a:p>
+                  </a:txBody>
+                  <a:tcPr/>
+                </a:tc>
+                <a:tc>
+                  <a:txBody>
+                    <a:bodyPr/>
+                    <a:lstStyle/>
+                    <a:p>
+                      <a:r>
+                        <a:rPr lang="en-US" dirty="0"/>
+                        <a:t>6</a:t>
+                      </a:r>
+                    </a:p>
+                  </a:txBody>
+                  <a:tcPr/>
+                </a:tc>
+                <a:extLst>
+                  <a:ext uri="{0D108BD9-81ED-4DB2-BD59-A6C34878D82A}">
+                    <a16:rowId xmlns:a16="http://schemas.microsoft.com/office/drawing/2014/main" val="1151712161"/>
+                  </a:ext>
+                </a:extLst>
+              </a:tr>
+              <a:tr h="550069">
+                <a:tc>
+                  <a:txBody>
+                    <a:bodyPr/>
+                    <a:lstStyle/>
+                    <a:p>
+                      <a:r>
+                        <a:rPr lang="en-US" dirty="0"/>
+                        <a:t>5</a:t>
+                      </a:r>
+                    </a:p>
+                  </a:txBody>
+                  <a:tcPr/>
+                </a:tc>
+                <a:tc>
+                  <a:txBody>
+                    <a:bodyPr/>
+                    <a:lstStyle/>
+                    <a:p>
+                      <a:r>
+                        <a:rPr lang="en-US" dirty="0"/>
+                        <a:t>sam@example.com</a:t>
+                      </a:r>
+                    </a:p>
+                  </a:txBody>
+                  <a:tcPr/>
+                </a:tc>
+                <a:tc>
+                  <a:txBody>
+                    <a:bodyPr/>
+                    <a:lstStyle/>
+                    <a:p>
+                      <a:r>
+                        <a:rPr lang="en-US" dirty="0"/>
+                        <a:t>7</a:t>
+                      </a:r>
+                    </a:p>
+                  </a:txBody>
+                  <a:tcPr/>
+                </a:tc>
+                <a:extLst>
+                  <a:ext uri="{0D108BD9-81ED-4DB2-BD59-A6C34878D82A}">
+                    <a16:rowId xmlns:a16="http://schemas.microsoft.com/office/drawing/2014/main" val="1895924153"/>
+                  </a:ext>
+                </a:extLst>
+              </a:tr>
+            </a:tbl>
+          </a:graphicData>
+        </a:graphic>
+      </p:graphicFrame>
+      <p:sp>
+        <p:nvSpPr>
+          <p:cNvPr id="12" name="TextBox 11">
+            <a:extLst>
+              <a:ext uri="{FF2B5EF4-FFF2-40B4-BE49-F238E27FC236}">
+                <a16:creationId xmlns:a16="http://schemas.microsoft.com/office/drawing/2014/main" id="{FC6DC9A1-82C1-994A-813A-5A2658AACA26}"/>
+              </a:ext>
+            </a:extLst>
+          </p:cNvPr>
+          <p:cNvSpPr txBox="1"/>
+          <p:nvPr/>
+        </p:nvSpPr>
+        <p:spPr>
+          <a:xfrm>
+            <a:off x="1945932" y="257175"/>
+            <a:ext cx="1500347" cy="584775"/>
+          </a:xfrm>
+          <a:prstGeom prst="rect">
+            <a:avLst/>
+          </a:prstGeom>
+          <a:noFill/>
+        </p:spPr>
+        <p:txBody>
+          <a:bodyPr wrap="none" rtlCol="0">
+            <a:spAutoFit/>
+          </a:bodyPr>
+          <a:lstStyle/>
+          <a:p>
+            <a:r>
+              <a:rPr lang="en-US" sz="3200" b="1" dirty="0"/>
+              <a:t>farmers</a:t>
+            </a:r>
+          </a:p>
+        </p:txBody>
+      </p:sp>
+      <p:sp>
+        <p:nvSpPr>
+          <p:cNvPr id="13" name="TextBox 12">
+            <a:extLst>
+              <a:ext uri="{FF2B5EF4-FFF2-40B4-BE49-F238E27FC236}">
+                <a16:creationId xmlns:a16="http://schemas.microsoft.com/office/drawing/2014/main" id="{28DCB725-B7B2-3445-A932-CECF62483DE8}"/>
+              </a:ext>
+            </a:extLst>
+          </p:cNvPr>
+          <p:cNvSpPr txBox="1"/>
+          <p:nvPr/>
+        </p:nvSpPr>
+        <p:spPr>
+          <a:xfrm>
+            <a:off x="6959923" y="257175"/>
+            <a:ext cx="2625078" cy="584775"/>
+          </a:xfrm>
+          <a:prstGeom prst="rect">
+            <a:avLst/>
+          </a:prstGeom>
+          <a:noFill/>
+        </p:spPr>
+        <p:txBody>
+          <a:bodyPr wrap="none" rtlCol="0">
+            <a:spAutoFit/>
+          </a:bodyPr>
+          <a:lstStyle/>
+          <a:p>
+            <a:r>
+              <a:rPr lang="en-US" sz="3200" b="1" dirty="0"/>
+              <a:t>web_accounts</a:t>
+            </a:r>
+          </a:p>
+        </p:txBody>
+      </p:sp>
+    </p:spTree>
+    <p:extLst>
+      <p:ext uri="{BB962C8B-B14F-4D97-AF65-F5344CB8AC3E}">
+        <p14:creationId xmlns:p14="http://schemas.microsoft.com/office/powerpoint/2010/main" val="3679400459"/>
+      </p:ext>
+    </p:extLst>
+  </p:cSld>
+  <p:clrMapOvr>
+    <a:masterClrMapping/>
+  </p:clrMapOvr>
+</p:sld>
+</file>
+
 <file path=ppt/theme/theme1.xml><?xml version="1.0" encoding="utf-8"?>
 <a:theme xmlns:a="http://schemas.openxmlformats.org/drawingml/2006/main" name="Office Theme">
   <a:themeElements>

</xml_diff>

<commit_message>
added many to many stuff
</commit_message>
<xml_diff>
--- a/assets/images/relationships/source-tables.pptx
+++ b/assets/images/relationships/source-tables.pptx
@@ -8,6 +8,7 @@
     <p:sldId id="256" r:id="rId2"/>
     <p:sldId id="257" r:id="rId3"/>
     <p:sldId id="258" r:id="rId4"/>
+    <p:sldId id="259" r:id="rId5"/>
   </p:sldIdLst>
   <p:sldSz cx="12192000" cy="6858000"/>
   <p:notesSz cx="6858000" cy="9144000"/>
@@ -106,6 +107,11 @@
       </a:defRPr>
     </a:lvl9pPr>
   </p:defaultTextStyle>
+  <p:extLst>
+    <p:ext uri="{EFAFB233-063F-42B5-8137-9DF3F51BA10A}">
+      <p15:sldGuideLst xmlns:p15="http://schemas.microsoft.com/office/powerpoint/2012/main"/>
+    </p:ext>
+  </p:extLst>
 </p:presentation>
 </file>
 
@@ -256,7 +262,7 @@
           <a:p>
             <a:fld id="{07E54A18-6F89-0D4A-BEF0-D4351E72450E}" type="datetimeFigureOut">
               <a:rPr lang="en-US" smtClean="0"/>
-              <a:t>11/22/18</a:t>
+              <a:t>1/22/19</a:t>
             </a:fld>
             <a:endParaRPr lang="en-US"/>
           </a:p>
@@ -454,7 +460,7 @@
           <a:p>
             <a:fld id="{07E54A18-6F89-0D4A-BEF0-D4351E72450E}" type="datetimeFigureOut">
               <a:rPr lang="en-US" smtClean="0"/>
-              <a:t>11/22/18</a:t>
+              <a:t>1/22/19</a:t>
             </a:fld>
             <a:endParaRPr lang="en-US"/>
           </a:p>
@@ -662,7 +668,7 @@
           <a:p>
             <a:fld id="{07E54A18-6F89-0D4A-BEF0-D4351E72450E}" type="datetimeFigureOut">
               <a:rPr lang="en-US" smtClean="0"/>
-              <a:t>11/22/18</a:t>
+              <a:t>1/22/19</a:t>
             </a:fld>
             <a:endParaRPr lang="en-US"/>
           </a:p>
@@ -860,7 +866,7 @@
           <a:p>
             <a:fld id="{07E54A18-6F89-0D4A-BEF0-D4351E72450E}" type="datetimeFigureOut">
               <a:rPr lang="en-US" smtClean="0"/>
-              <a:t>11/22/18</a:t>
+              <a:t>1/22/19</a:t>
             </a:fld>
             <a:endParaRPr lang="en-US"/>
           </a:p>
@@ -1135,7 +1141,7 @@
           <a:p>
             <a:fld id="{07E54A18-6F89-0D4A-BEF0-D4351E72450E}" type="datetimeFigureOut">
               <a:rPr lang="en-US" smtClean="0"/>
-              <a:t>11/22/18</a:t>
+              <a:t>1/22/19</a:t>
             </a:fld>
             <a:endParaRPr lang="en-US"/>
           </a:p>
@@ -1400,7 +1406,7 @@
           <a:p>
             <a:fld id="{07E54A18-6F89-0D4A-BEF0-D4351E72450E}" type="datetimeFigureOut">
               <a:rPr lang="en-US" smtClean="0"/>
-              <a:t>11/22/18</a:t>
+              <a:t>1/22/19</a:t>
             </a:fld>
             <a:endParaRPr lang="en-US"/>
           </a:p>
@@ -1812,7 +1818,7 @@
           <a:p>
             <a:fld id="{07E54A18-6F89-0D4A-BEF0-D4351E72450E}" type="datetimeFigureOut">
               <a:rPr lang="en-US" smtClean="0"/>
-              <a:t>11/22/18</a:t>
+              <a:t>1/22/19</a:t>
             </a:fld>
             <a:endParaRPr lang="en-US"/>
           </a:p>
@@ -1953,7 +1959,7 @@
           <a:p>
             <a:fld id="{07E54A18-6F89-0D4A-BEF0-D4351E72450E}" type="datetimeFigureOut">
               <a:rPr lang="en-US" smtClean="0"/>
-              <a:t>11/22/18</a:t>
+              <a:t>1/22/19</a:t>
             </a:fld>
             <a:endParaRPr lang="en-US"/>
           </a:p>
@@ -2066,7 +2072,7 @@
           <a:p>
             <a:fld id="{07E54A18-6F89-0D4A-BEF0-D4351E72450E}" type="datetimeFigureOut">
               <a:rPr lang="en-US" smtClean="0"/>
-              <a:t>11/22/18</a:t>
+              <a:t>1/22/19</a:t>
             </a:fld>
             <a:endParaRPr lang="en-US"/>
           </a:p>
@@ -2377,7 +2383,7 @@
           <a:p>
             <a:fld id="{07E54A18-6F89-0D4A-BEF0-D4351E72450E}" type="datetimeFigureOut">
               <a:rPr lang="en-US" smtClean="0"/>
-              <a:t>11/22/18</a:t>
+              <a:t>1/22/19</a:t>
             </a:fld>
             <a:endParaRPr lang="en-US"/>
           </a:p>
@@ -2665,7 +2671,7 @@
           <a:p>
             <a:fld id="{07E54A18-6F89-0D4A-BEF0-D4351E72450E}" type="datetimeFigureOut">
               <a:rPr lang="en-US" smtClean="0"/>
-              <a:t>11/22/18</a:t>
+              <a:t>1/22/19</a:t>
             </a:fld>
             <a:endParaRPr lang="en-US"/>
           </a:p>
@@ -2906,7 +2912,7 @@
           <a:p>
             <a:fld id="{07E54A18-6F89-0D4A-BEF0-D4351E72450E}" type="datetimeFigureOut">
               <a:rPr lang="en-US" smtClean="0"/>
-              <a:t>11/22/18</a:t>
+              <a:t>1/22/19</a:t>
             </a:fld>
             <a:endParaRPr lang="en-US"/>
           </a:p>
@@ -5668,6 +5674,930 @@
 </p:sld>
 </file>
 
+<file path=ppt/slides/slide4.xml><?xml version="1.0" encoding="utf-8"?>
+<p:sld xmlns:a="http://schemas.openxmlformats.org/drawingml/2006/main" xmlns:r="http://schemas.openxmlformats.org/officeDocument/2006/relationships" xmlns:p="http://schemas.openxmlformats.org/presentationml/2006/main">
+  <p:cSld>
+    <p:spTree>
+      <p:nvGrpSpPr>
+        <p:cNvPr id="1" name=""/>
+        <p:cNvGrpSpPr/>
+        <p:nvPr/>
+      </p:nvGrpSpPr>
+      <p:grpSpPr>
+        <a:xfrm>
+          <a:off x="0" y="0"/>
+          <a:ext cx="0" cy="0"/>
+          <a:chOff x="0" y="0"/>
+          <a:chExt cx="0" cy="0"/>
+        </a:xfrm>
+      </p:grpSpPr>
+      <p:graphicFrame>
+        <p:nvGraphicFramePr>
+          <p:cNvPr id="10" name="Table 9">
+            <a:extLst>
+              <a:ext uri="{FF2B5EF4-FFF2-40B4-BE49-F238E27FC236}">
+                <a16:creationId xmlns:a16="http://schemas.microsoft.com/office/drawing/2014/main" id="{799EA228-3090-514D-B56C-1EA6BBBFF0DC}"/>
+              </a:ext>
+            </a:extLst>
+          </p:cNvPr>
+          <p:cNvGraphicFramePr>
+            <a:graphicFrameLocks noGrp="1"/>
+          </p:cNvGraphicFramePr>
+          <p:nvPr>
+            <p:extLst>
+              <p:ext uri="{D42A27DB-BD31-4B8C-83A1-F6EECF244321}">
+                <p14:modId xmlns:p14="http://schemas.microsoft.com/office/powerpoint/2010/main" val="3436185189"/>
+              </p:ext>
+            </p:extLst>
+          </p:nvPr>
+        </p:nvGraphicFramePr>
+        <p:xfrm>
+          <a:off x="8776660" y="1284479"/>
+          <a:ext cx="1882077" cy="2741283"/>
+        </p:xfrm>
+        <a:graphic>
+          <a:graphicData uri="http://schemas.openxmlformats.org/drawingml/2006/table">
+            <a:tbl>
+              <a:tblPr firstRow="1" bandRow="1">
+                <a:tableStyleId>{5C22544A-7EE6-4342-B048-85BDC9FD1C3A}</a:tableStyleId>
+              </a:tblPr>
+              <a:tblGrid>
+                <a:gridCol w="467942">
+                  <a:extLst>
+                    <a:ext uri="{9D8B030D-6E8A-4147-A177-3AD203B41FA5}">
+                      <a16:colId xmlns:a16="http://schemas.microsoft.com/office/drawing/2014/main" val="1814196662"/>
+                    </a:ext>
+                  </a:extLst>
+                </a:gridCol>
+                <a:gridCol w="1414135">
+                  <a:extLst>
+                    <a:ext uri="{9D8B030D-6E8A-4147-A177-3AD203B41FA5}">
+                      <a16:colId xmlns:a16="http://schemas.microsoft.com/office/drawing/2014/main" val="254236435"/>
+                    </a:ext>
+                  </a:extLst>
+                </a:gridCol>
+              </a:tblGrid>
+              <a:tr h="541007">
+                <a:tc>
+                  <a:txBody>
+                    <a:bodyPr/>
+                    <a:lstStyle/>
+                    <a:p>
+                      <a:r>
+                        <a:rPr lang="en-US" dirty="0"/>
+                        <a:t>id</a:t>
+                      </a:r>
+                    </a:p>
+                  </a:txBody>
+                  <a:tcPr/>
+                </a:tc>
+                <a:tc>
+                  <a:txBody>
+                    <a:bodyPr/>
+                    <a:lstStyle/>
+                    <a:p>
+                      <a:r>
+                        <a:rPr lang="en-US" dirty="0"/>
+                        <a:t>name</a:t>
+                      </a:r>
+                    </a:p>
+                  </a:txBody>
+                  <a:tcPr/>
+                </a:tc>
+                <a:extLst>
+                  <a:ext uri="{0D108BD9-81ED-4DB2-BD59-A6C34878D82A}">
+                    <a16:rowId xmlns:a16="http://schemas.microsoft.com/office/drawing/2014/main" val="3375024876"/>
+                  </a:ext>
+                </a:extLst>
+              </a:tr>
+              <a:tr h="550069">
+                <a:tc>
+                  <a:txBody>
+                    <a:bodyPr/>
+                    <a:lstStyle/>
+                    <a:p>
+                      <a:r>
+                        <a:rPr lang="en-US" dirty="0"/>
+                        <a:t>1</a:t>
+                      </a:r>
+                    </a:p>
+                  </a:txBody>
+                  <a:tcPr/>
+                </a:tc>
+                <a:tc>
+                  <a:txBody>
+                    <a:bodyPr/>
+                    <a:lstStyle/>
+                    <a:p>
+                      <a:r>
+                        <a:rPr lang="en-US" dirty="0"/>
+                        <a:t>NGO 1</a:t>
+                      </a:r>
+                    </a:p>
+                  </a:txBody>
+                  <a:tcPr/>
+                </a:tc>
+                <a:extLst>
+                  <a:ext uri="{0D108BD9-81ED-4DB2-BD59-A6C34878D82A}">
+                    <a16:rowId xmlns:a16="http://schemas.microsoft.com/office/drawing/2014/main" val="1096633820"/>
+                  </a:ext>
+                </a:extLst>
+              </a:tr>
+              <a:tr h="550069">
+                <a:tc>
+                  <a:txBody>
+                    <a:bodyPr/>
+                    <a:lstStyle/>
+                    <a:p>
+                      <a:r>
+                        <a:rPr lang="en-US" dirty="0"/>
+                        <a:t>2</a:t>
+                      </a:r>
+                    </a:p>
+                  </a:txBody>
+                  <a:tcPr/>
+                </a:tc>
+                <a:tc>
+                  <a:txBody>
+                    <a:bodyPr/>
+                    <a:lstStyle/>
+                    <a:p>
+                      <a:r>
+                        <a:rPr lang="en-US" dirty="0"/>
+                        <a:t>NGO 2</a:t>
+                      </a:r>
+                    </a:p>
+                  </a:txBody>
+                  <a:tcPr/>
+                </a:tc>
+                <a:extLst>
+                  <a:ext uri="{0D108BD9-81ED-4DB2-BD59-A6C34878D82A}">
+                    <a16:rowId xmlns:a16="http://schemas.microsoft.com/office/drawing/2014/main" val="2502785895"/>
+                  </a:ext>
+                </a:extLst>
+              </a:tr>
+              <a:tr h="550069">
+                <a:tc>
+                  <a:txBody>
+                    <a:bodyPr/>
+                    <a:lstStyle/>
+                    <a:p>
+                      <a:r>
+                        <a:rPr lang="en-US" dirty="0"/>
+                        <a:t>3</a:t>
+                      </a:r>
+                    </a:p>
+                  </a:txBody>
+                  <a:tcPr/>
+                </a:tc>
+                <a:tc>
+                  <a:txBody>
+                    <a:bodyPr/>
+                    <a:lstStyle/>
+                    <a:p>
+                      <a:r>
+                        <a:rPr lang="en-US" dirty="0"/>
+                        <a:t>NGO 3</a:t>
+                      </a:r>
+                    </a:p>
+                  </a:txBody>
+                  <a:tcPr/>
+                </a:tc>
+                <a:extLst>
+                  <a:ext uri="{0D108BD9-81ED-4DB2-BD59-A6C34878D82A}">
+                    <a16:rowId xmlns:a16="http://schemas.microsoft.com/office/drawing/2014/main" val="3585364205"/>
+                  </a:ext>
+                </a:extLst>
+              </a:tr>
+              <a:tr h="550069">
+                <a:tc>
+                  <a:txBody>
+                    <a:bodyPr/>
+                    <a:lstStyle/>
+                    <a:p>
+                      <a:r>
+                        <a:rPr lang="en-US" dirty="0"/>
+                        <a:t>4</a:t>
+                      </a:r>
+                    </a:p>
+                  </a:txBody>
+                  <a:tcPr/>
+                </a:tc>
+                <a:tc>
+                  <a:txBody>
+                    <a:bodyPr/>
+                    <a:lstStyle/>
+                    <a:p>
+                      <a:r>
+                        <a:rPr lang="en-US" dirty="0"/>
+                        <a:t>NGO 4</a:t>
+                      </a:r>
+                    </a:p>
+                  </a:txBody>
+                  <a:tcPr/>
+                </a:tc>
+                <a:extLst>
+                  <a:ext uri="{0D108BD9-81ED-4DB2-BD59-A6C34878D82A}">
+                    <a16:rowId xmlns:a16="http://schemas.microsoft.com/office/drawing/2014/main" val="1151712161"/>
+                  </a:ext>
+                </a:extLst>
+              </a:tr>
+            </a:tbl>
+          </a:graphicData>
+        </a:graphic>
+      </p:graphicFrame>
+      <p:graphicFrame>
+        <p:nvGraphicFramePr>
+          <p:cNvPr id="11" name="Table 10">
+            <a:extLst>
+              <a:ext uri="{FF2B5EF4-FFF2-40B4-BE49-F238E27FC236}">
+                <a16:creationId xmlns:a16="http://schemas.microsoft.com/office/drawing/2014/main" id="{544C7A9B-CB2A-3743-AFD2-7B6D9354F9D4}"/>
+              </a:ext>
+            </a:extLst>
+          </p:cNvPr>
+          <p:cNvGraphicFramePr>
+            <a:graphicFrameLocks noGrp="1"/>
+          </p:cNvGraphicFramePr>
+          <p:nvPr>
+            <p:extLst>
+              <p:ext uri="{D42A27DB-BD31-4B8C-83A1-F6EECF244321}">
+                <p14:modId xmlns:p14="http://schemas.microsoft.com/office/powerpoint/2010/main" val="384401904"/>
+              </p:ext>
+            </p:extLst>
+          </p:nvPr>
+        </p:nvGraphicFramePr>
+        <p:xfrm>
+          <a:off x="1113897" y="1284479"/>
+          <a:ext cx="1882077" cy="2750345"/>
+        </p:xfrm>
+        <a:graphic>
+          <a:graphicData uri="http://schemas.openxmlformats.org/drawingml/2006/table">
+            <a:tbl>
+              <a:tblPr firstRow="1" bandRow="1">
+                <a:tableStyleId>{5C22544A-7EE6-4342-B048-85BDC9FD1C3A}</a:tableStyleId>
+              </a:tblPr>
+              <a:tblGrid>
+                <a:gridCol w="413068">
+                  <a:extLst>
+                    <a:ext uri="{9D8B030D-6E8A-4147-A177-3AD203B41FA5}">
+                      <a16:colId xmlns:a16="http://schemas.microsoft.com/office/drawing/2014/main" val="1814196662"/>
+                    </a:ext>
+                  </a:extLst>
+                </a:gridCol>
+                <a:gridCol w="1469009">
+                  <a:extLst>
+                    <a:ext uri="{9D8B030D-6E8A-4147-A177-3AD203B41FA5}">
+                      <a16:colId xmlns:a16="http://schemas.microsoft.com/office/drawing/2014/main" val="144704008"/>
+                    </a:ext>
+                  </a:extLst>
+                </a:gridCol>
+              </a:tblGrid>
+              <a:tr h="550069">
+                <a:tc>
+                  <a:txBody>
+                    <a:bodyPr/>
+                    <a:lstStyle/>
+                    <a:p>
+                      <a:r>
+                        <a:rPr lang="en-US" dirty="0"/>
+                        <a:t>id</a:t>
+                      </a:r>
+                    </a:p>
+                  </a:txBody>
+                  <a:tcPr/>
+                </a:tc>
+                <a:tc>
+                  <a:txBody>
+                    <a:bodyPr/>
+                    <a:lstStyle/>
+                    <a:p>
+                      <a:r>
+                        <a:rPr lang="en-US" dirty="0"/>
+                        <a:t>name</a:t>
+                      </a:r>
+                    </a:p>
+                  </a:txBody>
+                  <a:tcPr/>
+                </a:tc>
+                <a:extLst>
+                  <a:ext uri="{0D108BD9-81ED-4DB2-BD59-A6C34878D82A}">
+                    <a16:rowId xmlns:a16="http://schemas.microsoft.com/office/drawing/2014/main" val="3375024876"/>
+                  </a:ext>
+                </a:extLst>
+              </a:tr>
+              <a:tr h="550069">
+                <a:tc>
+                  <a:txBody>
+                    <a:bodyPr/>
+                    <a:lstStyle/>
+                    <a:p>
+                      <a:r>
+                        <a:rPr lang="en-US" dirty="0"/>
+                        <a:t>1</a:t>
+                      </a:r>
+                    </a:p>
+                  </a:txBody>
+                  <a:tcPr/>
+                </a:tc>
+                <a:tc>
+                  <a:txBody>
+                    <a:bodyPr/>
+                    <a:lstStyle/>
+                    <a:p>
+                      <a:r>
+                        <a:rPr lang="en-US" dirty="0"/>
+                        <a:t>Baringo</a:t>
+                      </a:r>
+                    </a:p>
+                  </a:txBody>
+                  <a:tcPr/>
+                </a:tc>
+                <a:extLst>
+                  <a:ext uri="{0D108BD9-81ED-4DB2-BD59-A6C34878D82A}">
+                    <a16:rowId xmlns:a16="http://schemas.microsoft.com/office/drawing/2014/main" val="1096633820"/>
+                  </a:ext>
+                </a:extLst>
+              </a:tr>
+              <a:tr h="550069">
+                <a:tc>
+                  <a:txBody>
+                    <a:bodyPr/>
+                    <a:lstStyle/>
+                    <a:p>
+                      <a:r>
+                        <a:rPr lang="en-US" dirty="0"/>
+                        <a:t>2</a:t>
+                      </a:r>
+                    </a:p>
+                  </a:txBody>
+                  <a:tcPr/>
+                </a:tc>
+                <a:tc>
+                  <a:txBody>
+                    <a:bodyPr/>
+                    <a:lstStyle/>
+                    <a:p>
+                      <a:r>
+                        <a:rPr lang="en-US" dirty="0" err="1"/>
+                        <a:t>Bomet</a:t>
+                      </a:r>
+                      <a:endParaRPr lang="en-US" dirty="0"/>
+                    </a:p>
+                  </a:txBody>
+                  <a:tcPr/>
+                </a:tc>
+                <a:extLst>
+                  <a:ext uri="{0D108BD9-81ED-4DB2-BD59-A6C34878D82A}">
+                    <a16:rowId xmlns:a16="http://schemas.microsoft.com/office/drawing/2014/main" val="2502785895"/>
+                  </a:ext>
+                </a:extLst>
+              </a:tr>
+              <a:tr h="550069">
+                <a:tc>
+                  <a:txBody>
+                    <a:bodyPr/>
+                    <a:lstStyle/>
+                    <a:p>
+                      <a:r>
+                        <a:rPr lang="en-US" dirty="0"/>
+                        <a:t>3</a:t>
+                      </a:r>
+                    </a:p>
+                  </a:txBody>
+                  <a:tcPr/>
+                </a:tc>
+                <a:tc>
+                  <a:txBody>
+                    <a:bodyPr/>
+                    <a:lstStyle/>
+                    <a:p>
+                      <a:r>
+                        <a:rPr lang="en-US" dirty="0"/>
+                        <a:t>Bungoma</a:t>
+                      </a:r>
+                    </a:p>
+                  </a:txBody>
+                  <a:tcPr/>
+                </a:tc>
+                <a:extLst>
+                  <a:ext uri="{0D108BD9-81ED-4DB2-BD59-A6C34878D82A}">
+                    <a16:rowId xmlns:a16="http://schemas.microsoft.com/office/drawing/2014/main" val="3585364205"/>
+                  </a:ext>
+                </a:extLst>
+              </a:tr>
+              <a:tr h="550069">
+                <a:tc>
+                  <a:txBody>
+                    <a:bodyPr/>
+                    <a:lstStyle/>
+                    <a:p>
+                      <a:r>
+                        <a:rPr lang="en-US" dirty="0"/>
+                        <a:t>4</a:t>
+                      </a:r>
+                    </a:p>
+                  </a:txBody>
+                  <a:tcPr/>
+                </a:tc>
+                <a:tc>
+                  <a:txBody>
+                    <a:bodyPr/>
+                    <a:lstStyle/>
+                    <a:p>
+                      <a:r>
+                        <a:rPr lang="en-US" dirty="0"/>
+                        <a:t>Busia</a:t>
+                      </a:r>
+                    </a:p>
+                  </a:txBody>
+                  <a:tcPr/>
+                </a:tc>
+                <a:extLst>
+                  <a:ext uri="{0D108BD9-81ED-4DB2-BD59-A6C34878D82A}">
+                    <a16:rowId xmlns:a16="http://schemas.microsoft.com/office/drawing/2014/main" val="1151712161"/>
+                  </a:ext>
+                </a:extLst>
+              </a:tr>
+            </a:tbl>
+          </a:graphicData>
+        </a:graphic>
+      </p:graphicFrame>
+      <p:sp>
+        <p:nvSpPr>
+          <p:cNvPr id="12" name="TextBox 11">
+            <a:extLst>
+              <a:ext uri="{FF2B5EF4-FFF2-40B4-BE49-F238E27FC236}">
+                <a16:creationId xmlns:a16="http://schemas.microsoft.com/office/drawing/2014/main" id="{FC6DC9A1-82C1-994A-813A-5A2658AACA26}"/>
+              </a:ext>
+            </a:extLst>
+          </p:cNvPr>
+          <p:cNvSpPr txBox="1"/>
+          <p:nvPr/>
+        </p:nvSpPr>
+        <p:spPr>
+          <a:xfrm>
+            <a:off x="9163215" y="482158"/>
+            <a:ext cx="1108966" cy="584775"/>
+          </a:xfrm>
+          <a:prstGeom prst="rect">
+            <a:avLst/>
+          </a:prstGeom>
+          <a:noFill/>
+        </p:spPr>
+        <p:txBody>
+          <a:bodyPr wrap="square" rtlCol="0">
+            <a:spAutoFit/>
+          </a:bodyPr>
+          <a:lstStyle/>
+          <a:p>
+            <a:pPr algn="ctr"/>
+            <a:r>
+              <a:rPr lang="en-US" sz="3200" b="1" dirty="0" err="1"/>
+              <a:t>ngos</a:t>
+            </a:r>
+            <a:endParaRPr lang="en-US" sz="3200" b="1" dirty="0"/>
+          </a:p>
+        </p:txBody>
+      </p:sp>
+      <p:sp>
+        <p:nvSpPr>
+          <p:cNvPr id="13" name="TextBox 12">
+            <a:extLst>
+              <a:ext uri="{FF2B5EF4-FFF2-40B4-BE49-F238E27FC236}">
+                <a16:creationId xmlns:a16="http://schemas.microsoft.com/office/drawing/2014/main" id="{28DCB725-B7B2-3445-A932-CECF62483DE8}"/>
+              </a:ext>
+            </a:extLst>
+          </p:cNvPr>
+          <p:cNvSpPr txBox="1"/>
+          <p:nvPr/>
+        </p:nvSpPr>
+        <p:spPr>
+          <a:xfrm>
+            <a:off x="1242533" y="482158"/>
+            <a:ext cx="1624804" cy="584775"/>
+          </a:xfrm>
+          <a:prstGeom prst="rect">
+            <a:avLst/>
+          </a:prstGeom>
+          <a:noFill/>
+        </p:spPr>
+        <p:txBody>
+          <a:bodyPr wrap="none" rtlCol="0">
+            <a:spAutoFit/>
+          </a:bodyPr>
+          <a:lstStyle/>
+          <a:p>
+            <a:pPr algn="ctr"/>
+            <a:r>
+              <a:rPr lang="en-US" sz="3200" b="1" dirty="0"/>
+              <a:t>counties</a:t>
+            </a:r>
+          </a:p>
+        </p:txBody>
+      </p:sp>
+      <p:graphicFrame>
+        <p:nvGraphicFramePr>
+          <p:cNvPr id="6" name="Table 5">
+            <a:extLst>
+              <a:ext uri="{FF2B5EF4-FFF2-40B4-BE49-F238E27FC236}">
+                <a16:creationId xmlns:a16="http://schemas.microsoft.com/office/drawing/2014/main" id="{748A1390-6088-E94C-B1C5-B31B86638A9F}"/>
+              </a:ext>
+            </a:extLst>
+          </p:cNvPr>
+          <p:cNvGraphicFramePr>
+            <a:graphicFrameLocks noGrp="1"/>
+          </p:cNvGraphicFramePr>
+          <p:nvPr>
+            <p:extLst>
+              <p:ext uri="{D42A27DB-BD31-4B8C-83A1-F6EECF244321}">
+                <p14:modId xmlns:p14="http://schemas.microsoft.com/office/powerpoint/2010/main" val="3497329432"/>
+              </p:ext>
+            </p:extLst>
+          </p:nvPr>
+        </p:nvGraphicFramePr>
+        <p:xfrm>
+          <a:off x="4675456" y="1284479"/>
+          <a:ext cx="2421722" cy="4950621"/>
+        </p:xfrm>
+        <a:graphic>
+          <a:graphicData uri="http://schemas.openxmlformats.org/drawingml/2006/table">
+            <a:tbl>
+              <a:tblPr firstRow="1" bandRow="1">
+                <a:tableStyleId>{5C22544A-7EE6-4342-B048-85BDC9FD1C3A}</a:tableStyleId>
+              </a:tblPr>
+              <a:tblGrid>
+                <a:gridCol w="1201237">
+                  <a:extLst>
+                    <a:ext uri="{9D8B030D-6E8A-4147-A177-3AD203B41FA5}">
+                      <a16:colId xmlns:a16="http://schemas.microsoft.com/office/drawing/2014/main" val="1814196662"/>
+                    </a:ext>
+                  </a:extLst>
+                </a:gridCol>
+                <a:gridCol w="1220485">
+                  <a:extLst>
+                    <a:ext uri="{9D8B030D-6E8A-4147-A177-3AD203B41FA5}">
+                      <a16:colId xmlns:a16="http://schemas.microsoft.com/office/drawing/2014/main" val="254236435"/>
+                    </a:ext>
+                  </a:extLst>
+                </a:gridCol>
+              </a:tblGrid>
+              <a:tr h="550069">
+                <a:tc>
+                  <a:txBody>
+                    <a:bodyPr/>
+                    <a:lstStyle/>
+                    <a:p>
+                      <a:r>
+                        <a:rPr lang="en-US" dirty="0" err="1"/>
+                        <a:t>county_id</a:t>
+                      </a:r>
+                      <a:endParaRPr lang="en-US" dirty="0"/>
+                    </a:p>
+                  </a:txBody>
+                  <a:tcPr/>
+                </a:tc>
+                <a:tc>
+                  <a:txBody>
+                    <a:bodyPr/>
+                    <a:lstStyle/>
+                    <a:p>
+                      <a:r>
+                        <a:rPr lang="en-US" dirty="0" err="1"/>
+                        <a:t>ngo_id</a:t>
+                      </a:r>
+                      <a:endParaRPr lang="en-US" dirty="0"/>
+                    </a:p>
+                  </a:txBody>
+                  <a:tcPr/>
+                </a:tc>
+                <a:extLst>
+                  <a:ext uri="{0D108BD9-81ED-4DB2-BD59-A6C34878D82A}">
+                    <a16:rowId xmlns:a16="http://schemas.microsoft.com/office/drawing/2014/main" val="3375024876"/>
+                  </a:ext>
+                </a:extLst>
+              </a:tr>
+              <a:tr h="550069">
+                <a:tc>
+                  <a:txBody>
+                    <a:bodyPr/>
+                    <a:lstStyle/>
+                    <a:p>
+                      <a:r>
+                        <a:rPr lang="en-US" dirty="0"/>
+                        <a:t>1</a:t>
+                      </a:r>
+                    </a:p>
+                  </a:txBody>
+                  <a:tcPr/>
+                </a:tc>
+                <a:tc>
+                  <a:txBody>
+                    <a:bodyPr/>
+                    <a:lstStyle/>
+                    <a:p>
+                      <a:r>
+                        <a:rPr lang="en-US" dirty="0"/>
+                        <a:t>1</a:t>
+                      </a:r>
+                    </a:p>
+                  </a:txBody>
+                  <a:tcPr/>
+                </a:tc>
+                <a:extLst>
+                  <a:ext uri="{0D108BD9-81ED-4DB2-BD59-A6C34878D82A}">
+                    <a16:rowId xmlns:a16="http://schemas.microsoft.com/office/drawing/2014/main" val="1096633820"/>
+                  </a:ext>
+                </a:extLst>
+              </a:tr>
+              <a:tr h="550069">
+                <a:tc>
+                  <a:txBody>
+                    <a:bodyPr/>
+                    <a:lstStyle/>
+                    <a:p>
+                      <a:r>
+                        <a:rPr lang="en-US" dirty="0"/>
+                        <a:t>1</a:t>
+                      </a:r>
+                    </a:p>
+                  </a:txBody>
+                  <a:tcPr/>
+                </a:tc>
+                <a:tc>
+                  <a:txBody>
+                    <a:bodyPr/>
+                    <a:lstStyle/>
+                    <a:p>
+                      <a:r>
+                        <a:rPr lang="en-US" dirty="0"/>
+                        <a:t>3</a:t>
+                      </a:r>
+                    </a:p>
+                  </a:txBody>
+                  <a:tcPr/>
+                </a:tc>
+                <a:extLst>
+                  <a:ext uri="{0D108BD9-81ED-4DB2-BD59-A6C34878D82A}">
+                    <a16:rowId xmlns:a16="http://schemas.microsoft.com/office/drawing/2014/main" val="2502785895"/>
+                  </a:ext>
+                </a:extLst>
+              </a:tr>
+              <a:tr h="550069">
+                <a:tc>
+                  <a:txBody>
+                    <a:bodyPr/>
+                    <a:lstStyle/>
+                    <a:p>
+                      <a:r>
+                        <a:rPr lang="en-US" dirty="0"/>
+                        <a:t>1</a:t>
+                      </a:r>
+                    </a:p>
+                  </a:txBody>
+                  <a:tcPr/>
+                </a:tc>
+                <a:tc>
+                  <a:txBody>
+                    <a:bodyPr/>
+                    <a:lstStyle/>
+                    <a:p>
+                      <a:r>
+                        <a:rPr lang="en-US" dirty="0"/>
+                        <a:t>4</a:t>
+                      </a:r>
+                    </a:p>
+                  </a:txBody>
+                  <a:tcPr/>
+                </a:tc>
+                <a:extLst>
+                  <a:ext uri="{0D108BD9-81ED-4DB2-BD59-A6C34878D82A}">
+                    <a16:rowId xmlns:a16="http://schemas.microsoft.com/office/drawing/2014/main" val="3585364205"/>
+                  </a:ext>
+                </a:extLst>
+              </a:tr>
+              <a:tr h="550069">
+                <a:tc>
+                  <a:txBody>
+                    <a:bodyPr/>
+                    <a:lstStyle/>
+                    <a:p>
+                      <a:r>
+                        <a:rPr lang="en-US" dirty="0"/>
+                        <a:t>2</a:t>
+                      </a:r>
+                    </a:p>
+                  </a:txBody>
+                  <a:tcPr/>
+                </a:tc>
+                <a:tc>
+                  <a:txBody>
+                    <a:bodyPr/>
+                    <a:lstStyle/>
+                    <a:p>
+                      <a:r>
+                        <a:rPr lang="en-US" dirty="0"/>
+                        <a:t>1</a:t>
+                      </a:r>
+                    </a:p>
+                  </a:txBody>
+                  <a:tcPr/>
+                </a:tc>
+                <a:extLst>
+                  <a:ext uri="{0D108BD9-81ED-4DB2-BD59-A6C34878D82A}">
+                    <a16:rowId xmlns:a16="http://schemas.microsoft.com/office/drawing/2014/main" val="1151712161"/>
+                  </a:ext>
+                </a:extLst>
+              </a:tr>
+              <a:tr h="550069">
+                <a:tc>
+                  <a:txBody>
+                    <a:bodyPr/>
+                    <a:lstStyle/>
+                    <a:p>
+                      <a:r>
+                        <a:rPr lang="en-US" dirty="0"/>
+                        <a:t>3</a:t>
+                      </a:r>
+                    </a:p>
+                  </a:txBody>
+                  <a:tcPr/>
+                </a:tc>
+                <a:tc>
+                  <a:txBody>
+                    <a:bodyPr/>
+                    <a:lstStyle/>
+                    <a:p>
+                      <a:r>
+                        <a:rPr lang="en-US" dirty="0"/>
+                        <a:t>2</a:t>
+                      </a:r>
+                    </a:p>
+                  </a:txBody>
+                  <a:tcPr/>
+                </a:tc>
+                <a:extLst>
+                  <a:ext uri="{0D108BD9-81ED-4DB2-BD59-A6C34878D82A}">
+                    <a16:rowId xmlns:a16="http://schemas.microsoft.com/office/drawing/2014/main" val="1840405720"/>
+                  </a:ext>
+                </a:extLst>
+              </a:tr>
+              <a:tr h="550069">
+                <a:tc>
+                  <a:txBody>
+                    <a:bodyPr/>
+                    <a:lstStyle/>
+                    <a:p>
+                      <a:r>
+                        <a:rPr lang="en-US" dirty="0"/>
+                        <a:t>3</a:t>
+                      </a:r>
+                    </a:p>
+                  </a:txBody>
+                  <a:tcPr/>
+                </a:tc>
+                <a:tc>
+                  <a:txBody>
+                    <a:bodyPr/>
+                    <a:lstStyle/>
+                    <a:p>
+                      <a:r>
+                        <a:rPr lang="en-US" dirty="0"/>
+                        <a:t>3</a:t>
+                      </a:r>
+                    </a:p>
+                  </a:txBody>
+                  <a:tcPr/>
+                </a:tc>
+                <a:extLst>
+                  <a:ext uri="{0D108BD9-81ED-4DB2-BD59-A6C34878D82A}">
+                    <a16:rowId xmlns:a16="http://schemas.microsoft.com/office/drawing/2014/main" val="1653717787"/>
+                  </a:ext>
+                </a:extLst>
+              </a:tr>
+              <a:tr h="550069">
+                <a:tc>
+                  <a:txBody>
+                    <a:bodyPr/>
+                    <a:lstStyle/>
+                    <a:p>
+                      <a:r>
+                        <a:rPr lang="en-US" dirty="0"/>
+                        <a:t>4</a:t>
+                      </a:r>
+                    </a:p>
+                  </a:txBody>
+                  <a:tcPr/>
+                </a:tc>
+                <a:tc>
+                  <a:txBody>
+                    <a:bodyPr/>
+                    <a:lstStyle/>
+                    <a:p>
+                      <a:r>
+                        <a:rPr lang="en-US" dirty="0"/>
+                        <a:t>2</a:t>
+                      </a:r>
+                    </a:p>
+                  </a:txBody>
+                  <a:tcPr/>
+                </a:tc>
+                <a:extLst>
+                  <a:ext uri="{0D108BD9-81ED-4DB2-BD59-A6C34878D82A}">
+                    <a16:rowId xmlns:a16="http://schemas.microsoft.com/office/drawing/2014/main" val="922176178"/>
+                  </a:ext>
+                </a:extLst>
+              </a:tr>
+              <a:tr h="550069">
+                <a:tc>
+                  <a:txBody>
+                    <a:bodyPr/>
+                    <a:lstStyle/>
+                    <a:p>
+                      <a:r>
+                        <a:rPr lang="en-US" dirty="0"/>
+                        <a:t>4</a:t>
+                      </a:r>
+                    </a:p>
+                  </a:txBody>
+                  <a:tcPr/>
+                </a:tc>
+                <a:tc>
+                  <a:txBody>
+                    <a:bodyPr/>
+                    <a:lstStyle/>
+                    <a:p>
+                      <a:r>
+                        <a:rPr lang="en-US" dirty="0"/>
+                        <a:t>3</a:t>
+                      </a:r>
+                    </a:p>
+                  </a:txBody>
+                  <a:tcPr/>
+                </a:tc>
+                <a:extLst>
+                  <a:ext uri="{0D108BD9-81ED-4DB2-BD59-A6C34878D82A}">
+                    <a16:rowId xmlns:a16="http://schemas.microsoft.com/office/drawing/2014/main" val="1896029795"/>
+                  </a:ext>
+                </a:extLst>
+              </a:tr>
+            </a:tbl>
+          </a:graphicData>
+        </a:graphic>
+      </p:graphicFrame>
+      <p:sp>
+        <p:nvSpPr>
+          <p:cNvPr id="7" name="TextBox 6">
+            <a:extLst>
+              <a:ext uri="{FF2B5EF4-FFF2-40B4-BE49-F238E27FC236}">
+                <a16:creationId xmlns:a16="http://schemas.microsoft.com/office/drawing/2014/main" id="{BA239142-9089-9C42-996E-B14C56B3589D}"/>
+              </a:ext>
+            </a:extLst>
+          </p:cNvPr>
+          <p:cNvSpPr txBox="1"/>
+          <p:nvPr/>
+        </p:nvSpPr>
+        <p:spPr>
+          <a:xfrm>
+            <a:off x="4464463" y="458528"/>
+            <a:ext cx="2786981" cy="461665"/>
+          </a:xfrm>
+          <a:prstGeom prst="rect">
+            <a:avLst/>
+          </a:prstGeom>
+          <a:noFill/>
+        </p:spPr>
+        <p:txBody>
+          <a:bodyPr wrap="none" rtlCol="0">
+            <a:spAutoFit/>
+          </a:bodyPr>
+          <a:lstStyle/>
+          <a:p>
+            <a:pPr algn="ctr"/>
+            <a:r>
+              <a:rPr lang="en-US" sz="2400" b="1" dirty="0"/>
+              <a:t>_</a:t>
+            </a:r>
+            <a:r>
+              <a:rPr lang="en-US" sz="2400" b="1" dirty="0" err="1"/>
+              <a:t>link_counties_ngos</a:t>
+            </a:r>
+            <a:endParaRPr lang="en-US" sz="2400" b="1" dirty="0"/>
+          </a:p>
+        </p:txBody>
+      </p:sp>
+    </p:spTree>
+    <p:extLst>
+      <p:ext uri="{BB962C8B-B14F-4D97-AF65-F5344CB8AC3E}">
+        <p14:creationId xmlns:p14="http://schemas.microsoft.com/office/powerpoint/2010/main" val="3806020080"/>
+      </p:ext>
+    </p:extLst>
+  </p:cSld>
+  <p:clrMapOvr>
+    <a:masterClrMapping/>
+  </p:clrMapOvr>
+</p:sld>
+</file>
+
 <file path=ppt/theme/theme1.xml><?xml version="1.0" encoding="utf-8"?>
 <a:theme xmlns:a="http://schemas.openxmlformats.org/drawingml/2006/main" name="Office Theme">
   <a:themeElements>

</xml_diff>

<commit_message>
working on tools docs
</commit_message>
<xml_diff>
--- a/assets/images/relationships/source-tables.pptx
+++ b/assets/images/relationships/source-tables.pptx
@@ -4,8 +4,15 @@
   <p:sldMasterIdLst>
     <p:sldMasterId id="2147483648" r:id="rId1"/>
   </p:sldMasterIdLst>
+  <p:notesMasterIdLst>
+    <p:notesMasterId r:id="rId7"/>
+  </p:notesMasterIdLst>
   <p:sldIdLst>
     <p:sldId id="256" r:id="rId2"/>
+    <p:sldId id="257" r:id="rId3"/>
+    <p:sldId id="258" r:id="rId4"/>
+    <p:sldId id="259" r:id="rId5"/>
+    <p:sldId id="260" r:id="rId6"/>
   </p:sldIdLst>
   <p:sldSz cx="12192000" cy="6858000"/>
   <p:notesSz cx="6858000" cy="9144000"/>
@@ -104,7 +111,361 @@
       </a:defRPr>
     </a:lvl9pPr>
   </p:defaultTextStyle>
+  <p:extLst>
+    <p:ext uri="{EFAFB233-063F-42B5-8137-9DF3F51BA10A}">
+      <p15:sldGuideLst xmlns:p15="http://schemas.microsoft.com/office/powerpoint/2012/main"/>
+    </p:ext>
+  </p:extLst>
 </p:presentation>
+</file>
+
+<file path=ppt/notesMasters/notesMaster1.xml><?xml version="1.0" encoding="utf-8"?>
+<p:notesMaster xmlns:a="http://schemas.openxmlformats.org/drawingml/2006/main" xmlns:r="http://schemas.openxmlformats.org/officeDocument/2006/relationships" xmlns:p="http://schemas.openxmlformats.org/presentationml/2006/main">
+  <p:cSld>
+    <p:bg>
+      <p:bgRef idx="1001">
+        <a:schemeClr val="bg1"/>
+      </p:bgRef>
+    </p:bg>
+    <p:spTree>
+      <p:nvGrpSpPr>
+        <p:cNvPr id="1" name=""/>
+        <p:cNvGrpSpPr/>
+        <p:nvPr/>
+      </p:nvGrpSpPr>
+      <p:grpSpPr>
+        <a:xfrm>
+          <a:off x="0" y="0"/>
+          <a:ext cx="0" cy="0"/>
+          <a:chOff x="0" y="0"/>
+          <a:chExt cx="0" cy="0"/>
+        </a:xfrm>
+      </p:grpSpPr>
+      <p:sp>
+        <p:nvSpPr>
+          <p:cNvPr id="2" name="Header Placeholder 1"/>
+          <p:cNvSpPr>
+            <a:spLocks noGrp="1"/>
+          </p:cNvSpPr>
+          <p:nvPr>
+            <p:ph type="hdr" sz="quarter"/>
+          </p:nvPr>
+        </p:nvSpPr>
+        <p:spPr>
+          <a:xfrm>
+            <a:off x="0" y="0"/>
+            <a:ext cx="2971800" cy="458788"/>
+          </a:xfrm>
+          <a:prstGeom prst="rect">
+            <a:avLst/>
+          </a:prstGeom>
+        </p:spPr>
+        <p:txBody>
+          <a:bodyPr vert="horz" lIns="91440" tIns="45720" rIns="91440" bIns="45720" rtlCol="0"/>
+          <a:lstStyle>
+            <a:lvl1pPr algn="l">
+              <a:defRPr sz="1200"/>
+            </a:lvl1pPr>
+          </a:lstStyle>
+          <a:p>
+            <a:endParaRPr lang="en-US"/>
+          </a:p>
+        </p:txBody>
+      </p:sp>
+      <p:sp>
+        <p:nvSpPr>
+          <p:cNvPr id="3" name="Date Placeholder 2"/>
+          <p:cNvSpPr>
+            <a:spLocks noGrp="1"/>
+          </p:cNvSpPr>
+          <p:nvPr>
+            <p:ph type="dt" idx="1"/>
+          </p:nvPr>
+        </p:nvSpPr>
+        <p:spPr>
+          <a:xfrm>
+            <a:off x="3884613" y="0"/>
+            <a:ext cx="2971800" cy="458788"/>
+          </a:xfrm>
+          <a:prstGeom prst="rect">
+            <a:avLst/>
+          </a:prstGeom>
+        </p:spPr>
+        <p:txBody>
+          <a:bodyPr vert="horz" lIns="91440" tIns="45720" rIns="91440" bIns="45720" rtlCol="0"/>
+          <a:lstStyle>
+            <a:lvl1pPr algn="r">
+              <a:defRPr sz="1200"/>
+            </a:lvl1pPr>
+          </a:lstStyle>
+          <a:p>
+            <a:fld id="{902A7928-894E-3547-8FB1-C583C8C21EEE}" type="datetimeFigureOut">
+              <a:rPr lang="en-US" smtClean="0"/>
+              <a:t>1/22/19</a:t>
+            </a:fld>
+            <a:endParaRPr lang="en-US"/>
+          </a:p>
+        </p:txBody>
+      </p:sp>
+      <p:sp>
+        <p:nvSpPr>
+          <p:cNvPr id="4" name="Slide Image Placeholder 3"/>
+          <p:cNvSpPr>
+            <a:spLocks noGrp="1" noRot="1" noChangeAspect="1"/>
+          </p:cNvSpPr>
+          <p:nvPr>
+            <p:ph type="sldImg" idx="2"/>
+          </p:nvPr>
+        </p:nvSpPr>
+        <p:spPr>
+          <a:xfrm>
+            <a:off x="685800" y="1143000"/>
+            <a:ext cx="5486400" cy="3086100"/>
+          </a:xfrm>
+          <a:prstGeom prst="rect">
+            <a:avLst/>
+          </a:prstGeom>
+          <a:noFill/>
+          <a:ln w="12700">
+            <a:solidFill>
+              <a:prstClr val="black"/>
+            </a:solidFill>
+          </a:ln>
+        </p:spPr>
+        <p:txBody>
+          <a:bodyPr vert="horz" lIns="91440" tIns="45720" rIns="91440" bIns="45720" rtlCol="0" anchor="ctr"/>
+          <a:lstStyle/>
+          <a:p>
+            <a:endParaRPr lang="en-US"/>
+          </a:p>
+        </p:txBody>
+      </p:sp>
+      <p:sp>
+        <p:nvSpPr>
+          <p:cNvPr id="5" name="Notes Placeholder 4"/>
+          <p:cNvSpPr>
+            <a:spLocks noGrp="1"/>
+          </p:cNvSpPr>
+          <p:nvPr>
+            <p:ph type="body" sz="quarter" idx="3"/>
+          </p:nvPr>
+        </p:nvSpPr>
+        <p:spPr>
+          <a:xfrm>
+            <a:off x="685800" y="4400550"/>
+            <a:ext cx="5486400" cy="3600450"/>
+          </a:xfrm>
+          <a:prstGeom prst="rect">
+            <a:avLst/>
+          </a:prstGeom>
+        </p:spPr>
+        <p:txBody>
+          <a:bodyPr vert="horz" lIns="91440" tIns="45720" rIns="91440" bIns="45720" rtlCol="0"/>
+          <a:lstStyle/>
+          <a:p>
+            <a:pPr lvl="0"/>
+            <a:r>
+              <a:rPr lang="en-US"/>
+              <a:t>Edit Master text styles</a:t>
+            </a:r>
+          </a:p>
+          <a:p>
+            <a:pPr lvl="1"/>
+            <a:r>
+              <a:rPr lang="en-US"/>
+              <a:t>Second level</a:t>
+            </a:r>
+          </a:p>
+          <a:p>
+            <a:pPr lvl="2"/>
+            <a:r>
+              <a:rPr lang="en-US"/>
+              <a:t>Third level</a:t>
+            </a:r>
+          </a:p>
+          <a:p>
+            <a:pPr lvl="3"/>
+            <a:r>
+              <a:rPr lang="en-US"/>
+              <a:t>Fourth level</a:t>
+            </a:r>
+          </a:p>
+          <a:p>
+            <a:pPr lvl="4"/>
+            <a:r>
+              <a:rPr lang="en-US"/>
+              <a:t>Fifth level</a:t>
+            </a:r>
+          </a:p>
+        </p:txBody>
+      </p:sp>
+      <p:sp>
+        <p:nvSpPr>
+          <p:cNvPr id="6" name="Footer Placeholder 5"/>
+          <p:cNvSpPr>
+            <a:spLocks noGrp="1"/>
+          </p:cNvSpPr>
+          <p:nvPr>
+            <p:ph type="ftr" sz="quarter" idx="4"/>
+          </p:nvPr>
+        </p:nvSpPr>
+        <p:spPr>
+          <a:xfrm>
+            <a:off x="0" y="8685213"/>
+            <a:ext cx="2971800" cy="458787"/>
+          </a:xfrm>
+          <a:prstGeom prst="rect">
+            <a:avLst/>
+          </a:prstGeom>
+        </p:spPr>
+        <p:txBody>
+          <a:bodyPr vert="horz" lIns="91440" tIns="45720" rIns="91440" bIns="45720" rtlCol="0" anchor="b"/>
+          <a:lstStyle>
+            <a:lvl1pPr algn="l">
+              <a:defRPr sz="1200"/>
+            </a:lvl1pPr>
+          </a:lstStyle>
+          <a:p>
+            <a:endParaRPr lang="en-US"/>
+          </a:p>
+        </p:txBody>
+      </p:sp>
+      <p:sp>
+        <p:nvSpPr>
+          <p:cNvPr id="7" name="Slide Number Placeholder 6"/>
+          <p:cNvSpPr>
+            <a:spLocks noGrp="1"/>
+          </p:cNvSpPr>
+          <p:nvPr>
+            <p:ph type="sldNum" sz="quarter" idx="5"/>
+          </p:nvPr>
+        </p:nvSpPr>
+        <p:spPr>
+          <a:xfrm>
+            <a:off x="3884613" y="8685213"/>
+            <a:ext cx="2971800" cy="458787"/>
+          </a:xfrm>
+          <a:prstGeom prst="rect">
+            <a:avLst/>
+          </a:prstGeom>
+        </p:spPr>
+        <p:txBody>
+          <a:bodyPr vert="horz" lIns="91440" tIns="45720" rIns="91440" bIns="45720" rtlCol="0" anchor="b"/>
+          <a:lstStyle>
+            <a:lvl1pPr algn="r">
+              <a:defRPr sz="1200"/>
+            </a:lvl1pPr>
+          </a:lstStyle>
+          <a:p>
+            <a:fld id="{563782EC-6D45-5742-8F2F-524637F487D4}" type="slidenum">
+              <a:rPr lang="en-US" smtClean="0"/>
+              <a:t>‹#›</a:t>
+            </a:fld>
+            <a:endParaRPr lang="en-US"/>
+          </a:p>
+        </p:txBody>
+      </p:sp>
+    </p:spTree>
+    <p:extLst>
+      <p:ext uri="{BB962C8B-B14F-4D97-AF65-F5344CB8AC3E}">
+        <p14:creationId xmlns:p14="http://schemas.microsoft.com/office/powerpoint/2010/main" val="3636584173"/>
+      </p:ext>
+    </p:extLst>
+  </p:cSld>
+  <p:clrMap bg1="lt1" tx1="dk1" bg2="lt2" tx2="dk2" accent1="accent1" accent2="accent2" accent3="accent3" accent4="accent4" accent5="accent5" accent6="accent6" hlink="hlink" folHlink="folHlink"/>
+  <p:notesStyle>
+    <a:lvl1pPr marL="0" algn="l" defTabSz="914400" rtl="0" eaLnBrk="1" latinLnBrk="0" hangingPunct="1">
+      <a:defRPr sz="1200" kern="1200">
+        <a:solidFill>
+          <a:schemeClr val="tx1"/>
+        </a:solidFill>
+        <a:latin typeface="+mn-lt"/>
+        <a:ea typeface="+mn-ea"/>
+        <a:cs typeface="+mn-cs"/>
+      </a:defRPr>
+    </a:lvl1pPr>
+    <a:lvl2pPr marL="457200" algn="l" defTabSz="914400" rtl="0" eaLnBrk="1" latinLnBrk="0" hangingPunct="1">
+      <a:defRPr sz="1200" kern="1200">
+        <a:solidFill>
+          <a:schemeClr val="tx1"/>
+        </a:solidFill>
+        <a:latin typeface="+mn-lt"/>
+        <a:ea typeface="+mn-ea"/>
+        <a:cs typeface="+mn-cs"/>
+      </a:defRPr>
+    </a:lvl2pPr>
+    <a:lvl3pPr marL="914400" algn="l" defTabSz="914400" rtl="0" eaLnBrk="1" latinLnBrk="0" hangingPunct="1">
+      <a:defRPr sz="1200" kern="1200">
+        <a:solidFill>
+          <a:schemeClr val="tx1"/>
+        </a:solidFill>
+        <a:latin typeface="+mn-lt"/>
+        <a:ea typeface="+mn-ea"/>
+        <a:cs typeface="+mn-cs"/>
+      </a:defRPr>
+    </a:lvl3pPr>
+    <a:lvl4pPr marL="1371600" algn="l" defTabSz="914400" rtl="0" eaLnBrk="1" latinLnBrk="0" hangingPunct="1">
+      <a:defRPr sz="1200" kern="1200">
+        <a:solidFill>
+          <a:schemeClr val="tx1"/>
+        </a:solidFill>
+        <a:latin typeface="+mn-lt"/>
+        <a:ea typeface="+mn-ea"/>
+        <a:cs typeface="+mn-cs"/>
+      </a:defRPr>
+    </a:lvl4pPr>
+    <a:lvl5pPr marL="1828800" algn="l" defTabSz="914400" rtl="0" eaLnBrk="1" latinLnBrk="0" hangingPunct="1">
+      <a:defRPr sz="1200" kern="1200">
+        <a:solidFill>
+          <a:schemeClr val="tx1"/>
+        </a:solidFill>
+        <a:latin typeface="+mn-lt"/>
+        <a:ea typeface="+mn-ea"/>
+        <a:cs typeface="+mn-cs"/>
+      </a:defRPr>
+    </a:lvl5pPr>
+    <a:lvl6pPr marL="2286000" algn="l" defTabSz="914400" rtl="0" eaLnBrk="1" latinLnBrk="0" hangingPunct="1">
+      <a:defRPr sz="1200" kern="1200">
+        <a:solidFill>
+          <a:schemeClr val="tx1"/>
+        </a:solidFill>
+        <a:latin typeface="+mn-lt"/>
+        <a:ea typeface="+mn-ea"/>
+        <a:cs typeface="+mn-cs"/>
+      </a:defRPr>
+    </a:lvl6pPr>
+    <a:lvl7pPr marL="2743200" algn="l" defTabSz="914400" rtl="0" eaLnBrk="1" latinLnBrk="0" hangingPunct="1">
+      <a:defRPr sz="1200" kern="1200">
+        <a:solidFill>
+          <a:schemeClr val="tx1"/>
+        </a:solidFill>
+        <a:latin typeface="+mn-lt"/>
+        <a:ea typeface="+mn-ea"/>
+        <a:cs typeface="+mn-cs"/>
+      </a:defRPr>
+    </a:lvl7pPr>
+    <a:lvl8pPr marL="3200400" algn="l" defTabSz="914400" rtl="0" eaLnBrk="1" latinLnBrk="0" hangingPunct="1">
+      <a:defRPr sz="1200" kern="1200">
+        <a:solidFill>
+          <a:schemeClr val="tx1"/>
+        </a:solidFill>
+        <a:latin typeface="+mn-lt"/>
+        <a:ea typeface="+mn-ea"/>
+        <a:cs typeface="+mn-cs"/>
+      </a:defRPr>
+    </a:lvl8pPr>
+    <a:lvl9pPr marL="3657600" algn="l" defTabSz="914400" rtl="0" eaLnBrk="1" latinLnBrk="0" hangingPunct="1">
+      <a:defRPr sz="1200" kern="1200">
+        <a:solidFill>
+          <a:schemeClr val="tx1"/>
+        </a:solidFill>
+        <a:latin typeface="+mn-lt"/>
+        <a:ea typeface="+mn-ea"/>
+        <a:cs typeface="+mn-cs"/>
+      </a:defRPr>
+    </a:lvl9pPr>
+  </p:notesStyle>
+</p:notesMaster>
 </file>
 
 <file path=ppt/slideLayouts/slideLayout1.xml><?xml version="1.0" encoding="utf-8"?>
@@ -254,7 +615,7 @@
           <a:p>
             <a:fld id="{07E54A18-6F89-0D4A-BEF0-D4351E72450E}" type="datetimeFigureOut">
               <a:rPr lang="en-US" smtClean="0"/>
-              <a:t>11/22/18</a:t>
+              <a:t>1/22/19</a:t>
             </a:fld>
             <a:endParaRPr lang="en-US"/>
           </a:p>
@@ -452,7 +813,7 @@
           <a:p>
             <a:fld id="{07E54A18-6F89-0D4A-BEF0-D4351E72450E}" type="datetimeFigureOut">
               <a:rPr lang="en-US" smtClean="0"/>
-              <a:t>11/22/18</a:t>
+              <a:t>1/22/19</a:t>
             </a:fld>
             <a:endParaRPr lang="en-US"/>
           </a:p>
@@ -660,7 +1021,7 @@
           <a:p>
             <a:fld id="{07E54A18-6F89-0D4A-BEF0-D4351E72450E}" type="datetimeFigureOut">
               <a:rPr lang="en-US" smtClean="0"/>
-              <a:t>11/22/18</a:t>
+              <a:t>1/22/19</a:t>
             </a:fld>
             <a:endParaRPr lang="en-US"/>
           </a:p>
@@ -858,7 +1219,7 @@
           <a:p>
             <a:fld id="{07E54A18-6F89-0D4A-BEF0-D4351E72450E}" type="datetimeFigureOut">
               <a:rPr lang="en-US" smtClean="0"/>
-              <a:t>11/22/18</a:t>
+              <a:t>1/22/19</a:t>
             </a:fld>
             <a:endParaRPr lang="en-US"/>
           </a:p>
@@ -1133,7 +1494,7 @@
           <a:p>
             <a:fld id="{07E54A18-6F89-0D4A-BEF0-D4351E72450E}" type="datetimeFigureOut">
               <a:rPr lang="en-US" smtClean="0"/>
-              <a:t>11/22/18</a:t>
+              <a:t>1/22/19</a:t>
             </a:fld>
             <a:endParaRPr lang="en-US"/>
           </a:p>
@@ -1398,7 +1759,7 @@
           <a:p>
             <a:fld id="{07E54A18-6F89-0D4A-BEF0-D4351E72450E}" type="datetimeFigureOut">
               <a:rPr lang="en-US" smtClean="0"/>
-              <a:t>11/22/18</a:t>
+              <a:t>1/22/19</a:t>
             </a:fld>
             <a:endParaRPr lang="en-US"/>
           </a:p>
@@ -1810,7 +2171,7 @@
           <a:p>
             <a:fld id="{07E54A18-6F89-0D4A-BEF0-D4351E72450E}" type="datetimeFigureOut">
               <a:rPr lang="en-US" smtClean="0"/>
-              <a:t>11/22/18</a:t>
+              <a:t>1/22/19</a:t>
             </a:fld>
             <a:endParaRPr lang="en-US"/>
           </a:p>
@@ -1951,7 +2312,7 @@
           <a:p>
             <a:fld id="{07E54A18-6F89-0D4A-BEF0-D4351E72450E}" type="datetimeFigureOut">
               <a:rPr lang="en-US" smtClean="0"/>
-              <a:t>11/22/18</a:t>
+              <a:t>1/22/19</a:t>
             </a:fld>
             <a:endParaRPr lang="en-US"/>
           </a:p>
@@ -2064,7 +2425,7 @@
           <a:p>
             <a:fld id="{07E54A18-6F89-0D4A-BEF0-D4351E72450E}" type="datetimeFigureOut">
               <a:rPr lang="en-US" smtClean="0"/>
-              <a:t>11/22/18</a:t>
+              <a:t>1/22/19</a:t>
             </a:fld>
             <a:endParaRPr lang="en-US"/>
           </a:p>
@@ -2375,7 +2736,7 @@
           <a:p>
             <a:fld id="{07E54A18-6F89-0D4A-BEF0-D4351E72450E}" type="datetimeFigureOut">
               <a:rPr lang="en-US" smtClean="0"/>
-              <a:t>11/22/18</a:t>
+              <a:t>1/22/19</a:t>
             </a:fld>
             <a:endParaRPr lang="en-US"/>
           </a:p>
@@ -2663,7 +3024,7 @@
           <a:p>
             <a:fld id="{07E54A18-6F89-0D4A-BEF0-D4351E72450E}" type="datetimeFigureOut">
               <a:rPr lang="en-US" smtClean="0"/>
-              <a:t>11/22/18</a:t>
+              <a:t>1/22/19</a:t>
             </a:fld>
             <a:endParaRPr lang="en-US"/>
           </a:p>
@@ -2904,7 +3265,7 @@
           <a:p>
             <a:fld id="{07E54A18-6F89-0D4A-BEF0-D4351E72450E}" type="datetimeFigureOut">
               <a:rPr lang="en-US" smtClean="0"/>
-              <a:t>11/22/18</a:t>
+              <a:t>1/22/19</a:t>
             </a:fld>
             <a:endParaRPr lang="en-US"/>
           </a:p>
@@ -4051,6 +4412,3205 @@
 </p:sld>
 </file>
 
+<file path=ppt/slides/slide2.xml><?xml version="1.0" encoding="utf-8"?>
+<p:sld xmlns:a="http://schemas.openxmlformats.org/drawingml/2006/main" xmlns:r="http://schemas.openxmlformats.org/officeDocument/2006/relationships" xmlns:p="http://schemas.openxmlformats.org/presentationml/2006/main">
+  <p:cSld>
+    <p:spTree>
+      <p:nvGrpSpPr>
+        <p:cNvPr id="1" name=""/>
+        <p:cNvGrpSpPr/>
+        <p:nvPr/>
+      </p:nvGrpSpPr>
+      <p:grpSpPr>
+        <a:xfrm>
+          <a:off x="0" y="0"/>
+          <a:ext cx="0" cy="0"/>
+          <a:chOff x="0" y="0"/>
+          <a:chExt cx="0" cy="0"/>
+        </a:xfrm>
+      </p:grpSpPr>
+      <p:graphicFrame>
+        <p:nvGraphicFramePr>
+          <p:cNvPr id="10" name="Table 9">
+            <a:extLst>
+              <a:ext uri="{FF2B5EF4-FFF2-40B4-BE49-F238E27FC236}">
+                <a16:creationId xmlns:a16="http://schemas.microsoft.com/office/drawing/2014/main" id="{799EA228-3090-514D-B56C-1EA6BBBFF0DC}"/>
+              </a:ext>
+            </a:extLst>
+          </p:cNvPr>
+          <p:cNvGraphicFramePr>
+            <a:graphicFrameLocks noGrp="1"/>
+          </p:cNvGraphicFramePr>
+          <p:nvPr/>
+        </p:nvGraphicFramePr>
+        <p:xfrm>
+          <a:off x="1579418" y="1228723"/>
+          <a:ext cx="2364993" cy="4400552"/>
+        </p:xfrm>
+        <a:graphic>
+          <a:graphicData uri="http://schemas.openxmlformats.org/drawingml/2006/table">
+            <a:tbl>
+              <a:tblPr firstRow="1" bandRow="1">
+                <a:tableStyleId>{5C22544A-7EE6-4342-B048-85BDC9FD1C3A}</a:tableStyleId>
+              </a:tblPr>
+              <a:tblGrid>
+                <a:gridCol w="1116688">
+                  <a:extLst>
+                    <a:ext uri="{9D8B030D-6E8A-4147-A177-3AD203B41FA5}">
+                      <a16:colId xmlns:a16="http://schemas.microsoft.com/office/drawing/2014/main" val="1814196662"/>
+                    </a:ext>
+                  </a:extLst>
+                </a:gridCol>
+                <a:gridCol w="1248305">
+                  <a:extLst>
+                    <a:ext uri="{9D8B030D-6E8A-4147-A177-3AD203B41FA5}">
+                      <a16:colId xmlns:a16="http://schemas.microsoft.com/office/drawing/2014/main" val="254236435"/>
+                    </a:ext>
+                  </a:extLst>
+                </a:gridCol>
+              </a:tblGrid>
+              <a:tr h="550069">
+                <a:tc>
+                  <a:txBody>
+                    <a:bodyPr/>
+                    <a:lstStyle/>
+                    <a:p>
+                      <a:r>
+                        <a:rPr lang="en-US" dirty="0"/>
+                        <a:t>id</a:t>
+                      </a:r>
+                    </a:p>
+                  </a:txBody>
+                  <a:tcPr/>
+                </a:tc>
+                <a:tc>
+                  <a:txBody>
+                    <a:bodyPr/>
+                    <a:lstStyle/>
+                    <a:p>
+                      <a:r>
+                        <a:rPr lang="en-US" dirty="0"/>
+                        <a:t>name</a:t>
+                      </a:r>
+                    </a:p>
+                  </a:txBody>
+                  <a:tcPr/>
+                </a:tc>
+                <a:extLst>
+                  <a:ext uri="{0D108BD9-81ED-4DB2-BD59-A6C34878D82A}">
+                    <a16:rowId xmlns:a16="http://schemas.microsoft.com/office/drawing/2014/main" val="3375024876"/>
+                  </a:ext>
+                </a:extLst>
+              </a:tr>
+              <a:tr h="550069">
+                <a:tc>
+                  <a:txBody>
+                    <a:bodyPr/>
+                    <a:lstStyle/>
+                    <a:p>
+                      <a:r>
+                        <a:rPr lang="en-US" dirty="0"/>
+                        <a:t>1</a:t>
+                      </a:r>
+                    </a:p>
+                  </a:txBody>
+                  <a:tcPr/>
+                </a:tc>
+                <a:tc>
+                  <a:txBody>
+                    <a:bodyPr/>
+                    <a:lstStyle/>
+                    <a:p>
+                      <a:r>
+                        <a:rPr lang="en-US" dirty="0"/>
+                        <a:t>Mary</a:t>
+                      </a:r>
+                    </a:p>
+                  </a:txBody>
+                  <a:tcPr/>
+                </a:tc>
+                <a:extLst>
+                  <a:ext uri="{0D108BD9-81ED-4DB2-BD59-A6C34878D82A}">
+                    <a16:rowId xmlns:a16="http://schemas.microsoft.com/office/drawing/2014/main" val="1096633820"/>
+                  </a:ext>
+                </a:extLst>
+              </a:tr>
+              <a:tr h="550069">
+                <a:tc>
+                  <a:txBody>
+                    <a:bodyPr/>
+                    <a:lstStyle/>
+                    <a:p>
+                      <a:r>
+                        <a:rPr lang="en-US" dirty="0"/>
+                        <a:t>2</a:t>
+                      </a:r>
+                    </a:p>
+                  </a:txBody>
+                  <a:tcPr/>
+                </a:tc>
+                <a:tc>
+                  <a:txBody>
+                    <a:bodyPr/>
+                    <a:lstStyle/>
+                    <a:p>
+                      <a:r>
+                        <a:rPr lang="en-US" dirty="0"/>
+                        <a:t>Jane</a:t>
+                      </a:r>
+                    </a:p>
+                  </a:txBody>
+                  <a:tcPr/>
+                </a:tc>
+                <a:extLst>
+                  <a:ext uri="{0D108BD9-81ED-4DB2-BD59-A6C34878D82A}">
+                    <a16:rowId xmlns:a16="http://schemas.microsoft.com/office/drawing/2014/main" val="2502785895"/>
+                  </a:ext>
+                </a:extLst>
+              </a:tr>
+              <a:tr h="550069">
+                <a:tc>
+                  <a:txBody>
+                    <a:bodyPr/>
+                    <a:lstStyle/>
+                    <a:p>
+                      <a:r>
+                        <a:rPr lang="en-US" dirty="0"/>
+                        <a:t>3</a:t>
+                      </a:r>
+                    </a:p>
+                  </a:txBody>
+                  <a:tcPr/>
+                </a:tc>
+                <a:tc>
+                  <a:txBody>
+                    <a:bodyPr/>
+                    <a:lstStyle/>
+                    <a:p>
+                      <a:r>
+                        <a:rPr lang="en-US" dirty="0"/>
+                        <a:t>Mark</a:t>
+                      </a:r>
+                    </a:p>
+                  </a:txBody>
+                  <a:tcPr/>
+                </a:tc>
+                <a:extLst>
+                  <a:ext uri="{0D108BD9-81ED-4DB2-BD59-A6C34878D82A}">
+                    <a16:rowId xmlns:a16="http://schemas.microsoft.com/office/drawing/2014/main" val="3585364205"/>
+                  </a:ext>
+                </a:extLst>
+              </a:tr>
+              <a:tr h="550069">
+                <a:tc>
+                  <a:txBody>
+                    <a:bodyPr/>
+                    <a:lstStyle/>
+                    <a:p>
+                      <a:r>
+                        <a:rPr lang="en-US" dirty="0"/>
+                        <a:t>4</a:t>
+                      </a:r>
+                    </a:p>
+                  </a:txBody>
+                  <a:tcPr/>
+                </a:tc>
+                <a:tc>
+                  <a:txBody>
+                    <a:bodyPr/>
+                    <a:lstStyle/>
+                    <a:p>
+                      <a:r>
+                        <a:rPr lang="en-US" dirty="0"/>
+                        <a:t>Luke</a:t>
+                      </a:r>
+                    </a:p>
+                  </a:txBody>
+                  <a:tcPr/>
+                </a:tc>
+                <a:extLst>
+                  <a:ext uri="{0D108BD9-81ED-4DB2-BD59-A6C34878D82A}">
+                    <a16:rowId xmlns:a16="http://schemas.microsoft.com/office/drawing/2014/main" val="1151712161"/>
+                  </a:ext>
+                </a:extLst>
+              </a:tr>
+              <a:tr h="550069">
+                <a:tc>
+                  <a:txBody>
+                    <a:bodyPr/>
+                    <a:lstStyle/>
+                    <a:p>
+                      <a:r>
+                        <a:rPr lang="en-US" dirty="0"/>
+                        <a:t>5</a:t>
+                      </a:r>
+                    </a:p>
+                  </a:txBody>
+                  <a:tcPr/>
+                </a:tc>
+                <a:tc>
+                  <a:txBody>
+                    <a:bodyPr/>
+                    <a:lstStyle/>
+                    <a:p>
+                      <a:r>
+                        <a:rPr lang="en-US" dirty="0"/>
+                        <a:t>Joan</a:t>
+                      </a:r>
+                    </a:p>
+                  </a:txBody>
+                  <a:tcPr/>
+                </a:tc>
+                <a:extLst>
+                  <a:ext uri="{0D108BD9-81ED-4DB2-BD59-A6C34878D82A}">
+                    <a16:rowId xmlns:a16="http://schemas.microsoft.com/office/drawing/2014/main" val="1895924153"/>
+                  </a:ext>
+                </a:extLst>
+              </a:tr>
+              <a:tr h="550069">
+                <a:tc>
+                  <a:txBody>
+                    <a:bodyPr/>
+                    <a:lstStyle/>
+                    <a:p>
+                      <a:r>
+                        <a:rPr lang="en-US" dirty="0"/>
+                        <a:t>6</a:t>
+                      </a:r>
+                    </a:p>
+                  </a:txBody>
+                  <a:tcPr/>
+                </a:tc>
+                <a:tc>
+                  <a:txBody>
+                    <a:bodyPr/>
+                    <a:lstStyle/>
+                    <a:p>
+                      <a:r>
+                        <a:rPr lang="en-US" dirty="0"/>
+                        <a:t>John</a:t>
+                      </a:r>
+                    </a:p>
+                  </a:txBody>
+                  <a:tcPr/>
+                </a:tc>
+                <a:extLst>
+                  <a:ext uri="{0D108BD9-81ED-4DB2-BD59-A6C34878D82A}">
+                    <a16:rowId xmlns:a16="http://schemas.microsoft.com/office/drawing/2014/main" val="2073015313"/>
+                  </a:ext>
+                </a:extLst>
+              </a:tr>
+              <a:tr h="550069">
+                <a:tc>
+                  <a:txBody>
+                    <a:bodyPr/>
+                    <a:lstStyle/>
+                    <a:p>
+                      <a:r>
+                        <a:rPr lang="en-US" dirty="0"/>
+                        <a:t>7</a:t>
+                      </a:r>
+                    </a:p>
+                  </a:txBody>
+                  <a:tcPr/>
+                </a:tc>
+                <a:tc>
+                  <a:txBody>
+                    <a:bodyPr/>
+                    <a:lstStyle/>
+                    <a:p>
+                      <a:r>
+                        <a:rPr lang="en-US" dirty="0"/>
+                        <a:t>Sam</a:t>
+                      </a:r>
+                    </a:p>
+                  </a:txBody>
+                  <a:tcPr/>
+                </a:tc>
+                <a:extLst>
+                  <a:ext uri="{0D108BD9-81ED-4DB2-BD59-A6C34878D82A}">
+                    <a16:rowId xmlns:a16="http://schemas.microsoft.com/office/drawing/2014/main" val="2290738421"/>
+                  </a:ext>
+                </a:extLst>
+              </a:tr>
+            </a:tbl>
+          </a:graphicData>
+        </a:graphic>
+      </p:graphicFrame>
+      <p:graphicFrame>
+        <p:nvGraphicFramePr>
+          <p:cNvPr id="11" name="Table 10">
+            <a:extLst>
+              <a:ext uri="{FF2B5EF4-FFF2-40B4-BE49-F238E27FC236}">
+                <a16:creationId xmlns:a16="http://schemas.microsoft.com/office/drawing/2014/main" id="{544C7A9B-CB2A-3743-AFD2-7B6D9354F9D4}"/>
+              </a:ext>
+            </a:extLst>
+          </p:cNvPr>
+          <p:cNvGraphicFramePr>
+            <a:graphicFrameLocks noGrp="1"/>
+          </p:cNvGraphicFramePr>
+          <p:nvPr>
+            <p:extLst>
+              <p:ext uri="{D42A27DB-BD31-4B8C-83A1-F6EECF244321}">
+                <p14:modId xmlns:p14="http://schemas.microsoft.com/office/powerpoint/2010/main" val="901415303"/>
+              </p:ext>
+            </p:extLst>
+          </p:nvPr>
+        </p:nvGraphicFramePr>
+        <p:xfrm>
+          <a:off x="5800725" y="1228723"/>
+          <a:ext cx="4594874" cy="4950621"/>
+        </p:xfrm>
+        <a:graphic>
+          <a:graphicData uri="http://schemas.openxmlformats.org/drawingml/2006/table">
+            <a:tbl>
+              <a:tblPr firstRow="1" bandRow="1">
+                <a:tableStyleId>{5C22544A-7EE6-4342-B048-85BDC9FD1C3A}</a:tableStyleId>
+              </a:tblPr>
+              <a:tblGrid>
+                <a:gridCol w="695991">
+                  <a:extLst>
+                    <a:ext uri="{9D8B030D-6E8A-4147-A177-3AD203B41FA5}">
+                      <a16:colId xmlns:a16="http://schemas.microsoft.com/office/drawing/2014/main" val="1814196662"/>
+                    </a:ext>
+                  </a:extLst>
+                </a:gridCol>
+                <a:gridCol w="2429874">
+                  <a:extLst>
+                    <a:ext uri="{9D8B030D-6E8A-4147-A177-3AD203B41FA5}">
+                      <a16:colId xmlns:a16="http://schemas.microsoft.com/office/drawing/2014/main" val="254236435"/>
+                    </a:ext>
+                  </a:extLst>
+                </a:gridCol>
+                <a:gridCol w="1469009">
+                  <a:extLst>
+                    <a:ext uri="{9D8B030D-6E8A-4147-A177-3AD203B41FA5}">
+                      <a16:colId xmlns:a16="http://schemas.microsoft.com/office/drawing/2014/main" val="144704008"/>
+                    </a:ext>
+                  </a:extLst>
+                </a:gridCol>
+              </a:tblGrid>
+              <a:tr h="550069">
+                <a:tc>
+                  <a:txBody>
+                    <a:bodyPr/>
+                    <a:lstStyle/>
+                    <a:p>
+                      <a:r>
+                        <a:rPr lang="en-US" dirty="0"/>
+                        <a:t>id</a:t>
+                      </a:r>
+                    </a:p>
+                  </a:txBody>
+                  <a:tcPr/>
+                </a:tc>
+                <a:tc>
+                  <a:txBody>
+                    <a:bodyPr/>
+                    <a:lstStyle/>
+                    <a:p>
+                      <a:r>
+                        <a:rPr lang="en-US" dirty="0" err="1"/>
+                        <a:t>plot_name</a:t>
+                      </a:r>
+                      <a:endParaRPr lang="en-US" dirty="0"/>
+                    </a:p>
+                  </a:txBody>
+                  <a:tcPr/>
+                </a:tc>
+                <a:tc>
+                  <a:txBody>
+                    <a:bodyPr/>
+                    <a:lstStyle/>
+                    <a:p>
+                      <a:r>
+                        <a:rPr lang="en-US" dirty="0"/>
+                        <a:t>farmer_id</a:t>
+                      </a:r>
+                    </a:p>
+                  </a:txBody>
+                  <a:tcPr/>
+                </a:tc>
+                <a:extLst>
+                  <a:ext uri="{0D108BD9-81ED-4DB2-BD59-A6C34878D82A}">
+                    <a16:rowId xmlns:a16="http://schemas.microsoft.com/office/drawing/2014/main" val="3375024876"/>
+                  </a:ext>
+                </a:extLst>
+              </a:tr>
+              <a:tr h="550069">
+                <a:tc>
+                  <a:txBody>
+                    <a:bodyPr/>
+                    <a:lstStyle/>
+                    <a:p>
+                      <a:r>
+                        <a:rPr lang="en-US" dirty="0"/>
+                        <a:t>1</a:t>
+                      </a:r>
+                    </a:p>
+                  </a:txBody>
+                  <a:tcPr/>
+                </a:tc>
+                <a:tc>
+                  <a:txBody>
+                    <a:bodyPr/>
+                    <a:lstStyle/>
+                    <a:p>
+                      <a:r>
+                        <a:rPr lang="en-US" dirty="0"/>
+                        <a:t>North-field</a:t>
+                      </a:r>
+                    </a:p>
+                  </a:txBody>
+                  <a:tcPr/>
+                </a:tc>
+                <a:tc>
+                  <a:txBody>
+                    <a:bodyPr/>
+                    <a:lstStyle/>
+                    <a:p>
+                      <a:r>
+                        <a:rPr lang="en-US" dirty="0"/>
+                        <a:t>1</a:t>
+                      </a:r>
+                    </a:p>
+                  </a:txBody>
+                  <a:tcPr/>
+                </a:tc>
+                <a:extLst>
+                  <a:ext uri="{0D108BD9-81ED-4DB2-BD59-A6C34878D82A}">
+                    <a16:rowId xmlns:a16="http://schemas.microsoft.com/office/drawing/2014/main" val="1096633820"/>
+                  </a:ext>
+                </a:extLst>
+              </a:tr>
+              <a:tr h="550069">
+                <a:tc>
+                  <a:txBody>
+                    <a:bodyPr/>
+                    <a:lstStyle/>
+                    <a:p>
+                      <a:r>
+                        <a:rPr lang="en-US" dirty="0"/>
+                        <a:t>2</a:t>
+                      </a:r>
+                    </a:p>
+                  </a:txBody>
+                  <a:tcPr/>
+                </a:tc>
+                <a:tc>
+                  <a:txBody>
+                    <a:bodyPr/>
+                    <a:lstStyle/>
+                    <a:p>
+                      <a:r>
+                        <a:rPr lang="en-US" dirty="0"/>
+                        <a:t>South-field</a:t>
+                      </a:r>
+                    </a:p>
+                  </a:txBody>
+                  <a:tcPr/>
+                </a:tc>
+                <a:tc>
+                  <a:txBody>
+                    <a:bodyPr/>
+                    <a:lstStyle/>
+                    <a:p>
+                      <a:r>
+                        <a:rPr lang="en-US" dirty="0"/>
+                        <a:t>1</a:t>
+                      </a:r>
+                    </a:p>
+                  </a:txBody>
+                  <a:tcPr/>
+                </a:tc>
+                <a:extLst>
+                  <a:ext uri="{0D108BD9-81ED-4DB2-BD59-A6C34878D82A}">
+                    <a16:rowId xmlns:a16="http://schemas.microsoft.com/office/drawing/2014/main" val="2502785895"/>
+                  </a:ext>
+                </a:extLst>
+              </a:tr>
+              <a:tr h="550069">
+                <a:tc>
+                  <a:txBody>
+                    <a:bodyPr/>
+                    <a:lstStyle/>
+                    <a:p>
+                      <a:r>
+                        <a:rPr lang="en-US" dirty="0"/>
+                        <a:t>3</a:t>
+                      </a:r>
+                    </a:p>
+                  </a:txBody>
+                  <a:tcPr/>
+                </a:tc>
+                <a:tc>
+                  <a:txBody>
+                    <a:bodyPr/>
+                    <a:lstStyle/>
+                    <a:p>
+                      <a:r>
+                        <a:rPr lang="en-US" dirty="0"/>
+                        <a:t>Behind farmhouse</a:t>
+                      </a:r>
+                    </a:p>
+                  </a:txBody>
+                  <a:tcPr/>
+                </a:tc>
+                <a:tc>
+                  <a:txBody>
+                    <a:bodyPr/>
+                    <a:lstStyle/>
+                    <a:p>
+                      <a:r>
+                        <a:rPr lang="en-US" dirty="0"/>
+                        <a:t>2</a:t>
+                      </a:r>
+                    </a:p>
+                  </a:txBody>
+                  <a:tcPr/>
+                </a:tc>
+                <a:extLst>
+                  <a:ext uri="{0D108BD9-81ED-4DB2-BD59-A6C34878D82A}">
+                    <a16:rowId xmlns:a16="http://schemas.microsoft.com/office/drawing/2014/main" val="3585364205"/>
+                  </a:ext>
+                </a:extLst>
+              </a:tr>
+              <a:tr h="550069">
+                <a:tc>
+                  <a:txBody>
+                    <a:bodyPr/>
+                    <a:lstStyle/>
+                    <a:p>
+                      <a:r>
+                        <a:rPr lang="en-US" dirty="0"/>
+                        <a:t>4</a:t>
+                      </a:r>
+                    </a:p>
+                  </a:txBody>
+                  <a:tcPr/>
+                </a:tc>
+                <a:tc>
+                  <a:txBody>
+                    <a:bodyPr/>
+                    <a:lstStyle/>
+                    <a:p>
+                      <a:r>
+                        <a:rPr lang="en-US" dirty="0"/>
+                        <a:t>Main plot</a:t>
+                      </a:r>
+                    </a:p>
+                  </a:txBody>
+                  <a:tcPr/>
+                </a:tc>
+                <a:tc>
+                  <a:txBody>
+                    <a:bodyPr/>
+                    <a:lstStyle/>
+                    <a:p>
+                      <a:r>
+                        <a:rPr lang="en-US" dirty="0"/>
+                        <a:t>3</a:t>
+                      </a:r>
+                    </a:p>
+                  </a:txBody>
+                  <a:tcPr/>
+                </a:tc>
+                <a:extLst>
+                  <a:ext uri="{0D108BD9-81ED-4DB2-BD59-A6C34878D82A}">
+                    <a16:rowId xmlns:a16="http://schemas.microsoft.com/office/drawing/2014/main" val="1151712161"/>
+                  </a:ext>
+                </a:extLst>
+              </a:tr>
+              <a:tr h="550069">
+                <a:tc>
+                  <a:txBody>
+                    <a:bodyPr/>
+                    <a:lstStyle/>
+                    <a:p>
+                      <a:r>
+                        <a:rPr lang="en-US" dirty="0"/>
+                        <a:t>5</a:t>
+                      </a:r>
+                    </a:p>
+                  </a:txBody>
+                  <a:tcPr/>
+                </a:tc>
+                <a:tc>
+                  <a:txBody>
+                    <a:bodyPr/>
+                    <a:lstStyle/>
+                    <a:p>
+                      <a:r>
+                        <a:rPr lang="en-US" dirty="0"/>
+                        <a:t>Second plot</a:t>
+                      </a:r>
+                    </a:p>
+                  </a:txBody>
+                  <a:tcPr/>
+                </a:tc>
+                <a:tc>
+                  <a:txBody>
+                    <a:bodyPr/>
+                    <a:lstStyle/>
+                    <a:p>
+                      <a:r>
+                        <a:rPr lang="en-US" dirty="0"/>
+                        <a:t>3</a:t>
+                      </a:r>
+                    </a:p>
+                  </a:txBody>
+                  <a:tcPr/>
+                </a:tc>
+                <a:extLst>
+                  <a:ext uri="{0D108BD9-81ED-4DB2-BD59-A6C34878D82A}">
+                    <a16:rowId xmlns:a16="http://schemas.microsoft.com/office/drawing/2014/main" val="1895924153"/>
+                  </a:ext>
+                </a:extLst>
+              </a:tr>
+              <a:tr h="550069">
+                <a:tc>
+                  <a:txBody>
+                    <a:bodyPr/>
+                    <a:lstStyle/>
+                    <a:p>
+                      <a:r>
+                        <a:rPr lang="en-US" dirty="0"/>
+                        <a:t>6</a:t>
+                      </a:r>
+                    </a:p>
+                  </a:txBody>
+                  <a:tcPr/>
+                </a:tc>
+                <a:tc>
+                  <a:txBody>
+                    <a:bodyPr/>
+                    <a:lstStyle/>
+                    <a:p>
+                      <a:r>
+                        <a:rPr lang="en-US" dirty="0"/>
+                        <a:t>Main plot</a:t>
+                      </a:r>
+                    </a:p>
+                  </a:txBody>
+                  <a:tcPr/>
+                </a:tc>
+                <a:tc>
+                  <a:txBody>
+                    <a:bodyPr/>
+                    <a:lstStyle/>
+                    <a:p>
+                      <a:r>
+                        <a:rPr lang="en-US" dirty="0"/>
+                        <a:t>4</a:t>
+                      </a:r>
+                    </a:p>
+                  </a:txBody>
+                  <a:tcPr/>
+                </a:tc>
+                <a:extLst>
+                  <a:ext uri="{0D108BD9-81ED-4DB2-BD59-A6C34878D82A}">
+                    <a16:rowId xmlns:a16="http://schemas.microsoft.com/office/drawing/2014/main" val="4013387143"/>
+                  </a:ext>
+                </a:extLst>
+              </a:tr>
+              <a:tr h="550069">
+                <a:tc>
+                  <a:txBody>
+                    <a:bodyPr/>
+                    <a:lstStyle/>
+                    <a:p>
+                      <a:r>
+                        <a:rPr lang="en-US" dirty="0"/>
+                        <a:t>7</a:t>
+                      </a:r>
+                    </a:p>
+                  </a:txBody>
+                  <a:tcPr/>
+                </a:tc>
+                <a:tc>
+                  <a:txBody>
+                    <a:bodyPr/>
+                    <a:lstStyle/>
+                    <a:p>
+                      <a:r>
+                        <a:rPr lang="en-US" dirty="0"/>
+                        <a:t>West field</a:t>
+                      </a:r>
+                    </a:p>
+                  </a:txBody>
+                  <a:tcPr/>
+                </a:tc>
+                <a:tc>
+                  <a:txBody>
+                    <a:bodyPr/>
+                    <a:lstStyle/>
+                    <a:p>
+                      <a:r>
+                        <a:rPr lang="en-US" dirty="0"/>
+                        <a:t>4</a:t>
+                      </a:r>
+                    </a:p>
+                  </a:txBody>
+                  <a:tcPr/>
+                </a:tc>
+                <a:extLst>
+                  <a:ext uri="{0D108BD9-81ED-4DB2-BD59-A6C34878D82A}">
+                    <a16:rowId xmlns:a16="http://schemas.microsoft.com/office/drawing/2014/main" val="3991791780"/>
+                  </a:ext>
+                </a:extLst>
+              </a:tr>
+              <a:tr h="550069">
+                <a:tc>
+                  <a:txBody>
+                    <a:bodyPr/>
+                    <a:lstStyle/>
+                    <a:p>
+                      <a:r>
+                        <a:rPr lang="en-US" dirty="0"/>
+                        <a:t>8</a:t>
+                      </a:r>
+                    </a:p>
+                  </a:txBody>
+                  <a:tcPr/>
+                </a:tc>
+                <a:tc>
+                  <a:txBody>
+                    <a:bodyPr/>
+                    <a:lstStyle/>
+                    <a:p>
+                      <a:r>
+                        <a:rPr lang="en-US" dirty="0"/>
+                        <a:t>East field</a:t>
+                      </a:r>
+                    </a:p>
+                  </a:txBody>
+                  <a:tcPr/>
+                </a:tc>
+                <a:tc>
+                  <a:txBody>
+                    <a:bodyPr/>
+                    <a:lstStyle/>
+                    <a:p>
+                      <a:r>
+                        <a:rPr lang="en-US" dirty="0"/>
+                        <a:t>4</a:t>
+                      </a:r>
+                    </a:p>
+                  </a:txBody>
+                  <a:tcPr/>
+                </a:tc>
+                <a:extLst>
+                  <a:ext uri="{0D108BD9-81ED-4DB2-BD59-A6C34878D82A}">
+                    <a16:rowId xmlns:a16="http://schemas.microsoft.com/office/drawing/2014/main" val="4244883252"/>
+                  </a:ext>
+                </a:extLst>
+              </a:tr>
+            </a:tbl>
+          </a:graphicData>
+        </a:graphic>
+      </p:graphicFrame>
+      <p:sp>
+        <p:nvSpPr>
+          <p:cNvPr id="12" name="TextBox 11">
+            <a:extLst>
+              <a:ext uri="{FF2B5EF4-FFF2-40B4-BE49-F238E27FC236}">
+                <a16:creationId xmlns:a16="http://schemas.microsoft.com/office/drawing/2014/main" id="{FC6DC9A1-82C1-994A-813A-5A2658AACA26}"/>
+              </a:ext>
+            </a:extLst>
+          </p:cNvPr>
+          <p:cNvSpPr txBox="1"/>
+          <p:nvPr/>
+        </p:nvSpPr>
+        <p:spPr>
+          <a:xfrm>
+            <a:off x="1945932" y="257175"/>
+            <a:ext cx="1500347" cy="584775"/>
+          </a:xfrm>
+          <a:prstGeom prst="rect">
+            <a:avLst/>
+          </a:prstGeom>
+          <a:noFill/>
+        </p:spPr>
+        <p:txBody>
+          <a:bodyPr wrap="none" rtlCol="0">
+            <a:spAutoFit/>
+          </a:bodyPr>
+          <a:lstStyle/>
+          <a:p>
+            <a:r>
+              <a:rPr lang="en-US" sz="3200" b="1" dirty="0"/>
+              <a:t>farmers</a:t>
+            </a:r>
+          </a:p>
+        </p:txBody>
+      </p:sp>
+      <p:sp>
+        <p:nvSpPr>
+          <p:cNvPr id="13" name="TextBox 12">
+            <a:extLst>
+              <a:ext uri="{FF2B5EF4-FFF2-40B4-BE49-F238E27FC236}">
+                <a16:creationId xmlns:a16="http://schemas.microsoft.com/office/drawing/2014/main" id="{28DCB725-B7B2-3445-A932-CECF62483DE8}"/>
+              </a:ext>
+            </a:extLst>
+          </p:cNvPr>
+          <p:cNvSpPr txBox="1"/>
+          <p:nvPr/>
+        </p:nvSpPr>
+        <p:spPr>
+          <a:xfrm>
+            <a:off x="6959923" y="257175"/>
+            <a:ext cx="1032655" cy="584775"/>
+          </a:xfrm>
+          <a:prstGeom prst="rect">
+            <a:avLst/>
+          </a:prstGeom>
+          <a:noFill/>
+        </p:spPr>
+        <p:txBody>
+          <a:bodyPr wrap="none" rtlCol="0">
+            <a:spAutoFit/>
+          </a:bodyPr>
+          <a:lstStyle/>
+          <a:p>
+            <a:r>
+              <a:rPr lang="en-US" sz="3200" b="1" dirty="0"/>
+              <a:t>plots</a:t>
+            </a:r>
+          </a:p>
+        </p:txBody>
+      </p:sp>
+    </p:spTree>
+    <p:extLst>
+      <p:ext uri="{BB962C8B-B14F-4D97-AF65-F5344CB8AC3E}">
+        <p14:creationId xmlns:p14="http://schemas.microsoft.com/office/powerpoint/2010/main" val="4276581232"/>
+      </p:ext>
+    </p:extLst>
+  </p:cSld>
+  <p:clrMapOvr>
+    <a:masterClrMapping/>
+  </p:clrMapOvr>
+</p:sld>
+</file>
+
+<file path=ppt/slides/slide3.xml><?xml version="1.0" encoding="utf-8"?>
+<p:sld xmlns:a="http://schemas.openxmlformats.org/drawingml/2006/main" xmlns:r="http://schemas.openxmlformats.org/officeDocument/2006/relationships" xmlns:p="http://schemas.openxmlformats.org/presentationml/2006/main">
+  <p:cSld>
+    <p:spTree>
+      <p:nvGrpSpPr>
+        <p:cNvPr id="1" name=""/>
+        <p:cNvGrpSpPr/>
+        <p:nvPr/>
+      </p:nvGrpSpPr>
+      <p:grpSpPr>
+        <a:xfrm>
+          <a:off x="0" y="0"/>
+          <a:ext cx="0" cy="0"/>
+          <a:chOff x="0" y="0"/>
+          <a:chExt cx="0" cy="0"/>
+        </a:xfrm>
+      </p:grpSpPr>
+      <p:graphicFrame>
+        <p:nvGraphicFramePr>
+          <p:cNvPr id="10" name="Table 9">
+            <a:extLst>
+              <a:ext uri="{FF2B5EF4-FFF2-40B4-BE49-F238E27FC236}">
+                <a16:creationId xmlns:a16="http://schemas.microsoft.com/office/drawing/2014/main" id="{799EA228-3090-514D-B56C-1EA6BBBFF0DC}"/>
+              </a:ext>
+            </a:extLst>
+          </p:cNvPr>
+          <p:cNvGraphicFramePr>
+            <a:graphicFrameLocks noGrp="1"/>
+          </p:cNvGraphicFramePr>
+          <p:nvPr/>
+        </p:nvGraphicFramePr>
+        <p:xfrm>
+          <a:off x="1579418" y="1228723"/>
+          <a:ext cx="2364993" cy="4400552"/>
+        </p:xfrm>
+        <a:graphic>
+          <a:graphicData uri="http://schemas.openxmlformats.org/drawingml/2006/table">
+            <a:tbl>
+              <a:tblPr firstRow="1" bandRow="1">
+                <a:tableStyleId>{5C22544A-7EE6-4342-B048-85BDC9FD1C3A}</a:tableStyleId>
+              </a:tblPr>
+              <a:tblGrid>
+                <a:gridCol w="1116688">
+                  <a:extLst>
+                    <a:ext uri="{9D8B030D-6E8A-4147-A177-3AD203B41FA5}">
+                      <a16:colId xmlns:a16="http://schemas.microsoft.com/office/drawing/2014/main" val="1814196662"/>
+                    </a:ext>
+                  </a:extLst>
+                </a:gridCol>
+                <a:gridCol w="1248305">
+                  <a:extLst>
+                    <a:ext uri="{9D8B030D-6E8A-4147-A177-3AD203B41FA5}">
+                      <a16:colId xmlns:a16="http://schemas.microsoft.com/office/drawing/2014/main" val="254236435"/>
+                    </a:ext>
+                  </a:extLst>
+                </a:gridCol>
+              </a:tblGrid>
+              <a:tr h="550069">
+                <a:tc>
+                  <a:txBody>
+                    <a:bodyPr/>
+                    <a:lstStyle/>
+                    <a:p>
+                      <a:r>
+                        <a:rPr lang="en-US" dirty="0"/>
+                        <a:t>id</a:t>
+                      </a:r>
+                    </a:p>
+                  </a:txBody>
+                  <a:tcPr/>
+                </a:tc>
+                <a:tc>
+                  <a:txBody>
+                    <a:bodyPr/>
+                    <a:lstStyle/>
+                    <a:p>
+                      <a:r>
+                        <a:rPr lang="en-US" dirty="0"/>
+                        <a:t>name</a:t>
+                      </a:r>
+                    </a:p>
+                  </a:txBody>
+                  <a:tcPr/>
+                </a:tc>
+                <a:extLst>
+                  <a:ext uri="{0D108BD9-81ED-4DB2-BD59-A6C34878D82A}">
+                    <a16:rowId xmlns:a16="http://schemas.microsoft.com/office/drawing/2014/main" val="3375024876"/>
+                  </a:ext>
+                </a:extLst>
+              </a:tr>
+              <a:tr h="550069">
+                <a:tc>
+                  <a:txBody>
+                    <a:bodyPr/>
+                    <a:lstStyle/>
+                    <a:p>
+                      <a:r>
+                        <a:rPr lang="en-US" dirty="0"/>
+                        <a:t>1</a:t>
+                      </a:r>
+                    </a:p>
+                  </a:txBody>
+                  <a:tcPr/>
+                </a:tc>
+                <a:tc>
+                  <a:txBody>
+                    <a:bodyPr/>
+                    <a:lstStyle/>
+                    <a:p>
+                      <a:r>
+                        <a:rPr lang="en-US" dirty="0"/>
+                        <a:t>Mary</a:t>
+                      </a:r>
+                    </a:p>
+                  </a:txBody>
+                  <a:tcPr/>
+                </a:tc>
+                <a:extLst>
+                  <a:ext uri="{0D108BD9-81ED-4DB2-BD59-A6C34878D82A}">
+                    <a16:rowId xmlns:a16="http://schemas.microsoft.com/office/drawing/2014/main" val="1096633820"/>
+                  </a:ext>
+                </a:extLst>
+              </a:tr>
+              <a:tr h="550069">
+                <a:tc>
+                  <a:txBody>
+                    <a:bodyPr/>
+                    <a:lstStyle/>
+                    <a:p>
+                      <a:r>
+                        <a:rPr lang="en-US" dirty="0"/>
+                        <a:t>2</a:t>
+                      </a:r>
+                    </a:p>
+                  </a:txBody>
+                  <a:tcPr/>
+                </a:tc>
+                <a:tc>
+                  <a:txBody>
+                    <a:bodyPr/>
+                    <a:lstStyle/>
+                    <a:p>
+                      <a:r>
+                        <a:rPr lang="en-US" dirty="0"/>
+                        <a:t>Jane</a:t>
+                      </a:r>
+                    </a:p>
+                  </a:txBody>
+                  <a:tcPr/>
+                </a:tc>
+                <a:extLst>
+                  <a:ext uri="{0D108BD9-81ED-4DB2-BD59-A6C34878D82A}">
+                    <a16:rowId xmlns:a16="http://schemas.microsoft.com/office/drawing/2014/main" val="2502785895"/>
+                  </a:ext>
+                </a:extLst>
+              </a:tr>
+              <a:tr h="550069">
+                <a:tc>
+                  <a:txBody>
+                    <a:bodyPr/>
+                    <a:lstStyle/>
+                    <a:p>
+                      <a:r>
+                        <a:rPr lang="en-US" dirty="0"/>
+                        <a:t>3</a:t>
+                      </a:r>
+                    </a:p>
+                  </a:txBody>
+                  <a:tcPr/>
+                </a:tc>
+                <a:tc>
+                  <a:txBody>
+                    <a:bodyPr/>
+                    <a:lstStyle/>
+                    <a:p>
+                      <a:r>
+                        <a:rPr lang="en-US" dirty="0"/>
+                        <a:t>Mark</a:t>
+                      </a:r>
+                    </a:p>
+                  </a:txBody>
+                  <a:tcPr/>
+                </a:tc>
+                <a:extLst>
+                  <a:ext uri="{0D108BD9-81ED-4DB2-BD59-A6C34878D82A}">
+                    <a16:rowId xmlns:a16="http://schemas.microsoft.com/office/drawing/2014/main" val="3585364205"/>
+                  </a:ext>
+                </a:extLst>
+              </a:tr>
+              <a:tr h="550069">
+                <a:tc>
+                  <a:txBody>
+                    <a:bodyPr/>
+                    <a:lstStyle/>
+                    <a:p>
+                      <a:r>
+                        <a:rPr lang="en-US" dirty="0"/>
+                        <a:t>4</a:t>
+                      </a:r>
+                    </a:p>
+                  </a:txBody>
+                  <a:tcPr/>
+                </a:tc>
+                <a:tc>
+                  <a:txBody>
+                    <a:bodyPr/>
+                    <a:lstStyle/>
+                    <a:p>
+                      <a:r>
+                        <a:rPr lang="en-US" dirty="0"/>
+                        <a:t>Luke</a:t>
+                      </a:r>
+                    </a:p>
+                  </a:txBody>
+                  <a:tcPr/>
+                </a:tc>
+                <a:extLst>
+                  <a:ext uri="{0D108BD9-81ED-4DB2-BD59-A6C34878D82A}">
+                    <a16:rowId xmlns:a16="http://schemas.microsoft.com/office/drawing/2014/main" val="1151712161"/>
+                  </a:ext>
+                </a:extLst>
+              </a:tr>
+              <a:tr h="550069">
+                <a:tc>
+                  <a:txBody>
+                    <a:bodyPr/>
+                    <a:lstStyle/>
+                    <a:p>
+                      <a:r>
+                        <a:rPr lang="en-US" dirty="0"/>
+                        <a:t>5</a:t>
+                      </a:r>
+                    </a:p>
+                  </a:txBody>
+                  <a:tcPr/>
+                </a:tc>
+                <a:tc>
+                  <a:txBody>
+                    <a:bodyPr/>
+                    <a:lstStyle/>
+                    <a:p>
+                      <a:r>
+                        <a:rPr lang="en-US" dirty="0"/>
+                        <a:t>Joan</a:t>
+                      </a:r>
+                    </a:p>
+                  </a:txBody>
+                  <a:tcPr/>
+                </a:tc>
+                <a:extLst>
+                  <a:ext uri="{0D108BD9-81ED-4DB2-BD59-A6C34878D82A}">
+                    <a16:rowId xmlns:a16="http://schemas.microsoft.com/office/drawing/2014/main" val="1895924153"/>
+                  </a:ext>
+                </a:extLst>
+              </a:tr>
+              <a:tr h="550069">
+                <a:tc>
+                  <a:txBody>
+                    <a:bodyPr/>
+                    <a:lstStyle/>
+                    <a:p>
+                      <a:r>
+                        <a:rPr lang="en-US" dirty="0"/>
+                        <a:t>6</a:t>
+                      </a:r>
+                    </a:p>
+                  </a:txBody>
+                  <a:tcPr/>
+                </a:tc>
+                <a:tc>
+                  <a:txBody>
+                    <a:bodyPr/>
+                    <a:lstStyle/>
+                    <a:p>
+                      <a:r>
+                        <a:rPr lang="en-US" dirty="0"/>
+                        <a:t>John</a:t>
+                      </a:r>
+                    </a:p>
+                  </a:txBody>
+                  <a:tcPr/>
+                </a:tc>
+                <a:extLst>
+                  <a:ext uri="{0D108BD9-81ED-4DB2-BD59-A6C34878D82A}">
+                    <a16:rowId xmlns:a16="http://schemas.microsoft.com/office/drawing/2014/main" val="2073015313"/>
+                  </a:ext>
+                </a:extLst>
+              </a:tr>
+              <a:tr h="550069">
+                <a:tc>
+                  <a:txBody>
+                    <a:bodyPr/>
+                    <a:lstStyle/>
+                    <a:p>
+                      <a:r>
+                        <a:rPr lang="en-US" dirty="0"/>
+                        <a:t>7</a:t>
+                      </a:r>
+                    </a:p>
+                  </a:txBody>
+                  <a:tcPr/>
+                </a:tc>
+                <a:tc>
+                  <a:txBody>
+                    <a:bodyPr/>
+                    <a:lstStyle/>
+                    <a:p>
+                      <a:r>
+                        <a:rPr lang="en-US" dirty="0"/>
+                        <a:t>Sam</a:t>
+                      </a:r>
+                    </a:p>
+                  </a:txBody>
+                  <a:tcPr/>
+                </a:tc>
+                <a:extLst>
+                  <a:ext uri="{0D108BD9-81ED-4DB2-BD59-A6C34878D82A}">
+                    <a16:rowId xmlns:a16="http://schemas.microsoft.com/office/drawing/2014/main" val="2290738421"/>
+                  </a:ext>
+                </a:extLst>
+              </a:tr>
+            </a:tbl>
+          </a:graphicData>
+        </a:graphic>
+      </p:graphicFrame>
+      <p:graphicFrame>
+        <p:nvGraphicFramePr>
+          <p:cNvPr id="11" name="Table 10">
+            <a:extLst>
+              <a:ext uri="{FF2B5EF4-FFF2-40B4-BE49-F238E27FC236}">
+                <a16:creationId xmlns:a16="http://schemas.microsoft.com/office/drawing/2014/main" id="{544C7A9B-CB2A-3743-AFD2-7B6D9354F9D4}"/>
+              </a:ext>
+            </a:extLst>
+          </p:cNvPr>
+          <p:cNvGraphicFramePr>
+            <a:graphicFrameLocks noGrp="1"/>
+          </p:cNvGraphicFramePr>
+          <p:nvPr/>
+        </p:nvGraphicFramePr>
+        <p:xfrm>
+          <a:off x="5800725" y="1228723"/>
+          <a:ext cx="4594874" cy="3300414"/>
+        </p:xfrm>
+        <a:graphic>
+          <a:graphicData uri="http://schemas.openxmlformats.org/drawingml/2006/table">
+            <a:tbl>
+              <a:tblPr firstRow="1" bandRow="1">
+                <a:tableStyleId>{5C22544A-7EE6-4342-B048-85BDC9FD1C3A}</a:tableStyleId>
+              </a:tblPr>
+              <a:tblGrid>
+                <a:gridCol w="695991">
+                  <a:extLst>
+                    <a:ext uri="{9D8B030D-6E8A-4147-A177-3AD203B41FA5}">
+                      <a16:colId xmlns:a16="http://schemas.microsoft.com/office/drawing/2014/main" val="1814196662"/>
+                    </a:ext>
+                  </a:extLst>
+                </a:gridCol>
+                <a:gridCol w="2429874">
+                  <a:extLst>
+                    <a:ext uri="{9D8B030D-6E8A-4147-A177-3AD203B41FA5}">
+                      <a16:colId xmlns:a16="http://schemas.microsoft.com/office/drawing/2014/main" val="254236435"/>
+                    </a:ext>
+                  </a:extLst>
+                </a:gridCol>
+                <a:gridCol w="1469009">
+                  <a:extLst>
+                    <a:ext uri="{9D8B030D-6E8A-4147-A177-3AD203B41FA5}">
+                      <a16:colId xmlns:a16="http://schemas.microsoft.com/office/drawing/2014/main" val="144704008"/>
+                    </a:ext>
+                  </a:extLst>
+                </a:gridCol>
+              </a:tblGrid>
+              <a:tr h="550069">
+                <a:tc>
+                  <a:txBody>
+                    <a:bodyPr/>
+                    <a:lstStyle/>
+                    <a:p>
+                      <a:r>
+                        <a:rPr lang="en-US" dirty="0"/>
+                        <a:t>id</a:t>
+                      </a:r>
+                    </a:p>
+                  </a:txBody>
+                  <a:tcPr/>
+                </a:tc>
+                <a:tc>
+                  <a:txBody>
+                    <a:bodyPr/>
+                    <a:lstStyle/>
+                    <a:p>
+                      <a:r>
+                        <a:rPr lang="en-US" dirty="0"/>
+                        <a:t>email</a:t>
+                      </a:r>
+                    </a:p>
+                  </a:txBody>
+                  <a:tcPr/>
+                </a:tc>
+                <a:tc>
+                  <a:txBody>
+                    <a:bodyPr/>
+                    <a:lstStyle/>
+                    <a:p>
+                      <a:r>
+                        <a:rPr lang="en-US" dirty="0"/>
+                        <a:t>farmer_id</a:t>
+                      </a:r>
+                    </a:p>
+                  </a:txBody>
+                  <a:tcPr/>
+                </a:tc>
+                <a:extLst>
+                  <a:ext uri="{0D108BD9-81ED-4DB2-BD59-A6C34878D82A}">
+                    <a16:rowId xmlns:a16="http://schemas.microsoft.com/office/drawing/2014/main" val="3375024876"/>
+                  </a:ext>
+                </a:extLst>
+              </a:tr>
+              <a:tr h="550069">
+                <a:tc>
+                  <a:txBody>
+                    <a:bodyPr/>
+                    <a:lstStyle/>
+                    <a:p>
+                      <a:r>
+                        <a:rPr lang="en-US" dirty="0"/>
+                        <a:t>1</a:t>
+                      </a:r>
+                    </a:p>
+                  </a:txBody>
+                  <a:tcPr/>
+                </a:tc>
+                <a:tc>
+                  <a:txBody>
+                    <a:bodyPr/>
+                    <a:lstStyle/>
+                    <a:p>
+                      <a:r>
+                        <a:rPr lang="en-US" dirty="0"/>
+                        <a:t>mary@example.com</a:t>
+                      </a:r>
+                    </a:p>
+                  </a:txBody>
+                  <a:tcPr/>
+                </a:tc>
+                <a:tc>
+                  <a:txBody>
+                    <a:bodyPr/>
+                    <a:lstStyle/>
+                    <a:p>
+                      <a:r>
+                        <a:rPr lang="en-US" dirty="0"/>
+                        <a:t>1</a:t>
+                      </a:r>
+                    </a:p>
+                  </a:txBody>
+                  <a:tcPr/>
+                </a:tc>
+                <a:extLst>
+                  <a:ext uri="{0D108BD9-81ED-4DB2-BD59-A6C34878D82A}">
+                    <a16:rowId xmlns:a16="http://schemas.microsoft.com/office/drawing/2014/main" val="1096633820"/>
+                  </a:ext>
+                </a:extLst>
+              </a:tr>
+              <a:tr h="550069">
+                <a:tc>
+                  <a:txBody>
+                    <a:bodyPr/>
+                    <a:lstStyle/>
+                    <a:p>
+                      <a:r>
+                        <a:rPr lang="en-US" dirty="0"/>
+                        <a:t>2</a:t>
+                      </a:r>
+                    </a:p>
+                  </a:txBody>
+                  <a:tcPr/>
+                </a:tc>
+                <a:tc>
+                  <a:txBody>
+                    <a:bodyPr/>
+                    <a:lstStyle/>
+                    <a:p>
+                      <a:r>
+                        <a:rPr lang="en-US" dirty="0"/>
+                        <a:t>mark@example.com</a:t>
+                      </a:r>
+                    </a:p>
+                  </a:txBody>
+                  <a:tcPr/>
+                </a:tc>
+                <a:tc>
+                  <a:txBody>
+                    <a:bodyPr/>
+                    <a:lstStyle/>
+                    <a:p>
+                      <a:r>
+                        <a:rPr lang="en-US" dirty="0"/>
+                        <a:t>3</a:t>
+                      </a:r>
+                    </a:p>
+                  </a:txBody>
+                  <a:tcPr/>
+                </a:tc>
+                <a:extLst>
+                  <a:ext uri="{0D108BD9-81ED-4DB2-BD59-A6C34878D82A}">
+                    <a16:rowId xmlns:a16="http://schemas.microsoft.com/office/drawing/2014/main" val="2502785895"/>
+                  </a:ext>
+                </a:extLst>
+              </a:tr>
+              <a:tr h="550069">
+                <a:tc>
+                  <a:txBody>
+                    <a:bodyPr/>
+                    <a:lstStyle/>
+                    <a:p>
+                      <a:r>
+                        <a:rPr lang="en-US" dirty="0"/>
+                        <a:t>3</a:t>
+                      </a:r>
+                    </a:p>
+                  </a:txBody>
+                  <a:tcPr/>
+                </a:tc>
+                <a:tc>
+                  <a:txBody>
+                    <a:bodyPr/>
+                    <a:lstStyle/>
+                    <a:p>
+                      <a:r>
+                        <a:rPr lang="en-US" dirty="0"/>
+                        <a:t>joan@example.com</a:t>
+                      </a:r>
+                    </a:p>
+                  </a:txBody>
+                  <a:tcPr/>
+                </a:tc>
+                <a:tc>
+                  <a:txBody>
+                    <a:bodyPr/>
+                    <a:lstStyle/>
+                    <a:p>
+                      <a:r>
+                        <a:rPr lang="en-US" dirty="0"/>
+                        <a:t>5</a:t>
+                      </a:r>
+                    </a:p>
+                  </a:txBody>
+                  <a:tcPr/>
+                </a:tc>
+                <a:extLst>
+                  <a:ext uri="{0D108BD9-81ED-4DB2-BD59-A6C34878D82A}">
+                    <a16:rowId xmlns:a16="http://schemas.microsoft.com/office/drawing/2014/main" val="3585364205"/>
+                  </a:ext>
+                </a:extLst>
+              </a:tr>
+              <a:tr h="550069">
+                <a:tc>
+                  <a:txBody>
+                    <a:bodyPr/>
+                    <a:lstStyle/>
+                    <a:p>
+                      <a:r>
+                        <a:rPr lang="en-US" dirty="0"/>
+                        <a:t>4</a:t>
+                      </a:r>
+                    </a:p>
+                  </a:txBody>
+                  <a:tcPr/>
+                </a:tc>
+                <a:tc>
+                  <a:txBody>
+                    <a:bodyPr/>
+                    <a:lstStyle/>
+                    <a:p>
+                      <a:r>
+                        <a:rPr lang="en-US" dirty="0"/>
+                        <a:t>john@example.com</a:t>
+                      </a:r>
+                    </a:p>
+                  </a:txBody>
+                  <a:tcPr/>
+                </a:tc>
+                <a:tc>
+                  <a:txBody>
+                    <a:bodyPr/>
+                    <a:lstStyle/>
+                    <a:p>
+                      <a:r>
+                        <a:rPr lang="en-US" dirty="0"/>
+                        <a:t>6</a:t>
+                      </a:r>
+                    </a:p>
+                  </a:txBody>
+                  <a:tcPr/>
+                </a:tc>
+                <a:extLst>
+                  <a:ext uri="{0D108BD9-81ED-4DB2-BD59-A6C34878D82A}">
+                    <a16:rowId xmlns:a16="http://schemas.microsoft.com/office/drawing/2014/main" val="1151712161"/>
+                  </a:ext>
+                </a:extLst>
+              </a:tr>
+              <a:tr h="550069">
+                <a:tc>
+                  <a:txBody>
+                    <a:bodyPr/>
+                    <a:lstStyle/>
+                    <a:p>
+                      <a:r>
+                        <a:rPr lang="en-US" dirty="0"/>
+                        <a:t>5</a:t>
+                      </a:r>
+                    </a:p>
+                  </a:txBody>
+                  <a:tcPr/>
+                </a:tc>
+                <a:tc>
+                  <a:txBody>
+                    <a:bodyPr/>
+                    <a:lstStyle/>
+                    <a:p>
+                      <a:r>
+                        <a:rPr lang="en-US" dirty="0"/>
+                        <a:t>sam@example.com</a:t>
+                      </a:r>
+                    </a:p>
+                  </a:txBody>
+                  <a:tcPr/>
+                </a:tc>
+                <a:tc>
+                  <a:txBody>
+                    <a:bodyPr/>
+                    <a:lstStyle/>
+                    <a:p>
+                      <a:r>
+                        <a:rPr lang="en-US" dirty="0"/>
+                        <a:t>7</a:t>
+                      </a:r>
+                    </a:p>
+                  </a:txBody>
+                  <a:tcPr/>
+                </a:tc>
+                <a:extLst>
+                  <a:ext uri="{0D108BD9-81ED-4DB2-BD59-A6C34878D82A}">
+                    <a16:rowId xmlns:a16="http://schemas.microsoft.com/office/drawing/2014/main" val="1895924153"/>
+                  </a:ext>
+                </a:extLst>
+              </a:tr>
+            </a:tbl>
+          </a:graphicData>
+        </a:graphic>
+      </p:graphicFrame>
+      <p:sp>
+        <p:nvSpPr>
+          <p:cNvPr id="12" name="TextBox 11">
+            <a:extLst>
+              <a:ext uri="{FF2B5EF4-FFF2-40B4-BE49-F238E27FC236}">
+                <a16:creationId xmlns:a16="http://schemas.microsoft.com/office/drawing/2014/main" id="{FC6DC9A1-82C1-994A-813A-5A2658AACA26}"/>
+              </a:ext>
+            </a:extLst>
+          </p:cNvPr>
+          <p:cNvSpPr txBox="1"/>
+          <p:nvPr/>
+        </p:nvSpPr>
+        <p:spPr>
+          <a:xfrm>
+            <a:off x="1945932" y="257175"/>
+            <a:ext cx="1500347" cy="584775"/>
+          </a:xfrm>
+          <a:prstGeom prst="rect">
+            <a:avLst/>
+          </a:prstGeom>
+          <a:noFill/>
+        </p:spPr>
+        <p:txBody>
+          <a:bodyPr wrap="none" rtlCol="0">
+            <a:spAutoFit/>
+          </a:bodyPr>
+          <a:lstStyle/>
+          <a:p>
+            <a:r>
+              <a:rPr lang="en-US" sz="3200" b="1" dirty="0"/>
+              <a:t>farmers</a:t>
+            </a:r>
+          </a:p>
+        </p:txBody>
+      </p:sp>
+      <p:sp>
+        <p:nvSpPr>
+          <p:cNvPr id="13" name="TextBox 12">
+            <a:extLst>
+              <a:ext uri="{FF2B5EF4-FFF2-40B4-BE49-F238E27FC236}">
+                <a16:creationId xmlns:a16="http://schemas.microsoft.com/office/drawing/2014/main" id="{28DCB725-B7B2-3445-A932-CECF62483DE8}"/>
+              </a:ext>
+            </a:extLst>
+          </p:cNvPr>
+          <p:cNvSpPr txBox="1"/>
+          <p:nvPr/>
+        </p:nvSpPr>
+        <p:spPr>
+          <a:xfrm>
+            <a:off x="6959923" y="257175"/>
+            <a:ext cx="2625078" cy="584775"/>
+          </a:xfrm>
+          <a:prstGeom prst="rect">
+            <a:avLst/>
+          </a:prstGeom>
+          <a:noFill/>
+        </p:spPr>
+        <p:txBody>
+          <a:bodyPr wrap="none" rtlCol="0">
+            <a:spAutoFit/>
+          </a:bodyPr>
+          <a:lstStyle/>
+          <a:p>
+            <a:r>
+              <a:rPr lang="en-US" sz="3200" b="1" dirty="0"/>
+              <a:t>web_accounts</a:t>
+            </a:r>
+          </a:p>
+        </p:txBody>
+      </p:sp>
+    </p:spTree>
+    <p:extLst>
+      <p:ext uri="{BB962C8B-B14F-4D97-AF65-F5344CB8AC3E}">
+        <p14:creationId xmlns:p14="http://schemas.microsoft.com/office/powerpoint/2010/main" val="3679400459"/>
+      </p:ext>
+    </p:extLst>
+  </p:cSld>
+  <p:clrMapOvr>
+    <a:masterClrMapping/>
+  </p:clrMapOvr>
+</p:sld>
+</file>
+
+<file path=ppt/slides/slide4.xml><?xml version="1.0" encoding="utf-8"?>
+<p:sld xmlns:a="http://schemas.openxmlformats.org/drawingml/2006/main" xmlns:r="http://schemas.openxmlformats.org/officeDocument/2006/relationships" xmlns:p="http://schemas.openxmlformats.org/presentationml/2006/main">
+  <p:cSld>
+    <p:spTree>
+      <p:nvGrpSpPr>
+        <p:cNvPr id="1" name=""/>
+        <p:cNvGrpSpPr/>
+        <p:nvPr/>
+      </p:nvGrpSpPr>
+      <p:grpSpPr>
+        <a:xfrm>
+          <a:off x="0" y="0"/>
+          <a:ext cx="0" cy="0"/>
+          <a:chOff x="0" y="0"/>
+          <a:chExt cx="0" cy="0"/>
+        </a:xfrm>
+      </p:grpSpPr>
+      <p:graphicFrame>
+        <p:nvGraphicFramePr>
+          <p:cNvPr id="10" name="Table 9">
+            <a:extLst>
+              <a:ext uri="{FF2B5EF4-FFF2-40B4-BE49-F238E27FC236}">
+                <a16:creationId xmlns:a16="http://schemas.microsoft.com/office/drawing/2014/main" id="{799EA228-3090-514D-B56C-1EA6BBBFF0DC}"/>
+              </a:ext>
+            </a:extLst>
+          </p:cNvPr>
+          <p:cNvGraphicFramePr>
+            <a:graphicFrameLocks noGrp="1"/>
+          </p:cNvGraphicFramePr>
+          <p:nvPr>
+            <p:extLst>
+              <p:ext uri="{D42A27DB-BD31-4B8C-83A1-F6EECF244321}">
+                <p14:modId xmlns:p14="http://schemas.microsoft.com/office/powerpoint/2010/main" val="3436185189"/>
+              </p:ext>
+            </p:extLst>
+          </p:nvPr>
+        </p:nvGraphicFramePr>
+        <p:xfrm>
+          <a:off x="8776660" y="1284479"/>
+          <a:ext cx="1882077" cy="2741283"/>
+        </p:xfrm>
+        <a:graphic>
+          <a:graphicData uri="http://schemas.openxmlformats.org/drawingml/2006/table">
+            <a:tbl>
+              <a:tblPr firstRow="1" bandRow="1">
+                <a:tableStyleId>{5C22544A-7EE6-4342-B048-85BDC9FD1C3A}</a:tableStyleId>
+              </a:tblPr>
+              <a:tblGrid>
+                <a:gridCol w="467942">
+                  <a:extLst>
+                    <a:ext uri="{9D8B030D-6E8A-4147-A177-3AD203B41FA5}">
+                      <a16:colId xmlns:a16="http://schemas.microsoft.com/office/drawing/2014/main" val="1814196662"/>
+                    </a:ext>
+                  </a:extLst>
+                </a:gridCol>
+                <a:gridCol w="1414135">
+                  <a:extLst>
+                    <a:ext uri="{9D8B030D-6E8A-4147-A177-3AD203B41FA5}">
+                      <a16:colId xmlns:a16="http://schemas.microsoft.com/office/drawing/2014/main" val="254236435"/>
+                    </a:ext>
+                  </a:extLst>
+                </a:gridCol>
+              </a:tblGrid>
+              <a:tr h="541007">
+                <a:tc>
+                  <a:txBody>
+                    <a:bodyPr/>
+                    <a:lstStyle/>
+                    <a:p>
+                      <a:r>
+                        <a:rPr lang="en-US" dirty="0"/>
+                        <a:t>id</a:t>
+                      </a:r>
+                    </a:p>
+                  </a:txBody>
+                  <a:tcPr/>
+                </a:tc>
+                <a:tc>
+                  <a:txBody>
+                    <a:bodyPr/>
+                    <a:lstStyle/>
+                    <a:p>
+                      <a:r>
+                        <a:rPr lang="en-US" dirty="0"/>
+                        <a:t>name</a:t>
+                      </a:r>
+                    </a:p>
+                  </a:txBody>
+                  <a:tcPr/>
+                </a:tc>
+                <a:extLst>
+                  <a:ext uri="{0D108BD9-81ED-4DB2-BD59-A6C34878D82A}">
+                    <a16:rowId xmlns:a16="http://schemas.microsoft.com/office/drawing/2014/main" val="3375024876"/>
+                  </a:ext>
+                </a:extLst>
+              </a:tr>
+              <a:tr h="550069">
+                <a:tc>
+                  <a:txBody>
+                    <a:bodyPr/>
+                    <a:lstStyle/>
+                    <a:p>
+                      <a:r>
+                        <a:rPr lang="en-US" dirty="0"/>
+                        <a:t>1</a:t>
+                      </a:r>
+                    </a:p>
+                  </a:txBody>
+                  <a:tcPr/>
+                </a:tc>
+                <a:tc>
+                  <a:txBody>
+                    <a:bodyPr/>
+                    <a:lstStyle/>
+                    <a:p>
+                      <a:r>
+                        <a:rPr lang="en-US" dirty="0"/>
+                        <a:t>NGO 1</a:t>
+                      </a:r>
+                    </a:p>
+                  </a:txBody>
+                  <a:tcPr/>
+                </a:tc>
+                <a:extLst>
+                  <a:ext uri="{0D108BD9-81ED-4DB2-BD59-A6C34878D82A}">
+                    <a16:rowId xmlns:a16="http://schemas.microsoft.com/office/drawing/2014/main" val="1096633820"/>
+                  </a:ext>
+                </a:extLst>
+              </a:tr>
+              <a:tr h="550069">
+                <a:tc>
+                  <a:txBody>
+                    <a:bodyPr/>
+                    <a:lstStyle/>
+                    <a:p>
+                      <a:r>
+                        <a:rPr lang="en-US" dirty="0"/>
+                        <a:t>2</a:t>
+                      </a:r>
+                    </a:p>
+                  </a:txBody>
+                  <a:tcPr/>
+                </a:tc>
+                <a:tc>
+                  <a:txBody>
+                    <a:bodyPr/>
+                    <a:lstStyle/>
+                    <a:p>
+                      <a:r>
+                        <a:rPr lang="en-US" dirty="0"/>
+                        <a:t>NGO 2</a:t>
+                      </a:r>
+                    </a:p>
+                  </a:txBody>
+                  <a:tcPr/>
+                </a:tc>
+                <a:extLst>
+                  <a:ext uri="{0D108BD9-81ED-4DB2-BD59-A6C34878D82A}">
+                    <a16:rowId xmlns:a16="http://schemas.microsoft.com/office/drawing/2014/main" val="2502785895"/>
+                  </a:ext>
+                </a:extLst>
+              </a:tr>
+              <a:tr h="550069">
+                <a:tc>
+                  <a:txBody>
+                    <a:bodyPr/>
+                    <a:lstStyle/>
+                    <a:p>
+                      <a:r>
+                        <a:rPr lang="en-US" dirty="0"/>
+                        <a:t>3</a:t>
+                      </a:r>
+                    </a:p>
+                  </a:txBody>
+                  <a:tcPr/>
+                </a:tc>
+                <a:tc>
+                  <a:txBody>
+                    <a:bodyPr/>
+                    <a:lstStyle/>
+                    <a:p>
+                      <a:r>
+                        <a:rPr lang="en-US" dirty="0"/>
+                        <a:t>NGO 3</a:t>
+                      </a:r>
+                    </a:p>
+                  </a:txBody>
+                  <a:tcPr/>
+                </a:tc>
+                <a:extLst>
+                  <a:ext uri="{0D108BD9-81ED-4DB2-BD59-A6C34878D82A}">
+                    <a16:rowId xmlns:a16="http://schemas.microsoft.com/office/drawing/2014/main" val="3585364205"/>
+                  </a:ext>
+                </a:extLst>
+              </a:tr>
+              <a:tr h="550069">
+                <a:tc>
+                  <a:txBody>
+                    <a:bodyPr/>
+                    <a:lstStyle/>
+                    <a:p>
+                      <a:r>
+                        <a:rPr lang="en-US" dirty="0"/>
+                        <a:t>4</a:t>
+                      </a:r>
+                    </a:p>
+                  </a:txBody>
+                  <a:tcPr/>
+                </a:tc>
+                <a:tc>
+                  <a:txBody>
+                    <a:bodyPr/>
+                    <a:lstStyle/>
+                    <a:p>
+                      <a:r>
+                        <a:rPr lang="en-US" dirty="0"/>
+                        <a:t>NGO 4</a:t>
+                      </a:r>
+                    </a:p>
+                  </a:txBody>
+                  <a:tcPr/>
+                </a:tc>
+                <a:extLst>
+                  <a:ext uri="{0D108BD9-81ED-4DB2-BD59-A6C34878D82A}">
+                    <a16:rowId xmlns:a16="http://schemas.microsoft.com/office/drawing/2014/main" val="1151712161"/>
+                  </a:ext>
+                </a:extLst>
+              </a:tr>
+            </a:tbl>
+          </a:graphicData>
+        </a:graphic>
+      </p:graphicFrame>
+      <p:graphicFrame>
+        <p:nvGraphicFramePr>
+          <p:cNvPr id="11" name="Table 10">
+            <a:extLst>
+              <a:ext uri="{FF2B5EF4-FFF2-40B4-BE49-F238E27FC236}">
+                <a16:creationId xmlns:a16="http://schemas.microsoft.com/office/drawing/2014/main" id="{544C7A9B-CB2A-3743-AFD2-7B6D9354F9D4}"/>
+              </a:ext>
+            </a:extLst>
+          </p:cNvPr>
+          <p:cNvGraphicFramePr>
+            <a:graphicFrameLocks noGrp="1"/>
+          </p:cNvGraphicFramePr>
+          <p:nvPr>
+            <p:extLst>
+              <p:ext uri="{D42A27DB-BD31-4B8C-83A1-F6EECF244321}">
+                <p14:modId xmlns:p14="http://schemas.microsoft.com/office/powerpoint/2010/main" val="384401904"/>
+              </p:ext>
+            </p:extLst>
+          </p:nvPr>
+        </p:nvGraphicFramePr>
+        <p:xfrm>
+          <a:off x="1113897" y="1284479"/>
+          <a:ext cx="1882077" cy="2750345"/>
+        </p:xfrm>
+        <a:graphic>
+          <a:graphicData uri="http://schemas.openxmlformats.org/drawingml/2006/table">
+            <a:tbl>
+              <a:tblPr firstRow="1" bandRow="1">
+                <a:tableStyleId>{5C22544A-7EE6-4342-B048-85BDC9FD1C3A}</a:tableStyleId>
+              </a:tblPr>
+              <a:tblGrid>
+                <a:gridCol w="413068">
+                  <a:extLst>
+                    <a:ext uri="{9D8B030D-6E8A-4147-A177-3AD203B41FA5}">
+                      <a16:colId xmlns:a16="http://schemas.microsoft.com/office/drawing/2014/main" val="1814196662"/>
+                    </a:ext>
+                  </a:extLst>
+                </a:gridCol>
+                <a:gridCol w="1469009">
+                  <a:extLst>
+                    <a:ext uri="{9D8B030D-6E8A-4147-A177-3AD203B41FA5}">
+                      <a16:colId xmlns:a16="http://schemas.microsoft.com/office/drawing/2014/main" val="144704008"/>
+                    </a:ext>
+                  </a:extLst>
+                </a:gridCol>
+              </a:tblGrid>
+              <a:tr h="550069">
+                <a:tc>
+                  <a:txBody>
+                    <a:bodyPr/>
+                    <a:lstStyle/>
+                    <a:p>
+                      <a:r>
+                        <a:rPr lang="en-US" dirty="0"/>
+                        <a:t>id</a:t>
+                      </a:r>
+                    </a:p>
+                  </a:txBody>
+                  <a:tcPr/>
+                </a:tc>
+                <a:tc>
+                  <a:txBody>
+                    <a:bodyPr/>
+                    <a:lstStyle/>
+                    <a:p>
+                      <a:r>
+                        <a:rPr lang="en-US" dirty="0"/>
+                        <a:t>name</a:t>
+                      </a:r>
+                    </a:p>
+                  </a:txBody>
+                  <a:tcPr/>
+                </a:tc>
+                <a:extLst>
+                  <a:ext uri="{0D108BD9-81ED-4DB2-BD59-A6C34878D82A}">
+                    <a16:rowId xmlns:a16="http://schemas.microsoft.com/office/drawing/2014/main" val="3375024876"/>
+                  </a:ext>
+                </a:extLst>
+              </a:tr>
+              <a:tr h="550069">
+                <a:tc>
+                  <a:txBody>
+                    <a:bodyPr/>
+                    <a:lstStyle/>
+                    <a:p>
+                      <a:r>
+                        <a:rPr lang="en-US" dirty="0"/>
+                        <a:t>1</a:t>
+                      </a:r>
+                    </a:p>
+                  </a:txBody>
+                  <a:tcPr/>
+                </a:tc>
+                <a:tc>
+                  <a:txBody>
+                    <a:bodyPr/>
+                    <a:lstStyle/>
+                    <a:p>
+                      <a:r>
+                        <a:rPr lang="en-US" dirty="0"/>
+                        <a:t>Baringo</a:t>
+                      </a:r>
+                    </a:p>
+                  </a:txBody>
+                  <a:tcPr/>
+                </a:tc>
+                <a:extLst>
+                  <a:ext uri="{0D108BD9-81ED-4DB2-BD59-A6C34878D82A}">
+                    <a16:rowId xmlns:a16="http://schemas.microsoft.com/office/drawing/2014/main" val="1096633820"/>
+                  </a:ext>
+                </a:extLst>
+              </a:tr>
+              <a:tr h="550069">
+                <a:tc>
+                  <a:txBody>
+                    <a:bodyPr/>
+                    <a:lstStyle/>
+                    <a:p>
+                      <a:r>
+                        <a:rPr lang="en-US" dirty="0"/>
+                        <a:t>2</a:t>
+                      </a:r>
+                    </a:p>
+                  </a:txBody>
+                  <a:tcPr/>
+                </a:tc>
+                <a:tc>
+                  <a:txBody>
+                    <a:bodyPr/>
+                    <a:lstStyle/>
+                    <a:p>
+                      <a:r>
+                        <a:rPr lang="en-US" dirty="0" err="1"/>
+                        <a:t>Bomet</a:t>
+                      </a:r>
+                      <a:endParaRPr lang="en-US" dirty="0"/>
+                    </a:p>
+                  </a:txBody>
+                  <a:tcPr/>
+                </a:tc>
+                <a:extLst>
+                  <a:ext uri="{0D108BD9-81ED-4DB2-BD59-A6C34878D82A}">
+                    <a16:rowId xmlns:a16="http://schemas.microsoft.com/office/drawing/2014/main" val="2502785895"/>
+                  </a:ext>
+                </a:extLst>
+              </a:tr>
+              <a:tr h="550069">
+                <a:tc>
+                  <a:txBody>
+                    <a:bodyPr/>
+                    <a:lstStyle/>
+                    <a:p>
+                      <a:r>
+                        <a:rPr lang="en-US" dirty="0"/>
+                        <a:t>3</a:t>
+                      </a:r>
+                    </a:p>
+                  </a:txBody>
+                  <a:tcPr/>
+                </a:tc>
+                <a:tc>
+                  <a:txBody>
+                    <a:bodyPr/>
+                    <a:lstStyle/>
+                    <a:p>
+                      <a:r>
+                        <a:rPr lang="en-US" dirty="0"/>
+                        <a:t>Bungoma</a:t>
+                      </a:r>
+                    </a:p>
+                  </a:txBody>
+                  <a:tcPr/>
+                </a:tc>
+                <a:extLst>
+                  <a:ext uri="{0D108BD9-81ED-4DB2-BD59-A6C34878D82A}">
+                    <a16:rowId xmlns:a16="http://schemas.microsoft.com/office/drawing/2014/main" val="3585364205"/>
+                  </a:ext>
+                </a:extLst>
+              </a:tr>
+              <a:tr h="550069">
+                <a:tc>
+                  <a:txBody>
+                    <a:bodyPr/>
+                    <a:lstStyle/>
+                    <a:p>
+                      <a:r>
+                        <a:rPr lang="en-US" dirty="0"/>
+                        <a:t>4</a:t>
+                      </a:r>
+                    </a:p>
+                  </a:txBody>
+                  <a:tcPr/>
+                </a:tc>
+                <a:tc>
+                  <a:txBody>
+                    <a:bodyPr/>
+                    <a:lstStyle/>
+                    <a:p>
+                      <a:r>
+                        <a:rPr lang="en-US" dirty="0"/>
+                        <a:t>Busia</a:t>
+                      </a:r>
+                    </a:p>
+                  </a:txBody>
+                  <a:tcPr/>
+                </a:tc>
+                <a:extLst>
+                  <a:ext uri="{0D108BD9-81ED-4DB2-BD59-A6C34878D82A}">
+                    <a16:rowId xmlns:a16="http://schemas.microsoft.com/office/drawing/2014/main" val="1151712161"/>
+                  </a:ext>
+                </a:extLst>
+              </a:tr>
+            </a:tbl>
+          </a:graphicData>
+        </a:graphic>
+      </p:graphicFrame>
+      <p:sp>
+        <p:nvSpPr>
+          <p:cNvPr id="12" name="TextBox 11">
+            <a:extLst>
+              <a:ext uri="{FF2B5EF4-FFF2-40B4-BE49-F238E27FC236}">
+                <a16:creationId xmlns:a16="http://schemas.microsoft.com/office/drawing/2014/main" id="{FC6DC9A1-82C1-994A-813A-5A2658AACA26}"/>
+              </a:ext>
+            </a:extLst>
+          </p:cNvPr>
+          <p:cNvSpPr txBox="1"/>
+          <p:nvPr/>
+        </p:nvSpPr>
+        <p:spPr>
+          <a:xfrm>
+            <a:off x="9163215" y="482158"/>
+            <a:ext cx="1108966" cy="584775"/>
+          </a:xfrm>
+          <a:prstGeom prst="rect">
+            <a:avLst/>
+          </a:prstGeom>
+          <a:noFill/>
+        </p:spPr>
+        <p:txBody>
+          <a:bodyPr wrap="square" rtlCol="0">
+            <a:spAutoFit/>
+          </a:bodyPr>
+          <a:lstStyle/>
+          <a:p>
+            <a:pPr algn="ctr"/>
+            <a:r>
+              <a:rPr lang="en-US" sz="3200" b="1" dirty="0" err="1"/>
+              <a:t>ngos</a:t>
+            </a:r>
+            <a:endParaRPr lang="en-US" sz="3200" b="1" dirty="0"/>
+          </a:p>
+        </p:txBody>
+      </p:sp>
+      <p:sp>
+        <p:nvSpPr>
+          <p:cNvPr id="13" name="TextBox 12">
+            <a:extLst>
+              <a:ext uri="{FF2B5EF4-FFF2-40B4-BE49-F238E27FC236}">
+                <a16:creationId xmlns:a16="http://schemas.microsoft.com/office/drawing/2014/main" id="{28DCB725-B7B2-3445-A932-CECF62483DE8}"/>
+              </a:ext>
+            </a:extLst>
+          </p:cNvPr>
+          <p:cNvSpPr txBox="1"/>
+          <p:nvPr/>
+        </p:nvSpPr>
+        <p:spPr>
+          <a:xfrm>
+            <a:off x="1242533" y="482158"/>
+            <a:ext cx="1624804" cy="584775"/>
+          </a:xfrm>
+          <a:prstGeom prst="rect">
+            <a:avLst/>
+          </a:prstGeom>
+          <a:noFill/>
+        </p:spPr>
+        <p:txBody>
+          <a:bodyPr wrap="none" rtlCol="0">
+            <a:spAutoFit/>
+          </a:bodyPr>
+          <a:lstStyle/>
+          <a:p>
+            <a:pPr algn="ctr"/>
+            <a:r>
+              <a:rPr lang="en-US" sz="3200" b="1" dirty="0"/>
+              <a:t>counties</a:t>
+            </a:r>
+          </a:p>
+        </p:txBody>
+      </p:sp>
+      <p:graphicFrame>
+        <p:nvGraphicFramePr>
+          <p:cNvPr id="6" name="Table 5">
+            <a:extLst>
+              <a:ext uri="{FF2B5EF4-FFF2-40B4-BE49-F238E27FC236}">
+                <a16:creationId xmlns:a16="http://schemas.microsoft.com/office/drawing/2014/main" id="{748A1390-6088-E94C-B1C5-B31B86638A9F}"/>
+              </a:ext>
+            </a:extLst>
+          </p:cNvPr>
+          <p:cNvGraphicFramePr>
+            <a:graphicFrameLocks noGrp="1"/>
+          </p:cNvGraphicFramePr>
+          <p:nvPr>
+            <p:extLst>
+              <p:ext uri="{D42A27DB-BD31-4B8C-83A1-F6EECF244321}">
+                <p14:modId xmlns:p14="http://schemas.microsoft.com/office/powerpoint/2010/main" val="3497329432"/>
+              </p:ext>
+            </p:extLst>
+          </p:nvPr>
+        </p:nvGraphicFramePr>
+        <p:xfrm>
+          <a:off x="4675456" y="1284479"/>
+          <a:ext cx="2421722" cy="4950621"/>
+        </p:xfrm>
+        <a:graphic>
+          <a:graphicData uri="http://schemas.openxmlformats.org/drawingml/2006/table">
+            <a:tbl>
+              <a:tblPr firstRow="1" bandRow="1">
+                <a:tableStyleId>{5C22544A-7EE6-4342-B048-85BDC9FD1C3A}</a:tableStyleId>
+              </a:tblPr>
+              <a:tblGrid>
+                <a:gridCol w="1201237">
+                  <a:extLst>
+                    <a:ext uri="{9D8B030D-6E8A-4147-A177-3AD203B41FA5}">
+                      <a16:colId xmlns:a16="http://schemas.microsoft.com/office/drawing/2014/main" val="1814196662"/>
+                    </a:ext>
+                  </a:extLst>
+                </a:gridCol>
+                <a:gridCol w="1220485">
+                  <a:extLst>
+                    <a:ext uri="{9D8B030D-6E8A-4147-A177-3AD203B41FA5}">
+                      <a16:colId xmlns:a16="http://schemas.microsoft.com/office/drawing/2014/main" val="254236435"/>
+                    </a:ext>
+                  </a:extLst>
+                </a:gridCol>
+              </a:tblGrid>
+              <a:tr h="550069">
+                <a:tc>
+                  <a:txBody>
+                    <a:bodyPr/>
+                    <a:lstStyle/>
+                    <a:p>
+                      <a:r>
+                        <a:rPr lang="en-US" dirty="0" err="1"/>
+                        <a:t>county_id</a:t>
+                      </a:r>
+                      <a:endParaRPr lang="en-US" dirty="0"/>
+                    </a:p>
+                  </a:txBody>
+                  <a:tcPr/>
+                </a:tc>
+                <a:tc>
+                  <a:txBody>
+                    <a:bodyPr/>
+                    <a:lstStyle/>
+                    <a:p>
+                      <a:r>
+                        <a:rPr lang="en-US" dirty="0" err="1"/>
+                        <a:t>ngo_id</a:t>
+                      </a:r>
+                      <a:endParaRPr lang="en-US" dirty="0"/>
+                    </a:p>
+                  </a:txBody>
+                  <a:tcPr/>
+                </a:tc>
+                <a:extLst>
+                  <a:ext uri="{0D108BD9-81ED-4DB2-BD59-A6C34878D82A}">
+                    <a16:rowId xmlns:a16="http://schemas.microsoft.com/office/drawing/2014/main" val="3375024876"/>
+                  </a:ext>
+                </a:extLst>
+              </a:tr>
+              <a:tr h="550069">
+                <a:tc>
+                  <a:txBody>
+                    <a:bodyPr/>
+                    <a:lstStyle/>
+                    <a:p>
+                      <a:r>
+                        <a:rPr lang="en-US" dirty="0"/>
+                        <a:t>1</a:t>
+                      </a:r>
+                    </a:p>
+                  </a:txBody>
+                  <a:tcPr/>
+                </a:tc>
+                <a:tc>
+                  <a:txBody>
+                    <a:bodyPr/>
+                    <a:lstStyle/>
+                    <a:p>
+                      <a:r>
+                        <a:rPr lang="en-US" dirty="0"/>
+                        <a:t>1</a:t>
+                      </a:r>
+                    </a:p>
+                  </a:txBody>
+                  <a:tcPr/>
+                </a:tc>
+                <a:extLst>
+                  <a:ext uri="{0D108BD9-81ED-4DB2-BD59-A6C34878D82A}">
+                    <a16:rowId xmlns:a16="http://schemas.microsoft.com/office/drawing/2014/main" val="1096633820"/>
+                  </a:ext>
+                </a:extLst>
+              </a:tr>
+              <a:tr h="550069">
+                <a:tc>
+                  <a:txBody>
+                    <a:bodyPr/>
+                    <a:lstStyle/>
+                    <a:p>
+                      <a:r>
+                        <a:rPr lang="en-US" dirty="0"/>
+                        <a:t>1</a:t>
+                      </a:r>
+                    </a:p>
+                  </a:txBody>
+                  <a:tcPr/>
+                </a:tc>
+                <a:tc>
+                  <a:txBody>
+                    <a:bodyPr/>
+                    <a:lstStyle/>
+                    <a:p>
+                      <a:r>
+                        <a:rPr lang="en-US" dirty="0"/>
+                        <a:t>3</a:t>
+                      </a:r>
+                    </a:p>
+                  </a:txBody>
+                  <a:tcPr/>
+                </a:tc>
+                <a:extLst>
+                  <a:ext uri="{0D108BD9-81ED-4DB2-BD59-A6C34878D82A}">
+                    <a16:rowId xmlns:a16="http://schemas.microsoft.com/office/drawing/2014/main" val="2502785895"/>
+                  </a:ext>
+                </a:extLst>
+              </a:tr>
+              <a:tr h="550069">
+                <a:tc>
+                  <a:txBody>
+                    <a:bodyPr/>
+                    <a:lstStyle/>
+                    <a:p>
+                      <a:r>
+                        <a:rPr lang="en-US" dirty="0"/>
+                        <a:t>1</a:t>
+                      </a:r>
+                    </a:p>
+                  </a:txBody>
+                  <a:tcPr/>
+                </a:tc>
+                <a:tc>
+                  <a:txBody>
+                    <a:bodyPr/>
+                    <a:lstStyle/>
+                    <a:p>
+                      <a:r>
+                        <a:rPr lang="en-US" dirty="0"/>
+                        <a:t>4</a:t>
+                      </a:r>
+                    </a:p>
+                  </a:txBody>
+                  <a:tcPr/>
+                </a:tc>
+                <a:extLst>
+                  <a:ext uri="{0D108BD9-81ED-4DB2-BD59-A6C34878D82A}">
+                    <a16:rowId xmlns:a16="http://schemas.microsoft.com/office/drawing/2014/main" val="3585364205"/>
+                  </a:ext>
+                </a:extLst>
+              </a:tr>
+              <a:tr h="550069">
+                <a:tc>
+                  <a:txBody>
+                    <a:bodyPr/>
+                    <a:lstStyle/>
+                    <a:p>
+                      <a:r>
+                        <a:rPr lang="en-US" dirty="0"/>
+                        <a:t>2</a:t>
+                      </a:r>
+                    </a:p>
+                  </a:txBody>
+                  <a:tcPr/>
+                </a:tc>
+                <a:tc>
+                  <a:txBody>
+                    <a:bodyPr/>
+                    <a:lstStyle/>
+                    <a:p>
+                      <a:r>
+                        <a:rPr lang="en-US" dirty="0"/>
+                        <a:t>1</a:t>
+                      </a:r>
+                    </a:p>
+                  </a:txBody>
+                  <a:tcPr/>
+                </a:tc>
+                <a:extLst>
+                  <a:ext uri="{0D108BD9-81ED-4DB2-BD59-A6C34878D82A}">
+                    <a16:rowId xmlns:a16="http://schemas.microsoft.com/office/drawing/2014/main" val="1151712161"/>
+                  </a:ext>
+                </a:extLst>
+              </a:tr>
+              <a:tr h="550069">
+                <a:tc>
+                  <a:txBody>
+                    <a:bodyPr/>
+                    <a:lstStyle/>
+                    <a:p>
+                      <a:r>
+                        <a:rPr lang="en-US" dirty="0"/>
+                        <a:t>3</a:t>
+                      </a:r>
+                    </a:p>
+                  </a:txBody>
+                  <a:tcPr/>
+                </a:tc>
+                <a:tc>
+                  <a:txBody>
+                    <a:bodyPr/>
+                    <a:lstStyle/>
+                    <a:p>
+                      <a:r>
+                        <a:rPr lang="en-US" dirty="0"/>
+                        <a:t>2</a:t>
+                      </a:r>
+                    </a:p>
+                  </a:txBody>
+                  <a:tcPr/>
+                </a:tc>
+                <a:extLst>
+                  <a:ext uri="{0D108BD9-81ED-4DB2-BD59-A6C34878D82A}">
+                    <a16:rowId xmlns:a16="http://schemas.microsoft.com/office/drawing/2014/main" val="1840405720"/>
+                  </a:ext>
+                </a:extLst>
+              </a:tr>
+              <a:tr h="550069">
+                <a:tc>
+                  <a:txBody>
+                    <a:bodyPr/>
+                    <a:lstStyle/>
+                    <a:p>
+                      <a:r>
+                        <a:rPr lang="en-US" dirty="0"/>
+                        <a:t>3</a:t>
+                      </a:r>
+                    </a:p>
+                  </a:txBody>
+                  <a:tcPr/>
+                </a:tc>
+                <a:tc>
+                  <a:txBody>
+                    <a:bodyPr/>
+                    <a:lstStyle/>
+                    <a:p>
+                      <a:r>
+                        <a:rPr lang="en-US" dirty="0"/>
+                        <a:t>3</a:t>
+                      </a:r>
+                    </a:p>
+                  </a:txBody>
+                  <a:tcPr/>
+                </a:tc>
+                <a:extLst>
+                  <a:ext uri="{0D108BD9-81ED-4DB2-BD59-A6C34878D82A}">
+                    <a16:rowId xmlns:a16="http://schemas.microsoft.com/office/drawing/2014/main" val="1653717787"/>
+                  </a:ext>
+                </a:extLst>
+              </a:tr>
+              <a:tr h="550069">
+                <a:tc>
+                  <a:txBody>
+                    <a:bodyPr/>
+                    <a:lstStyle/>
+                    <a:p>
+                      <a:r>
+                        <a:rPr lang="en-US" dirty="0"/>
+                        <a:t>4</a:t>
+                      </a:r>
+                    </a:p>
+                  </a:txBody>
+                  <a:tcPr/>
+                </a:tc>
+                <a:tc>
+                  <a:txBody>
+                    <a:bodyPr/>
+                    <a:lstStyle/>
+                    <a:p>
+                      <a:r>
+                        <a:rPr lang="en-US" dirty="0"/>
+                        <a:t>2</a:t>
+                      </a:r>
+                    </a:p>
+                  </a:txBody>
+                  <a:tcPr/>
+                </a:tc>
+                <a:extLst>
+                  <a:ext uri="{0D108BD9-81ED-4DB2-BD59-A6C34878D82A}">
+                    <a16:rowId xmlns:a16="http://schemas.microsoft.com/office/drawing/2014/main" val="922176178"/>
+                  </a:ext>
+                </a:extLst>
+              </a:tr>
+              <a:tr h="550069">
+                <a:tc>
+                  <a:txBody>
+                    <a:bodyPr/>
+                    <a:lstStyle/>
+                    <a:p>
+                      <a:r>
+                        <a:rPr lang="en-US" dirty="0"/>
+                        <a:t>4</a:t>
+                      </a:r>
+                    </a:p>
+                  </a:txBody>
+                  <a:tcPr/>
+                </a:tc>
+                <a:tc>
+                  <a:txBody>
+                    <a:bodyPr/>
+                    <a:lstStyle/>
+                    <a:p>
+                      <a:r>
+                        <a:rPr lang="en-US" dirty="0"/>
+                        <a:t>3</a:t>
+                      </a:r>
+                    </a:p>
+                  </a:txBody>
+                  <a:tcPr/>
+                </a:tc>
+                <a:extLst>
+                  <a:ext uri="{0D108BD9-81ED-4DB2-BD59-A6C34878D82A}">
+                    <a16:rowId xmlns:a16="http://schemas.microsoft.com/office/drawing/2014/main" val="1896029795"/>
+                  </a:ext>
+                </a:extLst>
+              </a:tr>
+            </a:tbl>
+          </a:graphicData>
+        </a:graphic>
+      </p:graphicFrame>
+      <p:sp>
+        <p:nvSpPr>
+          <p:cNvPr id="7" name="TextBox 6">
+            <a:extLst>
+              <a:ext uri="{FF2B5EF4-FFF2-40B4-BE49-F238E27FC236}">
+                <a16:creationId xmlns:a16="http://schemas.microsoft.com/office/drawing/2014/main" id="{BA239142-9089-9C42-996E-B14C56B3589D}"/>
+              </a:ext>
+            </a:extLst>
+          </p:cNvPr>
+          <p:cNvSpPr txBox="1"/>
+          <p:nvPr/>
+        </p:nvSpPr>
+        <p:spPr>
+          <a:xfrm>
+            <a:off x="4464463" y="458528"/>
+            <a:ext cx="2786981" cy="461665"/>
+          </a:xfrm>
+          <a:prstGeom prst="rect">
+            <a:avLst/>
+          </a:prstGeom>
+          <a:noFill/>
+        </p:spPr>
+        <p:txBody>
+          <a:bodyPr wrap="none" rtlCol="0">
+            <a:spAutoFit/>
+          </a:bodyPr>
+          <a:lstStyle/>
+          <a:p>
+            <a:pPr algn="ctr"/>
+            <a:r>
+              <a:rPr lang="en-US" sz="2400" b="1" dirty="0"/>
+              <a:t>_</a:t>
+            </a:r>
+            <a:r>
+              <a:rPr lang="en-US" sz="2400" b="1" dirty="0" err="1"/>
+              <a:t>link_counties_ngos</a:t>
+            </a:r>
+            <a:endParaRPr lang="en-US" sz="2400" b="1" dirty="0"/>
+          </a:p>
+        </p:txBody>
+      </p:sp>
+    </p:spTree>
+    <p:extLst>
+      <p:ext uri="{BB962C8B-B14F-4D97-AF65-F5344CB8AC3E}">
+        <p14:creationId xmlns:p14="http://schemas.microsoft.com/office/powerpoint/2010/main" val="3806020080"/>
+      </p:ext>
+    </p:extLst>
+  </p:cSld>
+  <p:clrMapOvr>
+    <a:masterClrMapping/>
+  </p:clrMapOvr>
+</p:sld>
+</file>
+
+<file path=ppt/slides/slide5.xml><?xml version="1.0" encoding="utf-8"?>
+<p:sld xmlns:a="http://schemas.openxmlformats.org/drawingml/2006/main" xmlns:r="http://schemas.openxmlformats.org/officeDocument/2006/relationships" xmlns:p="http://schemas.openxmlformats.org/presentationml/2006/main">
+  <p:cSld>
+    <p:spTree>
+      <p:nvGrpSpPr>
+        <p:cNvPr id="1" name=""/>
+        <p:cNvGrpSpPr/>
+        <p:nvPr/>
+      </p:nvGrpSpPr>
+      <p:grpSpPr>
+        <a:xfrm>
+          <a:off x="0" y="0"/>
+          <a:ext cx="0" cy="0"/>
+          <a:chOff x="0" y="0"/>
+          <a:chExt cx="0" cy="0"/>
+        </a:xfrm>
+      </p:grpSpPr>
+      <p:sp>
+        <p:nvSpPr>
+          <p:cNvPr id="2" name="Oval 1">
+            <a:extLst>
+              <a:ext uri="{FF2B5EF4-FFF2-40B4-BE49-F238E27FC236}">
+                <a16:creationId xmlns:a16="http://schemas.microsoft.com/office/drawing/2014/main" id="{1E8BFE1C-B07A-6845-877B-D7D4983D0CC7}"/>
+              </a:ext>
+            </a:extLst>
+          </p:cNvPr>
+          <p:cNvSpPr/>
+          <p:nvPr/>
+        </p:nvSpPr>
+        <p:spPr>
+          <a:xfrm>
+            <a:off x="5764931" y="787775"/>
+            <a:ext cx="5670167" cy="5128329"/>
+          </a:xfrm>
+          <a:prstGeom prst="ellipse">
+            <a:avLst/>
+          </a:prstGeom>
+          <a:solidFill>
+            <a:schemeClr val="accent5">
+              <a:lumMod val="20000"/>
+              <a:lumOff val="80000"/>
+            </a:schemeClr>
+          </a:solidFill>
+        </p:spPr>
+        <p:style>
+          <a:lnRef idx="2">
+            <a:schemeClr val="accent1">
+              <a:shade val="50000"/>
+            </a:schemeClr>
+          </a:lnRef>
+          <a:fillRef idx="1">
+            <a:schemeClr val="accent1"/>
+          </a:fillRef>
+          <a:effectRef idx="0">
+            <a:schemeClr val="accent1"/>
+          </a:effectRef>
+          <a:fontRef idx="minor">
+            <a:schemeClr val="lt1"/>
+          </a:fontRef>
+        </p:style>
+        <p:txBody>
+          <a:bodyPr rtlCol="0" anchor="ctr"/>
+          <a:lstStyle/>
+          <a:p>
+            <a:pPr algn="ctr"/>
+            <a:endParaRPr lang="en-US" dirty="0"/>
+          </a:p>
+        </p:txBody>
+      </p:sp>
+      <p:sp>
+        <p:nvSpPr>
+          <p:cNvPr id="3" name="TextBox 2">
+            <a:extLst>
+              <a:ext uri="{FF2B5EF4-FFF2-40B4-BE49-F238E27FC236}">
+                <a16:creationId xmlns:a16="http://schemas.microsoft.com/office/drawing/2014/main" id="{D6201E39-EE90-8445-BEC7-09CA0C6C1270}"/>
+              </a:ext>
+            </a:extLst>
+          </p:cNvPr>
+          <p:cNvSpPr txBox="1"/>
+          <p:nvPr/>
+        </p:nvSpPr>
+        <p:spPr>
+          <a:xfrm>
+            <a:off x="8097408" y="1212365"/>
+            <a:ext cx="1005212" cy="461665"/>
+          </a:xfrm>
+          <a:prstGeom prst="rect">
+            <a:avLst/>
+          </a:prstGeom>
+          <a:noFill/>
+        </p:spPr>
+        <p:txBody>
+          <a:bodyPr wrap="none" rtlCol="0">
+            <a:spAutoFit/>
+          </a:bodyPr>
+          <a:lstStyle/>
+          <a:p>
+            <a:r>
+              <a:rPr lang="en-US" sz="2400" b="1" dirty="0">
+                <a:solidFill>
+                  <a:schemeClr val="accent1"/>
+                </a:solidFill>
+              </a:rPr>
+              <a:t>Server</a:t>
+            </a:r>
+            <a:endParaRPr lang="en-US" b="1" dirty="0">
+              <a:solidFill>
+                <a:schemeClr val="accent1"/>
+              </a:solidFill>
+            </a:endParaRPr>
+          </a:p>
+        </p:txBody>
+      </p:sp>
+      <p:sp>
+        <p:nvSpPr>
+          <p:cNvPr id="25" name="Rounded Rectangle 24">
+            <a:extLst>
+              <a:ext uri="{FF2B5EF4-FFF2-40B4-BE49-F238E27FC236}">
+                <a16:creationId xmlns:a16="http://schemas.microsoft.com/office/drawing/2014/main" id="{D70E2E95-5698-9148-9B9D-72014759EE91}"/>
+              </a:ext>
+            </a:extLst>
+          </p:cNvPr>
+          <p:cNvSpPr/>
+          <p:nvPr/>
+        </p:nvSpPr>
+        <p:spPr>
+          <a:xfrm>
+            <a:off x="2118574" y="2816680"/>
+            <a:ext cx="2541340" cy="1070517"/>
+          </a:xfrm>
+          <a:prstGeom prst="roundRect">
+            <a:avLst/>
+          </a:prstGeom>
+        </p:spPr>
+        <p:style>
+          <a:lnRef idx="2">
+            <a:schemeClr val="accent1">
+              <a:shade val="50000"/>
+            </a:schemeClr>
+          </a:lnRef>
+          <a:fillRef idx="1">
+            <a:schemeClr val="accent1"/>
+          </a:fillRef>
+          <a:effectRef idx="0">
+            <a:schemeClr val="accent1"/>
+          </a:effectRef>
+          <a:fontRef idx="minor">
+            <a:schemeClr val="lt1"/>
+          </a:fontRef>
+        </p:style>
+        <p:txBody>
+          <a:bodyPr rtlCol="0" anchor="ctr"/>
+          <a:lstStyle/>
+          <a:p>
+            <a:pPr algn="ctr"/>
+            <a:r>
+              <a:rPr lang="en-US" dirty="0"/>
+              <a:t>Client (e.g. Heidi)</a:t>
+            </a:r>
+          </a:p>
+        </p:txBody>
+      </p:sp>
+      <p:sp>
+        <p:nvSpPr>
+          <p:cNvPr id="35" name="Right Arrow 34">
+            <a:extLst>
+              <a:ext uri="{FF2B5EF4-FFF2-40B4-BE49-F238E27FC236}">
+                <a16:creationId xmlns:a16="http://schemas.microsoft.com/office/drawing/2014/main" id="{C125DBB6-58A9-0342-B416-0814345A0814}"/>
+              </a:ext>
+            </a:extLst>
+          </p:cNvPr>
+          <p:cNvSpPr/>
+          <p:nvPr/>
+        </p:nvSpPr>
+        <p:spPr>
+          <a:xfrm>
+            <a:off x="4828478" y="3055434"/>
+            <a:ext cx="825190" cy="635620"/>
+          </a:xfrm>
+          <a:prstGeom prst="rightArrow">
+            <a:avLst/>
+          </a:prstGeom>
+        </p:spPr>
+        <p:style>
+          <a:lnRef idx="2">
+            <a:schemeClr val="accent1">
+              <a:shade val="50000"/>
+            </a:schemeClr>
+          </a:lnRef>
+          <a:fillRef idx="1">
+            <a:schemeClr val="accent1"/>
+          </a:fillRef>
+          <a:effectRef idx="0">
+            <a:schemeClr val="accent1"/>
+          </a:effectRef>
+          <a:fontRef idx="minor">
+            <a:schemeClr val="lt1"/>
+          </a:fontRef>
+        </p:style>
+        <p:txBody>
+          <a:bodyPr rtlCol="0" anchor="ctr"/>
+          <a:lstStyle/>
+          <a:p>
+            <a:pPr algn="ctr"/>
+            <a:endParaRPr lang="en-US"/>
+          </a:p>
+        </p:txBody>
+      </p:sp>
+      <p:pic>
+        <p:nvPicPr>
+          <p:cNvPr id="37" name="Graphic 36" descr="User">
+            <a:extLst>
+              <a:ext uri="{FF2B5EF4-FFF2-40B4-BE49-F238E27FC236}">
+                <a16:creationId xmlns:a16="http://schemas.microsoft.com/office/drawing/2014/main" id="{E8D2DF5C-5BC8-9C45-9564-93B53E42E732}"/>
+              </a:ext>
+            </a:extLst>
+          </p:cNvPr>
+          <p:cNvPicPr>
+            <a:picLocks noChangeAspect="1"/>
+          </p:cNvPicPr>
+          <p:nvPr/>
+        </p:nvPicPr>
+        <p:blipFill>
+          <a:blip r:embed="rId2">
+            <a:extLst>
+              <a:ext uri="{96DAC541-7B7A-43D3-8B79-37D633B846F1}">
+                <asvg:svgBlip xmlns:asvg="http://schemas.microsoft.com/office/drawing/2016/SVG/main" r:embed="rId3"/>
+              </a:ext>
+            </a:extLst>
+          </a:blip>
+          <a:stretch>
+            <a:fillRect/>
+          </a:stretch>
+        </p:blipFill>
+        <p:spPr>
+          <a:xfrm>
+            <a:off x="1035610" y="2894738"/>
+            <a:ext cx="914400" cy="914400"/>
+          </a:xfrm>
+          <a:prstGeom prst="rect">
+            <a:avLst/>
+          </a:prstGeom>
+        </p:spPr>
+      </p:pic>
+      <p:grpSp>
+        <p:nvGrpSpPr>
+          <p:cNvPr id="40" name="Group 39">
+            <a:extLst>
+              <a:ext uri="{FF2B5EF4-FFF2-40B4-BE49-F238E27FC236}">
+                <a16:creationId xmlns:a16="http://schemas.microsoft.com/office/drawing/2014/main" id="{D2FECDB1-527A-BD45-B28D-141490D8D5DD}"/>
+              </a:ext>
+            </a:extLst>
+          </p:cNvPr>
+          <p:cNvGrpSpPr/>
+          <p:nvPr/>
+        </p:nvGrpSpPr>
+        <p:grpSpPr>
+          <a:xfrm>
+            <a:off x="6388659" y="2643259"/>
+            <a:ext cx="979052" cy="1269779"/>
+            <a:chOff x="6323385" y="3346362"/>
+            <a:chExt cx="979052" cy="1269779"/>
+          </a:xfrm>
+        </p:grpSpPr>
+        <p:sp>
+          <p:nvSpPr>
+            <p:cNvPr id="34" name="TextBox 33">
+              <a:extLst>
+                <a:ext uri="{FF2B5EF4-FFF2-40B4-BE49-F238E27FC236}">
+                  <a16:creationId xmlns:a16="http://schemas.microsoft.com/office/drawing/2014/main" id="{9AE719B8-B8E1-7A4B-B185-3A3C279238BB}"/>
+                </a:ext>
+              </a:extLst>
+            </p:cNvPr>
+            <p:cNvSpPr txBox="1"/>
+            <p:nvPr/>
+          </p:nvSpPr>
+          <p:spPr>
+            <a:xfrm>
+              <a:off x="6323385" y="4260762"/>
+              <a:ext cx="979052" cy="355379"/>
+            </a:xfrm>
+            <a:prstGeom prst="rect">
+              <a:avLst/>
+            </a:prstGeom>
+            <a:noFill/>
+          </p:spPr>
+          <p:txBody>
+            <a:bodyPr wrap="none" rtlCol="0">
+              <a:spAutoFit/>
+            </a:bodyPr>
+            <a:lstStyle/>
+            <a:p>
+              <a:r>
+                <a:rPr lang="en-US" sz="1600" b="1" dirty="0"/>
+                <a:t>Database</a:t>
+              </a:r>
+            </a:p>
+          </p:txBody>
+        </p:sp>
+        <p:pic>
+          <p:nvPicPr>
+            <p:cNvPr id="39" name="Graphic 38" descr="Database">
+              <a:extLst>
+                <a:ext uri="{FF2B5EF4-FFF2-40B4-BE49-F238E27FC236}">
+                  <a16:creationId xmlns:a16="http://schemas.microsoft.com/office/drawing/2014/main" id="{5DBBB2CB-E00E-C24F-96B8-81535BBE2405}"/>
+                </a:ext>
+              </a:extLst>
+            </p:cNvPr>
+            <p:cNvPicPr>
+              <a:picLocks noChangeAspect="1"/>
+            </p:cNvPicPr>
+            <p:nvPr/>
+          </p:nvPicPr>
+          <p:blipFill>
+            <a:blip r:embed="rId4">
+              <a:extLst>
+                <a:ext uri="{96DAC541-7B7A-43D3-8B79-37D633B846F1}">
+                  <asvg:svgBlip xmlns:asvg="http://schemas.microsoft.com/office/drawing/2016/SVG/main" r:embed="rId5"/>
+                </a:ext>
+              </a:extLst>
+            </a:blip>
+            <a:stretch>
+              <a:fillRect/>
+            </a:stretch>
+          </p:blipFill>
+          <p:spPr>
+            <a:xfrm>
+              <a:off x="6355711" y="3346362"/>
+              <a:ext cx="914400" cy="914400"/>
+            </a:xfrm>
+            <a:prstGeom prst="rect">
+              <a:avLst/>
+            </a:prstGeom>
+          </p:spPr>
+        </p:pic>
+      </p:grpSp>
+      <p:grpSp>
+        <p:nvGrpSpPr>
+          <p:cNvPr id="41" name="Group 40">
+            <a:extLst>
+              <a:ext uri="{FF2B5EF4-FFF2-40B4-BE49-F238E27FC236}">
+                <a16:creationId xmlns:a16="http://schemas.microsoft.com/office/drawing/2014/main" id="{48A86D36-9AFE-404C-B701-5B9C47290656}"/>
+              </a:ext>
+            </a:extLst>
+          </p:cNvPr>
+          <p:cNvGrpSpPr/>
+          <p:nvPr/>
+        </p:nvGrpSpPr>
+        <p:grpSpPr>
+          <a:xfrm>
+            <a:off x="8084666" y="1983436"/>
+            <a:ext cx="979052" cy="1248159"/>
+            <a:chOff x="6297563" y="3346362"/>
+            <a:chExt cx="979052" cy="1248159"/>
+          </a:xfrm>
+        </p:grpSpPr>
+        <p:sp>
+          <p:nvSpPr>
+            <p:cNvPr id="42" name="TextBox 41">
+              <a:extLst>
+                <a:ext uri="{FF2B5EF4-FFF2-40B4-BE49-F238E27FC236}">
+                  <a16:creationId xmlns:a16="http://schemas.microsoft.com/office/drawing/2014/main" id="{E1B55EC0-245C-4643-9F57-EA0848050CA8}"/>
+                </a:ext>
+              </a:extLst>
+            </p:cNvPr>
+            <p:cNvSpPr txBox="1"/>
+            <p:nvPr/>
+          </p:nvSpPr>
+          <p:spPr>
+            <a:xfrm>
+              <a:off x="6297563" y="4239142"/>
+              <a:ext cx="979052" cy="355379"/>
+            </a:xfrm>
+            <a:prstGeom prst="rect">
+              <a:avLst/>
+            </a:prstGeom>
+            <a:noFill/>
+          </p:spPr>
+          <p:txBody>
+            <a:bodyPr wrap="none" rtlCol="0">
+              <a:spAutoFit/>
+            </a:bodyPr>
+            <a:lstStyle/>
+            <a:p>
+              <a:r>
+                <a:rPr lang="en-US" sz="1600" b="1" dirty="0"/>
+                <a:t>Database</a:t>
+              </a:r>
+            </a:p>
+          </p:txBody>
+        </p:sp>
+        <p:pic>
+          <p:nvPicPr>
+            <p:cNvPr id="43" name="Graphic 42" descr="Database">
+              <a:extLst>
+                <a:ext uri="{FF2B5EF4-FFF2-40B4-BE49-F238E27FC236}">
+                  <a16:creationId xmlns:a16="http://schemas.microsoft.com/office/drawing/2014/main" id="{501DA4FC-9C27-E245-B70E-1BBE3AB7F32E}"/>
+                </a:ext>
+              </a:extLst>
+            </p:cNvPr>
+            <p:cNvPicPr>
+              <a:picLocks noChangeAspect="1"/>
+            </p:cNvPicPr>
+            <p:nvPr/>
+          </p:nvPicPr>
+          <p:blipFill>
+            <a:blip r:embed="rId4">
+              <a:extLst>
+                <a:ext uri="{96DAC541-7B7A-43D3-8B79-37D633B846F1}">
+                  <asvg:svgBlip xmlns:asvg="http://schemas.microsoft.com/office/drawing/2016/SVG/main" r:embed="rId5"/>
+                </a:ext>
+              </a:extLst>
+            </a:blip>
+            <a:stretch>
+              <a:fillRect/>
+            </a:stretch>
+          </p:blipFill>
+          <p:spPr>
+            <a:xfrm>
+              <a:off x="6355711" y="3346362"/>
+              <a:ext cx="914400" cy="914400"/>
+            </a:xfrm>
+            <a:prstGeom prst="rect">
+              <a:avLst/>
+            </a:prstGeom>
+          </p:spPr>
+        </p:pic>
+      </p:grpSp>
+      <p:grpSp>
+        <p:nvGrpSpPr>
+          <p:cNvPr id="44" name="Group 43">
+            <a:extLst>
+              <a:ext uri="{FF2B5EF4-FFF2-40B4-BE49-F238E27FC236}">
+                <a16:creationId xmlns:a16="http://schemas.microsoft.com/office/drawing/2014/main" id="{293306BF-2AE0-9B4F-88A8-396ED152C380}"/>
+              </a:ext>
+            </a:extLst>
+          </p:cNvPr>
+          <p:cNvGrpSpPr/>
+          <p:nvPr/>
+        </p:nvGrpSpPr>
+        <p:grpSpPr>
+          <a:xfrm>
+            <a:off x="9583900" y="2440636"/>
+            <a:ext cx="979052" cy="1250418"/>
+            <a:chOff x="6323385" y="3346362"/>
+            <a:chExt cx="979052" cy="1250418"/>
+          </a:xfrm>
+        </p:grpSpPr>
+        <p:sp>
+          <p:nvSpPr>
+            <p:cNvPr id="45" name="TextBox 44">
+              <a:extLst>
+                <a:ext uri="{FF2B5EF4-FFF2-40B4-BE49-F238E27FC236}">
+                  <a16:creationId xmlns:a16="http://schemas.microsoft.com/office/drawing/2014/main" id="{960E48CA-3DCC-1D4F-958A-CB7B10D83890}"/>
+                </a:ext>
+              </a:extLst>
+            </p:cNvPr>
+            <p:cNvSpPr txBox="1"/>
+            <p:nvPr/>
+          </p:nvSpPr>
+          <p:spPr>
+            <a:xfrm>
+              <a:off x="6323385" y="4241401"/>
+              <a:ext cx="979052" cy="355379"/>
+            </a:xfrm>
+            <a:prstGeom prst="rect">
+              <a:avLst/>
+            </a:prstGeom>
+            <a:noFill/>
+          </p:spPr>
+          <p:txBody>
+            <a:bodyPr wrap="none" rtlCol="0">
+              <a:spAutoFit/>
+            </a:bodyPr>
+            <a:lstStyle/>
+            <a:p>
+              <a:r>
+                <a:rPr lang="en-US" sz="1600" b="1" dirty="0"/>
+                <a:t>Database</a:t>
+              </a:r>
+            </a:p>
+          </p:txBody>
+        </p:sp>
+        <p:pic>
+          <p:nvPicPr>
+            <p:cNvPr id="46" name="Graphic 45" descr="Database">
+              <a:extLst>
+                <a:ext uri="{FF2B5EF4-FFF2-40B4-BE49-F238E27FC236}">
+                  <a16:creationId xmlns:a16="http://schemas.microsoft.com/office/drawing/2014/main" id="{BEC27765-357C-6643-929E-961A1019E64D}"/>
+                </a:ext>
+              </a:extLst>
+            </p:cNvPr>
+            <p:cNvPicPr>
+              <a:picLocks noChangeAspect="1"/>
+            </p:cNvPicPr>
+            <p:nvPr/>
+          </p:nvPicPr>
+          <p:blipFill>
+            <a:blip r:embed="rId4">
+              <a:extLst>
+                <a:ext uri="{96DAC541-7B7A-43D3-8B79-37D633B846F1}">
+                  <asvg:svgBlip xmlns:asvg="http://schemas.microsoft.com/office/drawing/2016/SVG/main" r:embed="rId5"/>
+                </a:ext>
+              </a:extLst>
+            </a:blip>
+            <a:stretch>
+              <a:fillRect/>
+            </a:stretch>
+          </p:blipFill>
+          <p:spPr>
+            <a:xfrm>
+              <a:off x="6355711" y="3346362"/>
+              <a:ext cx="914400" cy="914400"/>
+            </a:xfrm>
+            <a:prstGeom prst="rect">
+              <a:avLst/>
+            </a:prstGeom>
+          </p:spPr>
+        </p:pic>
+      </p:grpSp>
+      <p:grpSp>
+        <p:nvGrpSpPr>
+          <p:cNvPr id="47" name="Group 46">
+            <a:extLst>
+              <a:ext uri="{FF2B5EF4-FFF2-40B4-BE49-F238E27FC236}">
+                <a16:creationId xmlns:a16="http://schemas.microsoft.com/office/drawing/2014/main" id="{D798DC15-8F28-2B44-8FEA-3810B6429A47}"/>
+              </a:ext>
+            </a:extLst>
+          </p:cNvPr>
+          <p:cNvGrpSpPr/>
+          <p:nvPr/>
+        </p:nvGrpSpPr>
+        <p:grpSpPr>
+          <a:xfrm>
+            <a:off x="8422352" y="3796785"/>
+            <a:ext cx="979052" cy="1241634"/>
+            <a:chOff x="6323385" y="3346362"/>
+            <a:chExt cx="979052" cy="1241634"/>
+          </a:xfrm>
+        </p:grpSpPr>
+        <p:sp>
+          <p:nvSpPr>
+            <p:cNvPr id="48" name="TextBox 47">
+              <a:extLst>
+                <a:ext uri="{FF2B5EF4-FFF2-40B4-BE49-F238E27FC236}">
+                  <a16:creationId xmlns:a16="http://schemas.microsoft.com/office/drawing/2014/main" id="{ADC5BF5B-5DEF-7E4C-B73A-EE3FD94263E3}"/>
+                </a:ext>
+              </a:extLst>
+            </p:cNvPr>
+            <p:cNvSpPr txBox="1"/>
+            <p:nvPr/>
+          </p:nvSpPr>
+          <p:spPr>
+            <a:xfrm>
+              <a:off x="6323385" y="4232617"/>
+              <a:ext cx="979052" cy="355379"/>
+            </a:xfrm>
+            <a:prstGeom prst="rect">
+              <a:avLst/>
+            </a:prstGeom>
+            <a:noFill/>
+          </p:spPr>
+          <p:txBody>
+            <a:bodyPr wrap="none" rtlCol="0">
+              <a:spAutoFit/>
+            </a:bodyPr>
+            <a:lstStyle/>
+            <a:p>
+              <a:r>
+                <a:rPr lang="en-US" sz="1600" b="1" dirty="0"/>
+                <a:t>Database</a:t>
+              </a:r>
+            </a:p>
+          </p:txBody>
+        </p:sp>
+        <p:pic>
+          <p:nvPicPr>
+            <p:cNvPr id="49" name="Graphic 48" descr="Database">
+              <a:extLst>
+                <a:ext uri="{FF2B5EF4-FFF2-40B4-BE49-F238E27FC236}">
+                  <a16:creationId xmlns:a16="http://schemas.microsoft.com/office/drawing/2014/main" id="{F50CD318-E0B5-D446-8F8F-074B5F1C7C95}"/>
+                </a:ext>
+              </a:extLst>
+            </p:cNvPr>
+            <p:cNvPicPr>
+              <a:picLocks noChangeAspect="1"/>
+            </p:cNvPicPr>
+            <p:nvPr/>
+          </p:nvPicPr>
+          <p:blipFill>
+            <a:blip r:embed="rId4">
+              <a:extLst>
+                <a:ext uri="{96DAC541-7B7A-43D3-8B79-37D633B846F1}">
+                  <asvg:svgBlip xmlns:asvg="http://schemas.microsoft.com/office/drawing/2016/SVG/main" r:embed="rId5"/>
+                </a:ext>
+              </a:extLst>
+            </a:blip>
+            <a:stretch>
+              <a:fillRect/>
+            </a:stretch>
+          </p:blipFill>
+          <p:spPr>
+            <a:xfrm>
+              <a:off x="6355711" y="3346362"/>
+              <a:ext cx="914400" cy="914400"/>
+            </a:xfrm>
+            <a:prstGeom prst="rect">
+              <a:avLst/>
+            </a:prstGeom>
+          </p:spPr>
+        </p:pic>
+      </p:grpSp>
+      <p:sp>
+        <p:nvSpPr>
+          <p:cNvPr id="50" name="TextBox 49">
+            <a:extLst>
+              <a:ext uri="{FF2B5EF4-FFF2-40B4-BE49-F238E27FC236}">
+                <a16:creationId xmlns:a16="http://schemas.microsoft.com/office/drawing/2014/main" id="{9136992F-03BB-1945-826F-501E78471287}"/>
+              </a:ext>
+            </a:extLst>
+          </p:cNvPr>
+          <p:cNvSpPr txBox="1"/>
+          <p:nvPr/>
+        </p:nvSpPr>
+        <p:spPr>
+          <a:xfrm>
+            <a:off x="1900556" y="4477075"/>
+            <a:ext cx="2977376" cy="923330"/>
+          </a:xfrm>
+          <a:prstGeom prst="rect">
+            <a:avLst/>
+          </a:prstGeom>
+          <a:noFill/>
+        </p:spPr>
+        <p:txBody>
+          <a:bodyPr wrap="square" rtlCol="0">
+            <a:spAutoFit/>
+          </a:bodyPr>
+          <a:lstStyle/>
+          <a:p>
+            <a:r>
+              <a:rPr lang="en-US" dirty="0"/>
+              <a:t>The ‘client’ software is how you see into and interact with the databases on the server.</a:t>
+            </a:r>
+          </a:p>
+        </p:txBody>
+      </p:sp>
+    </p:spTree>
+    <p:extLst>
+      <p:ext uri="{BB962C8B-B14F-4D97-AF65-F5344CB8AC3E}">
+        <p14:creationId xmlns:p14="http://schemas.microsoft.com/office/powerpoint/2010/main" val="3359383843"/>
+      </p:ext>
+    </p:extLst>
+  </p:cSld>
+  <p:clrMapOvr>
+    <a:masterClrMapping/>
+  </p:clrMapOvr>
+</p:sld>
+</file>
+
 <file path=ppt/theme/theme1.xml><?xml version="1.0" encoding="utf-8"?>
 <a:theme xmlns:a="http://schemas.openxmlformats.org/drawingml/2006/main" name="Office Theme">
   <a:themeElements>
@@ -4344,4 +7904,299 @@
     </a:ext>
   </a:extLst>
 </a:theme>
+</file>
+
+<file path=ppt/theme/theme2.xml><?xml version="1.0" encoding="utf-8"?>
+<a:theme xmlns:a="http://schemas.openxmlformats.org/drawingml/2006/main" name="Office Theme">
+  <a:themeElements>
+    <a:clrScheme name="Office">
+      <a:dk1>
+        <a:sysClr val="windowText" lastClr="000000"/>
+      </a:dk1>
+      <a:lt1>
+        <a:sysClr val="window" lastClr="FFFFFF"/>
+      </a:lt1>
+      <a:dk2>
+        <a:srgbClr val="44546A"/>
+      </a:dk2>
+      <a:lt2>
+        <a:srgbClr val="E7E6E6"/>
+      </a:lt2>
+      <a:accent1>
+        <a:srgbClr val="4472C4"/>
+      </a:accent1>
+      <a:accent2>
+        <a:srgbClr val="ED7D31"/>
+      </a:accent2>
+      <a:accent3>
+        <a:srgbClr val="A5A5A5"/>
+      </a:accent3>
+      <a:accent4>
+        <a:srgbClr val="FFC000"/>
+      </a:accent4>
+      <a:accent5>
+        <a:srgbClr val="5B9BD5"/>
+      </a:accent5>
+      <a:accent6>
+        <a:srgbClr val="70AD47"/>
+      </a:accent6>
+      <a:hlink>
+        <a:srgbClr val="0563C1"/>
+      </a:hlink>
+      <a:folHlink>
+        <a:srgbClr val="954F72"/>
+      </a:folHlink>
+    </a:clrScheme>
+    <a:fontScheme name="Office">
+      <a:majorFont>
+        <a:latin typeface="Calibri Light" panose="020F0302020204030204"/>
+        <a:ea typeface=""/>
+        <a:cs typeface=""/>
+        <a:font script="Jpan" typeface="游ゴシック Light"/>
+        <a:font script="Hang" typeface="맑은 고딕"/>
+        <a:font script="Hans" typeface="等线 Light"/>
+        <a:font script="Hant" typeface="新細明體"/>
+        <a:font script="Arab" typeface="Times New Roman"/>
+        <a:font script="Hebr" typeface="Times New Roman"/>
+        <a:font script="Thai" typeface="Angsana New"/>
+        <a:font script="Ethi" typeface="Nyala"/>
+        <a:font script="Beng" typeface="Vrinda"/>
+        <a:font script="Gujr" typeface="Shruti"/>
+        <a:font script="Khmr" typeface="MoolBoran"/>
+        <a:font script="Knda" typeface="Tunga"/>
+        <a:font script="Guru" typeface="Raavi"/>
+        <a:font script="Cans" typeface="Euphemia"/>
+        <a:font script="Cher" typeface="Plantagenet Cherokee"/>
+        <a:font script="Yiii" typeface="Microsoft Yi Baiti"/>
+        <a:font script="Tibt" typeface="Microsoft Himalaya"/>
+        <a:font script="Thaa" typeface="MV Boli"/>
+        <a:font script="Deva" typeface="Mangal"/>
+        <a:font script="Telu" typeface="Gautami"/>
+        <a:font script="Taml" typeface="Latha"/>
+        <a:font script="Syrc" typeface="Estrangelo Edessa"/>
+        <a:font script="Orya" typeface="Kalinga"/>
+        <a:font script="Mlym" typeface="Kartika"/>
+        <a:font script="Laoo" typeface="DokChampa"/>
+        <a:font script="Sinh" typeface="Iskoola Pota"/>
+        <a:font script="Mong" typeface="Mongolian Baiti"/>
+        <a:font script="Viet" typeface="Times New Roman"/>
+        <a:font script="Uigh" typeface="Microsoft Uighur"/>
+        <a:font script="Geor" typeface="Sylfaen"/>
+        <a:font script="Armn" typeface="Arial"/>
+        <a:font script="Bugi" typeface="Leelawadee UI"/>
+        <a:font script="Bopo" typeface="Microsoft JhengHei"/>
+        <a:font script="Java" typeface="Javanese Text"/>
+        <a:font script="Lisu" typeface="Segoe UI"/>
+        <a:font script="Mymr" typeface="Myanmar Text"/>
+        <a:font script="Nkoo" typeface="Ebrima"/>
+        <a:font script="Olck" typeface="Nirmala UI"/>
+        <a:font script="Osma" typeface="Ebrima"/>
+        <a:font script="Phag" typeface="Phagspa"/>
+        <a:font script="Syrn" typeface="Estrangelo Edessa"/>
+        <a:font script="Syrj" typeface="Estrangelo Edessa"/>
+        <a:font script="Syre" typeface="Estrangelo Edessa"/>
+        <a:font script="Sora" typeface="Nirmala UI"/>
+        <a:font script="Tale" typeface="Microsoft Tai Le"/>
+        <a:font script="Talu" typeface="Microsoft New Tai Lue"/>
+        <a:font script="Tfng" typeface="Ebrima"/>
+      </a:majorFont>
+      <a:minorFont>
+        <a:latin typeface="Calibri" panose="020F0502020204030204"/>
+        <a:ea typeface=""/>
+        <a:cs typeface=""/>
+        <a:font script="Jpan" typeface="游ゴシック"/>
+        <a:font script="Hang" typeface="맑은 고딕"/>
+        <a:font script="Hans" typeface="等线"/>
+        <a:font script="Hant" typeface="新細明體"/>
+        <a:font script="Arab" typeface="Arial"/>
+        <a:font script="Hebr" typeface="Arial"/>
+        <a:font script="Thai" typeface="Cordia New"/>
+        <a:font script="Ethi" typeface="Nyala"/>
+        <a:font script="Beng" typeface="Vrinda"/>
+        <a:font script="Gujr" typeface="Shruti"/>
+        <a:font script="Khmr" typeface="DaunPenh"/>
+        <a:font script="Knda" typeface="Tunga"/>
+        <a:font script="Guru" typeface="Raavi"/>
+        <a:font script="Cans" typeface="Euphemia"/>
+        <a:font script="Cher" typeface="Plantagenet Cherokee"/>
+        <a:font script="Yiii" typeface="Microsoft Yi Baiti"/>
+        <a:font script="Tibt" typeface="Microsoft Himalaya"/>
+        <a:font script="Thaa" typeface="MV Boli"/>
+        <a:font script="Deva" typeface="Mangal"/>
+        <a:font script="Telu" typeface="Gautami"/>
+        <a:font script="Taml" typeface="Latha"/>
+        <a:font script="Syrc" typeface="Estrangelo Edessa"/>
+        <a:font script="Orya" typeface="Kalinga"/>
+        <a:font script="Mlym" typeface="Kartika"/>
+        <a:font script="Laoo" typeface="DokChampa"/>
+        <a:font script="Sinh" typeface="Iskoola Pota"/>
+        <a:font script="Mong" typeface="Mongolian Baiti"/>
+        <a:font script="Viet" typeface="Arial"/>
+        <a:font script="Uigh" typeface="Microsoft Uighur"/>
+        <a:font script="Geor" typeface="Sylfaen"/>
+        <a:font script="Armn" typeface="Arial"/>
+        <a:font script="Bugi" typeface="Leelawadee UI"/>
+        <a:font script="Bopo" typeface="Microsoft JhengHei"/>
+        <a:font script="Java" typeface="Javanese Text"/>
+        <a:font script="Lisu" typeface="Segoe UI"/>
+        <a:font script="Mymr" typeface="Myanmar Text"/>
+        <a:font script="Nkoo" typeface="Ebrima"/>
+        <a:font script="Olck" typeface="Nirmala UI"/>
+        <a:font script="Osma" typeface="Ebrima"/>
+        <a:font script="Phag" typeface="Phagspa"/>
+        <a:font script="Syrn" typeface="Estrangelo Edessa"/>
+        <a:font script="Syrj" typeface="Estrangelo Edessa"/>
+        <a:font script="Syre" typeface="Estrangelo Edessa"/>
+        <a:font script="Sora" typeface="Nirmala UI"/>
+        <a:font script="Tale" typeface="Microsoft Tai Le"/>
+        <a:font script="Talu" typeface="Microsoft New Tai Lue"/>
+        <a:font script="Tfng" typeface="Ebrima"/>
+      </a:minorFont>
+    </a:fontScheme>
+    <a:fmtScheme name="Office">
+      <a:fillStyleLst>
+        <a:solidFill>
+          <a:schemeClr val="phClr"/>
+        </a:solidFill>
+        <a:gradFill rotWithShape="1">
+          <a:gsLst>
+            <a:gs pos="0">
+              <a:schemeClr val="phClr">
+                <a:lumMod val="110000"/>
+                <a:satMod val="105000"/>
+                <a:tint val="67000"/>
+              </a:schemeClr>
+            </a:gs>
+            <a:gs pos="50000">
+              <a:schemeClr val="phClr">
+                <a:lumMod val="105000"/>
+                <a:satMod val="103000"/>
+                <a:tint val="73000"/>
+              </a:schemeClr>
+            </a:gs>
+            <a:gs pos="100000">
+              <a:schemeClr val="phClr">
+                <a:lumMod val="105000"/>
+                <a:satMod val="109000"/>
+                <a:tint val="81000"/>
+              </a:schemeClr>
+            </a:gs>
+          </a:gsLst>
+          <a:lin ang="5400000" scaled="0"/>
+        </a:gradFill>
+        <a:gradFill rotWithShape="1">
+          <a:gsLst>
+            <a:gs pos="0">
+              <a:schemeClr val="phClr">
+                <a:satMod val="103000"/>
+                <a:lumMod val="102000"/>
+                <a:tint val="94000"/>
+              </a:schemeClr>
+            </a:gs>
+            <a:gs pos="50000">
+              <a:schemeClr val="phClr">
+                <a:satMod val="110000"/>
+                <a:lumMod val="100000"/>
+                <a:shade val="100000"/>
+              </a:schemeClr>
+            </a:gs>
+            <a:gs pos="100000">
+              <a:schemeClr val="phClr">
+                <a:lumMod val="99000"/>
+                <a:satMod val="120000"/>
+                <a:shade val="78000"/>
+              </a:schemeClr>
+            </a:gs>
+          </a:gsLst>
+          <a:lin ang="5400000" scaled="0"/>
+        </a:gradFill>
+      </a:fillStyleLst>
+      <a:lnStyleLst>
+        <a:ln w="6350" cap="flat" cmpd="sng" algn="ctr">
+          <a:solidFill>
+            <a:schemeClr val="phClr"/>
+          </a:solidFill>
+          <a:prstDash val="solid"/>
+          <a:miter lim="800000"/>
+        </a:ln>
+        <a:ln w="12700" cap="flat" cmpd="sng" algn="ctr">
+          <a:solidFill>
+            <a:schemeClr val="phClr"/>
+          </a:solidFill>
+          <a:prstDash val="solid"/>
+          <a:miter lim="800000"/>
+        </a:ln>
+        <a:ln w="19050" cap="flat" cmpd="sng" algn="ctr">
+          <a:solidFill>
+            <a:schemeClr val="phClr"/>
+          </a:solidFill>
+          <a:prstDash val="solid"/>
+          <a:miter lim="800000"/>
+        </a:ln>
+      </a:lnStyleLst>
+      <a:effectStyleLst>
+        <a:effectStyle>
+          <a:effectLst/>
+        </a:effectStyle>
+        <a:effectStyle>
+          <a:effectLst/>
+        </a:effectStyle>
+        <a:effectStyle>
+          <a:effectLst>
+            <a:outerShdw blurRad="57150" dist="19050" dir="5400000" algn="ctr" rotWithShape="0">
+              <a:srgbClr val="000000">
+                <a:alpha val="63000"/>
+              </a:srgbClr>
+            </a:outerShdw>
+          </a:effectLst>
+        </a:effectStyle>
+      </a:effectStyleLst>
+      <a:bgFillStyleLst>
+        <a:solidFill>
+          <a:schemeClr val="phClr"/>
+        </a:solidFill>
+        <a:solidFill>
+          <a:schemeClr val="phClr">
+            <a:tint val="95000"/>
+            <a:satMod val="170000"/>
+          </a:schemeClr>
+        </a:solidFill>
+        <a:gradFill rotWithShape="1">
+          <a:gsLst>
+            <a:gs pos="0">
+              <a:schemeClr val="phClr">
+                <a:tint val="93000"/>
+                <a:satMod val="150000"/>
+                <a:shade val="98000"/>
+                <a:lumMod val="102000"/>
+              </a:schemeClr>
+            </a:gs>
+            <a:gs pos="50000">
+              <a:schemeClr val="phClr">
+                <a:tint val="98000"/>
+                <a:satMod val="130000"/>
+                <a:shade val="90000"/>
+                <a:lumMod val="103000"/>
+              </a:schemeClr>
+            </a:gs>
+            <a:gs pos="100000">
+              <a:schemeClr val="phClr">
+                <a:shade val="63000"/>
+                <a:satMod val="120000"/>
+              </a:schemeClr>
+            </a:gs>
+          </a:gsLst>
+          <a:lin ang="5400000" scaled="0"/>
+        </a:gradFill>
+      </a:bgFillStyleLst>
+    </a:fmtScheme>
+  </a:themeElements>
+  <a:objectDefaults/>
+  <a:extraClrSchemeLst/>
+  <a:extLst>
+    <a:ext uri="{05A4C25C-085E-4340-85A3-A5531E510DB2}">
+      <thm15:themeFamily xmlns:thm15="http://schemas.microsoft.com/office/thememl/2012/main" name="Office Theme" id="{62F939B6-93AF-4DB8-9C6B-D6C7DFDC589F}" vid="{4A3C46E8-61CC-4603-A589-7422A47A8E4A}"/>
+    </a:ext>
+  </a:extLst>
+</a:theme>
 </file>
</xml_diff>

<commit_message>
updated graphics to be read from left to right.
</commit_message>
<xml_diff>
--- a/assets/images/relationships/source-tables.pptx
+++ b/assets/images/relationships/source-tables.pptx
@@ -7,8 +7,7 @@
   <p:sldIdLst>
     <p:sldId id="256" r:id="rId2"/>
     <p:sldId id="257" r:id="rId3"/>
-    <p:sldId id="258" r:id="rId4"/>
-    <p:sldId id="259" r:id="rId5"/>
+    <p:sldId id="259" r:id="rId4"/>
   </p:sldIdLst>
   <p:sldSz cx="12192000" cy="6858000"/>
   <p:notesSz cx="6858000" cy="9144000"/>
@@ -262,7 +261,7 @@
           <a:p>
             <a:fld id="{07E54A18-6F89-0D4A-BEF0-D4351E72450E}" type="datetimeFigureOut">
               <a:rPr lang="en-US" smtClean="0"/>
-              <a:t>1/22/19</a:t>
+              <a:t>1/24/19</a:t>
             </a:fld>
             <a:endParaRPr lang="en-US"/>
           </a:p>
@@ -460,7 +459,7 @@
           <a:p>
             <a:fld id="{07E54A18-6F89-0D4A-BEF0-D4351E72450E}" type="datetimeFigureOut">
               <a:rPr lang="en-US" smtClean="0"/>
-              <a:t>1/22/19</a:t>
+              <a:t>1/24/19</a:t>
             </a:fld>
             <a:endParaRPr lang="en-US"/>
           </a:p>
@@ -668,7 +667,7 @@
           <a:p>
             <a:fld id="{07E54A18-6F89-0D4A-BEF0-D4351E72450E}" type="datetimeFigureOut">
               <a:rPr lang="en-US" smtClean="0"/>
-              <a:t>1/22/19</a:t>
+              <a:t>1/24/19</a:t>
             </a:fld>
             <a:endParaRPr lang="en-US"/>
           </a:p>
@@ -866,7 +865,7 @@
           <a:p>
             <a:fld id="{07E54A18-6F89-0D4A-BEF0-D4351E72450E}" type="datetimeFigureOut">
               <a:rPr lang="en-US" smtClean="0"/>
-              <a:t>1/22/19</a:t>
+              <a:t>1/24/19</a:t>
             </a:fld>
             <a:endParaRPr lang="en-US"/>
           </a:p>
@@ -1141,7 +1140,7 @@
           <a:p>
             <a:fld id="{07E54A18-6F89-0D4A-BEF0-D4351E72450E}" type="datetimeFigureOut">
               <a:rPr lang="en-US" smtClean="0"/>
-              <a:t>1/22/19</a:t>
+              <a:t>1/24/19</a:t>
             </a:fld>
             <a:endParaRPr lang="en-US"/>
           </a:p>
@@ -1406,7 +1405,7 @@
           <a:p>
             <a:fld id="{07E54A18-6F89-0D4A-BEF0-D4351E72450E}" type="datetimeFigureOut">
               <a:rPr lang="en-US" smtClean="0"/>
-              <a:t>1/22/19</a:t>
+              <a:t>1/24/19</a:t>
             </a:fld>
             <a:endParaRPr lang="en-US"/>
           </a:p>
@@ -1818,7 +1817,7 @@
           <a:p>
             <a:fld id="{07E54A18-6F89-0D4A-BEF0-D4351E72450E}" type="datetimeFigureOut">
               <a:rPr lang="en-US" smtClean="0"/>
-              <a:t>1/22/19</a:t>
+              <a:t>1/24/19</a:t>
             </a:fld>
             <a:endParaRPr lang="en-US"/>
           </a:p>
@@ -1959,7 +1958,7 @@
           <a:p>
             <a:fld id="{07E54A18-6F89-0D4A-BEF0-D4351E72450E}" type="datetimeFigureOut">
               <a:rPr lang="en-US" smtClean="0"/>
-              <a:t>1/22/19</a:t>
+              <a:t>1/24/19</a:t>
             </a:fld>
             <a:endParaRPr lang="en-US"/>
           </a:p>
@@ -2072,7 +2071,7 @@
           <a:p>
             <a:fld id="{07E54A18-6F89-0D4A-BEF0-D4351E72450E}" type="datetimeFigureOut">
               <a:rPr lang="en-US" smtClean="0"/>
-              <a:t>1/22/19</a:t>
+              <a:t>1/24/19</a:t>
             </a:fld>
             <a:endParaRPr lang="en-US"/>
           </a:p>
@@ -2383,7 +2382,7 @@
           <a:p>
             <a:fld id="{07E54A18-6F89-0D4A-BEF0-D4351E72450E}" type="datetimeFigureOut">
               <a:rPr lang="en-US" smtClean="0"/>
-              <a:t>1/22/19</a:t>
+              <a:t>1/24/19</a:t>
             </a:fld>
             <a:endParaRPr lang="en-US"/>
           </a:p>
@@ -2671,7 +2670,7 @@
           <a:p>
             <a:fld id="{07E54A18-6F89-0D4A-BEF0-D4351E72450E}" type="datetimeFigureOut">
               <a:rPr lang="en-US" smtClean="0"/>
-              <a:t>1/22/19</a:t>
+              <a:t>1/24/19</a:t>
             </a:fld>
             <a:endParaRPr lang="en-US"/>
           </a:p>
@@ -2912,7 +2911,7 @@
           <a:p>
             <a:fld id="{07E54A18-6F89-0D4A-BEF0-D4351E72450E}" type="datetimeFigureOut">
               <a:rPr lang="en-US" smtClean="0"/>
-              <a:t>1/22/19</a:t>
+              <a:t>1/24/19</a:t>
             </a:fld>
             <a:endParaRPr lang="en-US"/>
           </a:p>
@@ -3344,13 +3343,13 @@
           <p:nvPr>
             <p:extLst>
               <p:ext uri="{D42A27DB-BD31-4B8C-83A1-F6EECF244321}">
-                <p14:modId xmlns:p14="http://schemas.microsoft.com/office/powerpoint/2010/main" val="641378871"/>
+                <p14:modId xmlns:p14="http://schemas.microsoft.com/office/powerpoint/2010/main" val="2033025328"/>
               </p:ext>
             </p:extLst>
           </p:nvPr>
         </p:nvGraphicFramePr>
         <p:xfrm>
-          <a:off x="1579418" y="1228723"/>
+          <a:off x="7865918" y="1294896"/>
           <a:ext cx="2364993" cy="4400552"/>
         </p:xfrm>
         <a:graphic>
@@ -3658,13 +3657,13 @@
           <p:nvPr>
             <p:extLst>
               <p:ext uri="{D42A27DB-BD31-4B8C-83A1-F6EECF244321}">
-                <p14:modId xmlns:p14="http://schemas.microsoft.com/office/powerpoint/2010/main" val="1016615235"/>
+                <p14:modId xmlns:p14="http://schemas.microsoft.com/office/powerpoint/2010/main" val="1529549550"/>
               </p:ext>
             </p:extLst>
           </p:nvPr>
         </p:nvGraphicFramePr>
         <p:xfrm>
-          <a:off x="5800725" y="1228723"/>
+          <a:off x="1120442" y="1294896"/>
           <a:ext cx="4594874" cy="3300414"/>
         </p:xfrm>
         <a:graphic>
@@ -3990,7 +3989,7 @@
         </p:nvSpPr>
         <p:spPr>
           <a:xfrm>
-            <a:off x="1945932" y="257175"/>
+            <a:off x="8232432" y="323348"/>
             <a:ext cx="1500347" cy="584775"/>
           </a:xfrm>
           <a:prstGeom prst="rect">
@@ -4025,7 +4024,7 @@
         </p:nvSpPr>
         <p:spPr>
           <a:xfrm>
-            <a:off x="6959923" y="257175"/>
+            <a:off x="2279640" y="323348"/>
             <a:ext cx="2625078" cy="584775"/>
           </a:xfrm>
           <a:prstGeom prst="rect">
@@ -4088,10 +4087,16 @@
           <p:cNvGraphicFramePr>
             <a:graphicFrameLocks noGrp="1"/>
           </p:cNvGraphicFramePr>
-          <p:nvPr/>
+          <p:nvPr>
+            <p:extLst>
+              <p:ext uri="{D42A27DB-BD31-4B8C-83A1-F6EECF244321}">
+                <p14:modId xmlns:p14="http://schemas.microsoft.com/office/powerpoint/2010/main" val="86582492"/>
+              </p:ext>
+            </p:extLst>
+          </p:nvPr>
         </p:nvGraphicFramePr>
         <p:xfrm>
-          <a:off x="1579418" y="1228723"/>
+          <a:off x="7782975" y="1228722"/>
           <a:ext cx="2364993" cy="4400552"/>
         </p:xfrm>
         <a:graphic>
@@ -4399,13 +4404,13 @@
           <p:nvPr>
             <p:extLst>
               <p:ext uri="{D42A27DB-BD31-4B8C-83A1-F6EECF244321}">
-                <p14:modId xmlns:p14="http://schemas.microsoft.com/office/powerpoint/2010/main" val="901415303"/>
+                <p14:modId xmlns:p14="http://schemas.microsoft.com/office/powerpoint/2010/main" val="3006403267"/>
               </p:ext>
             </p:extLst>
           </p:nvPr>
         </p:nvGraphicFramePr>
         <p:xfrm>
-          <a:off x="5800725" y="1228723"/>
+          <a:off x="783556" y="1228722"/>
           <a:ext cx="4594874" cy="4950621"/>
         </p:xfrm>
         <a:graphic>
@@ -4870,7 +4875,7 @@
         </p:nvSpPr>
         <p:spPr>
           <a:xfrm>
-            <a:off x="1945932" y="257175"/>
+            <a:off x="8149489" y="257174"/>
             <a:ext cx="1500347" cy="584775"/>
           </a:xfrm>
           <a:prstGeom prst="rect">
@@ -4905,7 +4910,7 @@
         </p:nvSpPr>
         <p:spPr>
           <a:xfrm>
-            <a:off x="6959923" y="257175"/>
+            <a:off x="1942754" y="257174"/>
             <a:ext cx="1032655" cy="584775"/>
           </a:xfrm>
           <a:prstGeom prst="rect">
@@ -4923,6 +4928,58 @@
               <a:rPr lang="en-US" sz="3200" b="1" dirty="0"/>
               <a:t>plots</a:t>
             </a:r>
+          </a:p>
+        </p:txBody>
+      </p:sp>
+      <p:sp>
+        <p:nvSpPr>
+          <p:cNvPr id="3" name="Oval 2">
+            <a:extLst>
+              <a:ext uri="{FF2B5EF4-FFF2-40B4-BE49-F238E27FC236}">
+                <a16:creationId xmlns:a16="http://schemas.microsoft.com/office/drawing/2014/main" id="{6CEB3BB2-0EE5-7D41-975D-461292534D08}"/>
+              </a:ext>
+            </a:extLst>
+          </p:cNvPr>
+          <p:cNvSpPr/>
+          <p:nvPr/>
+        </p:nvSpPr>
+        <p:spPr>
+          <a:xfrm>
+            <a:off x="7711639" y="1157386"/>
+            <a:ext cx="603115" cy="577175"/>
+          </a:xfrm>
+          <a:prstGeom prst="ellipse">
+            <a:avLst/>
+          </a:prstGeom>
+          <a:noFill/>
+          <a:ln>
+            <a:solidFill>
+              <a:schemeClr val="accent6"/>
+            </a:solidFill>
+          </a:ln>
+        </p:spPr>
+        <p:style>
+          <a:lnRef idx="2">
+            <a:schemeClr val="accent1">
+              <a:shade val="50000"/>
+            </a:schemeClr>
+          </a:lnRef>
+          <a:fillRef idx="1">
+            <a:schemeClr val="accent1"/>
+          </a:fillRef>
+          <a:effectRef idx="0">
+            <a:schemeClr val="accent1"/>
+          </a:effectRef>
+          <a:fontRef idx="minor">
+            <a:schemeClr val="lt1"/>
+          </a:fontRef>
+        </p:style>
+        <p:txBody>
+          <a:bodyPr rtlCol="0" anchor="ctr"/>
+          <a:lstStyle/>
+          <a:p>
+            <a:pPr algn="ctr"/>
+            <a:endParaRPr lang="en-US"/>
           </a:p>
         </p:txBody>
       </p:sp>
@@ -4940,741 +4997,6 @@
 </file>
 
 <file path=ppt/slides/slide3.xml><?xml version="1.0" encoding="utf-8"?>
-<p:sld xmlns:a="http://schemas.openxmlformats.org/drawingml/2006/main" xmlns:r="http://schemas.openxmlformats.org/officeDocument/2006/relationships" xmlns:p="http://schemas.openxmlformats.org/presentationml/2006/main">
-  <p:cSld>
-    <p:spTree>
-      <p:nvGrpSpPr>
-        <p:cNvPr id="1" name=""/>
-        <p:cNvGrpSpPr/>
-        <p:nvPr/>
-      </p:nvGrpSpPr>
-      <p:grpSpPr>
-        <a:xfrm>
-          <a:off x="0" y="0"/>
-          <a:ext cx="0" cy="0"/>
-          <a:chOff x="0" y="0"/>
-          <a:chExt cx="0" cy="0"/>
-        </a:xfrm>
-      </p:grpSpPr>
-      <p:graphicFrame>
-        <p:nvGraphicFramePr>
-          <p:cNvPr id="10" name="Table 9">
-            <a:extLst>
-              <a:ext uri="{FF2B5EF4-FFF2-40B4-BE49-F238E27FC236}">
-                <a16:creationId xmlns:a16="http://schemas.microsoft.com/office/drawing/2014/main" id="{799EA228-3090-514D-B56C-1EA6BBBFF0DC}"/>
-              </a:ext>
-            </a:extLst>
-          </p:cNvPr>
-          <p:cNvGraphicFramePr>
-            <a:graphicFrameLocks noGrp="1"/>
-          </p:cNvGraphicFramePr>
-          <p:nvPr/>
-        </p:nvGraphicFramePr>
-        <p:xfrm>
-          <a:off x="1579418" y="1228723"/>
-          <a:ext cx="2364993" cy="4400552"/>
-        </p:xfrm>
-        <a:graphic>
-          <a:graphicData uri="http://schemas.openxmlformats.org/drawingml/2006/table">
-            <a:tbl>
-              <a:tblPr firstRow="1" bandRow="1">
-                <a:tableStyleId>{5C22544A-7EE6-4342-B048-85BDC9FD1C3A}</a:tableStyleId>
-              </a:tblPr>
-              <a:tblGrid>
-                <a:gridCol w="1116688">
-                  <a:extLst>
-                    <a:ext uri="{9D8B030D-6E8A-4147-A177-3AD203B41FA5}">
-                      <a16:colId xmlns:a16="http://schemas.microsoft.com/office/drawing/2014/main" val="1814196662"/>
-                    </a:ext>
-                  </a:extLst>
-                </a:gridCol>
-                <a:gridCol w="1248305">
-                  <a:extLst>
-                    <a:ext uri="{9D8B030D-6E8A-4147-A177-3AD203B41FA5}">
-                      <a16:colId xmlns:a16="http://schemas.microsoft.com/office/drawing/2014/main" val="254236435"/>
-                    </a:ext>
-                  </a:extLst>
-                </a:gridCol>
-              </a:tblGrid>
-              <a:tr h="550069">
-                <a:tc>
-                  <a:txBody>
-                    <a:bodyPr/>
-                    <a:lstStyle/>
-                    <a:p>
-                      <a:r>
-                        <a:rPr lang="en-US" dirty="0"/>
-                        <a:t>id</a:t>
-                      </a:r>
-                    </a:p>
-                  </a:txBody>
-                  <a:tcPr/>
-                </a:tc>
-                <a:tc>
-                  <a:txBody>
-                    <a:bodyPr/>
-                    <a:lstStyle/>
-                    <a:p>
-                      <a:r>
-                        <a:rPr lang="en-US" dirty="0"/>
-                        <a:t>name</a:t>
-                      </a:r>
-                    </a:p>
-                  </a:txBody>
-                  <a:tcPr/>
-                </a:tc>
-                <a:extLst>
-                  <a:ext uri="{0D108BD9-81ED-4DB2-BD59-A6C34878D82A}">
-                    <a16:rowId xmlns:a16="http://schemas.microsoft.com/office/drawing/2014/main" val="3375024876"/>
-                  </a:ext>
-                </a:extLst>
-              </a:tr>
-              <a:tr h="550069">
-                <a:tc>
-                  <a:txBody>
-                    <a:bodyPr/>
-                    <a:lstStyle/>
-                    <a:p>
-                      <a:r>
-                        <a:rPr lang="en-US" dirty="0"/>
-                        <a:t>1</a:t>
-                      </a:r>
-                    </a:p>
-                  </a:txBody>
-                  <a:tcPr/>
-                </a:tc>
-                <a:tc>
-                  <a:txBody>
-                    <a:bodyPr/>
-                    <a:lstStyle/>
-                    <a:p>
-                      <a:r>
-                        <a:rPr lang="en-US" dirty="0"/>
-                        <a:t>Mary</a:t>
-                      </a:r>
-                    </a:p>
-                  </a:txBody>
-                  <a:tcPr/>
-                </a:tc>
-                <a:extLst>
-                  <a:ext uri="{0D108BD9-81ED-4DB2-BD59-A6C34878D82A}">
-                    <a16:rowId xmlns:a16="http://schemas.microsoft.com/office/drawing/2014/main" val="1096633820"/>
-                  </a:ext>
-                </a:extLst>
-              </a:tr>
-              <a:tr h="550069">
-                <a:tc>
-                  <a:txBody>
-                    <a:bodyPr/>
-                    <a:lstStyle/>
-                    <a:p>
-                      <a:r>
-                        <a:rPr lang="en-US" dirty="0"/>
-                        <a:t>2</a:t>
-                      </a:r>
-                    </a:p>
-                  </a:txBody>
-                  <a:tcPr/>
-                </a:tc>
-                <a:tc>
-                  <a:txBody>
-                    <a:bodyPr/>
-                    <a:lstStyle/>
-                    <a:p>
-                      <a:r>
-                        <a:rPr lang="en-US" dirty="0"/>
-                        <a:t>Jane</a:t>
-                      </a:r>
-                    </a:p>
-                  </a:txBody>
-                  <a:tcPr/>
-                </a:tc>
-                <a:extLst>
-                  <a:ext uri="{0D108BD9-81ED-4DB2-BD59-A6C34878D82A}">
-                    <a16:rowId xmlns:a16="http://schemas.microsoft.com/office/drawing/2014/main" val="2502785895"/>
-                  </a:ext>
-                </a:extLst>
-              </a:tr>
-              <a:tr h="550069">
-                <a:tc>
-                  <a:txBody>
-                    <a:bodyPr/>
-                    <a:lstStyle/>
-                    <a:p>
-                      <a:r>
-                        <a:rPr lang="en-US" dirty="0"/>
-                        <a:t>3</a:t>
-                      </a:r>
-                    </a:p>
-                  </a:txBody>
-                  <a:tcPr/>
-                </a:tc>
-                <a:tc>
-                  <a:txBody>
-                    <a:bodyPr/>
-                    <a:lstStyle/>
-                    <a:p>
-                      <a:r>
-                        <a:rPr lang="en-US" dirty="0"/>
-                        <a:t>Mark</a:t>
-                      </a:r>
-                    </a:p>
-                  </a:txBody>
-                  <a:tcPr/>
-                </a:tc>
-                <a:extLst>
-                  <a:ext uri="{0D108BD9-81ED-4DB2-BD59-A6C34878D82A}">
-                    <a16:rowId xmlns:a16="http://schemas.microsoft.com/office/drawing/2014/main" val="3585364205"/>
-                  </a:ext>
-                </a:extLst>
-              </a:tr>
-              <a:tr h="550069">
-                <a:tc>
-                  <a:txBody>
-                    <a:bodyPr/>
-                    <a:lstStyle/>
-                    <a:p>
-                      <a:r>
-                        <a:rPr lang="en-US" dirty="0"/>
-                        <a:t>4</a:t>
-                      </a:r>
-                    </a:p>
-                  </a:txBody>
-                  <a:tcPr/>
-                </a:tc>
-                <a:tc>
-                  <a:txBody>
-                    <a:bodyPr/>
-                    <a:lstStyle/>
-                    <a:p>
-                      <a:r>
-                        <a:rPr lang="en-US" dirty="0"/>
-                        <a:t>Luke</a:t>
-                      </a:r>
-                    </a:p>
-                  </a:txBody>
-                  <a:tcPr/>
-                </a:tc>
-                <a:extLst>
-                  <a:ext uri="{0D108BD9-81ED-4DB2-BD59-A6C34878D82A}">
-                    <a16:rowId xmlns:a16="http://schemas.microsoft.com/office/drawing/2014/main" val="1151712161"/>
-                  </a:ext>
-                </a:extLst>
-              </a:tr>
-              <a:tr h="550069">
-                <a:tc>
-                  <a:txBody>
-                    <a:bodyPr/>
-                    <a:lstStyle/>
-                    <a:p>
-                      <a:r>
-                        <a:rPr lang="en-US" dirty="0"/>
-                        <a:t>5</a:t>
-                      </a:r>
-                    </a:p>
-                  </a:txBody>
-                  <a:tcPr/>
-                </a:tc>
-                <a:tc>
-                  <a:txBody>
-                    <a:bodyPr/>
-                    <a:lstStyle/>
-                    <a:p>
-                      <a:r>
-                        <a:rPr lang="en-US" dirty="0"/>
-                        <a:t>Joan</a:t>
-                      </a:r>
-                    </a:p>
-                  </a:txBody>
-                  <a:tcPr/>
-                </a:tc>
-                <a:extLst>
-                  <a:ext uri="{0D108BD9-81ED-4DB2-BD59-A6C34878D82A}">
-                    <a16:rowId xmlns:a16="http://schemas.microsoft.com/office/drawing/2014/main" val="1895924153"/>
-                  </a:ext>
-                </a:extLst>
-              </a:tr>
-              <a:tr h="550069">
-                <a:tc>
-                  <a:txBody>
-                    <a:bodyPr/>
-                    <a:lstStyle/>
-                    <a:p>
-                      <a:r>
-                        <a:rPr lang="en-US" dirty="0"/>
-                        <a:t>6</a:t>
-                      </a:r>
-                    </a:p>
-                  </a:txBody>
-                  <a:tcPr/>
-                </a:tc>
-                <a:tc>
-                  <a:txBody>
-                    <a:bodyPr/>
-                    <a:lstStyle/>
-                    <a:p>
-                      <a:r>
-                        <a:rPr lang="en-US" dirty="0"/>
-                        <a:t>John</a:t>
-                      </a:r>
-                    </a:p>
-                  </a:txBody>
-                  <a:tcPr/>
-                </a:tc>
-                <a:extLst>
-                  <a:ext uri="{0D108BD9-81ED-4DB2-BD59-A6C34878D82A}">
-                    <a16:rowId xmlns:a16="http://schemas.microsoft.com/office/drawing/2014/main" val="2073015313"/>
-                  </a:ext>
-                </a:extLst>
-              </a:tr>
-              <a:tr h="550069">
-                <a:tc>
-                  <a:txBody>
-                    <a:bodyPr/>
-                    <a:lstStyle/>
-                    <a:p>
-                      <a:r>
-                        <a:rPr lang="en-US" dirty="0"/>
-                        <a:t>7</a:t>
-                      </a:r>
-                    </a:p>
-                  </a:txBody>
-                  <a:tcPr/>
-                </a:tc>
-                <a:tc>
-                  <a:txBody>
-                    <a:bodyPr/>
-                    <a:lstStyle/>
-                    <a:p>
-                      <a:r>
-                        <a:rPr lang="en-US" dirty="0"/>
-                        <a:t>Sam</a:t>
-                      </a:r>
-                    </a:p>
-                  </a:txBody>
-                  <a:tcPr/>
-                </a:tc>
-                <a:extLst>
-                  <a:ext uri="{0D108BD9-81ED-4DB2-BD59-A6C34878D82A}">
-                    <a16:rowId xmlns:a16="http://schemas.microsoft.com/office/drawing/2014/main" val="2290738421"/>
-                  </a:ext>
-                </a:extLst>
-              </a:tr>
-            </a:tbl>
-          </a:graphicData>
-        </a:graphic>
-      </p:graphicFrame>
-      <p:graphicFrame>
-        <p:nvGraphicFramePr>
-          <p:cNvPr id="11" name="Table 10">
-            <a:extLst>
-              <a:ext uri="{FF2B5EF4-FFF2-40B4-BE49-F238E27FC236}">
-                <a16:creationId xmlns:a16="http://schemas.microsoft.com/office/drawing/2014/main" id="{544C7A9B-CB2A-3743-AFD2-7B6D9354F9D4}"/>
-              </a:ext>
-            </a:extLst>
-          </p:cNvPr>
-          <p:cNvGraphicFramePr>
-            <a:graphicFrameLocks noGrp="1"/>
-          </p:cNvGraphicFramePr>
-          <p:nvPr/>
-        </p:nvGraphicFramePr>
-        <p:xfrm>
-          <a:off x="5800725" y="1228723"/>
-          <a:ext cx="4594874" cy="3300414"/>
-        </p:xfrm>
-        <a:graphic>
-          <a:graphicData uri="http://schemas.openxmlformats.org/drawingml/2006/table">
-            <a:tbl>
-              <a:tblPr firstRow="1" bandRow="1">
-                <a:tableStyleId>{5C22544A-7EE6-4342-B048-85BDC9FD1C3A}</a:tableStyleId>
-              </a:tblPr>
-              <a:tblGrid>
-                <a:gridCol w="695991">
-                  <a:extLst>
-                    <a:ext uri="{9D8B030D-6E8A-4147-A177-3AD203B41FA5}">
-                      <a16:colId xmlns:a16="http://schemas.microsoft.com/office/drawing/2014/main" val="1814196662"/>
-                    </a:ext>
-                  </a:extLst>
-                </a:gridCol>
-                <a:gridCol w="2429874">
-                  <a:extLst>
-                    <a:ext uri="{9D8B030D-6E8A-4147-A177-3AD203B41FA5}">
-                      <a16:colId xmlns:a16="http://schemas.microsoft.com/office/drawing/2014/main" val="254236435"/>
-                    </a:ext>
-                  </a:extLst>
-                </a:gridCol>
-                <a:gridCol w="1469009">
-                  <a:extLst>
-                    <a:ext uri="{9D8B030D-6E8A-4147-A177-3AD203B41FA5}">
-                      <a16:colId xmlns:a16="http://schemas.microsoft.com/office/drawing/2014/main" val="144704008"/>
-                    </a:ext>
-                  </a:extLst>
-                </a:gridCol>
-              </a:tblGrid>
-              <a:tr h="550069">
-                <a:tc>
-                  <a:txBody>
-                    <a:bodyPr/>
-                    <a:lstStyle/>
-                    <a:p>
-                      <a:r>
-                        <a:rPr lang="en-US" dirty="0"/>
-                        <a:t>id</a:t>
-                      </a:r>
-                    </a:p>
-                  </a:txBody>
-                  <a:tcPr/>
-                </a:tc>
-                <a:tc>
-                  <a:txBody>
-                    <a:bodyPr/>
-                    <a:lstStyle/>
-                    <a:p>
-                      <a:r>
-                        <a:rPr lang="en-US" dirty="0"/>
-                        <a:t>email</a:t>
-                      </a:r>
-                    </a:p>
-                  </a:txBody>
-                  <a:tcPr/>
-                </a:tc>
-                <a:tc>
-                  <a:txBody>
-                    <a:bodyPr/>
-                    <a:lstStyle/>
-                    <a:p>
-                      <a:r>
-                        <a:rPr lang="en-US" dirty="0"/>
-                        <a:t>farmer_id</a:t>
-                      </a:r>
-                    </a:p>
-                  </a:txBody>
-                  <a:tcPr/>
-                </a:tc>
-                <a:extLst>
-                  <a:ext uri="{0D108BD9-81ED-4DB2-BD59-A6C34878D82A}">
-                    <a16:rowId xmlns:a16="http://schemas.microsoft.com/office/drawing/2014/main" val="3375024876"/>
-                  </a:ext>
-                </a:extLst>
-              </a:tr>
-              <a:tr h="550069">
-                <a:tc>
-                  <a:txBody>
-                    <a:bodyPr/>
-                    <a:lstStyle/>
-                    <a:p>
-                      <a:r>
-                        <a:rPr lang="en-US" dirty="0"/>
-                        <a:t>1</a:t>
-                      </a:r>
-                    </a:p>
-                  </a:txBody>
-                  <a:tcPr/>
-                </a:tc>
-                <a:tc>
-                  <a:txBody>
-                    <a:bodyPr/>
-                    <a:lstStyle/>
-                    <a:p>
-                      <a:r>
-                        <a:rPr lang="en-US" dirty="0"/>
-                        <a:t>mary@example.com</a:t>
-                      </a:r>
-                    </a:p>
-                  </a:txBody>
-                  <a:tcPr/>
-                </a:tc>
-                <a:tc>
-                  <a:txBody>
-                    <a:bodyPr/>
-                    <a:lstStyle/>
-                    <a:p>
-                      <a:r>
-                        <a:rPr lang="en-US" dirty="0"/>
-                        <a:t>1</a:t>
-                      </a:r>
-                    </a:p>
-                  </a:txBody>
-                  <a:tcPr/>
-                </a:tc>
-                <a:extLst>
-                  <a:ext uri="{0D108BD9-81ED-4DB2-BD59-A6C34878D82A}">
-                    <a16:rowId xmlns:a16="http://schemas.microsoft.com/office/drawing/2014/main" val="1096633820"/>
-                  </a:ext>
-                </a:extLst>
-              </a:tr>
-              <a:tr h="550069">
-                <a:tc>
-                  <a:txBody>
-                    <a:bodyPr/>
-                    <a:lstStyle/>
-                    <a:p>
-                      <a:r>
-                        <a:rPr lang="en-US" dirty="0"/>
-                        <a:t>2</a:t>
-                      </a:r>
-                    </a:p>
-                  </a:txBody>
-                  <a:tcPr/>
-                </a:tc>
-                <a:tc>
-                  <a:txBody>
-                    <a:bodyPr/>
-                    <a:lstStyle/>
-                    <a:p>
-                      <a:r>
-                        <a:rPr lang="en-US" dirty="0"/>
-                        <a:t>mark@example.com</a:t>
-                      </a:r>
-                    </a:p>
-                  </a:txBody>
-                  <a:tcPr/>
-                </a:tc>
-                <a:tc>
-                  <a:txBody>
-                    <a:bodyPr/>
-                    <a:lstStyle/>
-                    <a:p>
-                      <a:r>
-                        <a:rPr lang="en-US" dirty="0"/>
-                        <a:t>3</a:t>
-                      </a:r>
-                    </a:p>
-                  </a:txBody>
-                  <a:tcPr/>
-                </a:tc>
-                <a:extLst>
-                  <a:ext uri="{0D108BD9-81ED-4DB2-BD59-A6C34878D82A}">
-                    <a16:rowId xmlns:a16="http://schemas.microsoft.com/office/drawing/2014/main" val="2502785895"/>
-                  </a:ext>
-                </a:extLst>
-              </a:tr>
-              <a:tr h="550069">
-                <a:tc>
-                  <a:txBody>
-                    <a:bodyPr/>
-                    <a:lstStyle/>
-                    <a:p>
-                      <a:r>
-                        <a:rPr lang="en-US" dirty="0"/>
-                        <a:t>3</a:t>
-                      </a:r>
-                    </a:p>
-                  </a:txBody>
-                  <a:tcPr/>
-                </a:tc>
-                <a:tc>
-                  <a:txBody>
-                    <a:bodyPr/>
-                    <a:lstStyle/>
-                    <a:p>
-                      <a:r>
-                        <a:rPr lang="en-US" dirty="0"/>
-                        <a:t>joan@example.com</a:t>
-                      </a:r>
-                    </a:p>
-                  </a:txBody>
-                  <a:tcPr/>
-                </a:tc>
-                <a:tc>
-                  <a:txBody>
-                    <a:bodyPr/>
-                    <a:lstStyle/>
-                    <a:p>
-                      <a:r>
-                        <a:rPr lang="en-US" dirty="0"/>
-                        <a:t>5</a:t>
-                      </a:r>
-                    </a:p>
-                  </a:txBody>
-                  <a:tcPr/>
-                </a:tc>
-                <a:extLst>
-                  <a:ext uri="{0D108BD9-81ED-4DB2-BD59-A6C34878D82A}">
-                    <a16:rowId xmlns:a16="http://schemas.microsoft.com/office/drawing/2014/main" val="3585364205"/>
-                  </a:ext>
-                </a:extLst>
-              </a:tr>
-              <a:tr h="550069">
-                <a:tc>
-                  <a:txBody>
-                    <a:bodyPr/>
-                    <a:lstStyle/>
-                    <a:p>
-                      <a:r>
-                        <a:rPr lang="en-US" dirty="0"/>
-                        <a:t>4</a:t>
-                      </a:r>
-                    </a:p>
-                  </a:txBody>
-                  <a:tcPr/>
-                </a:tc>
-                <a:tc>
-                  <a:txBody>
-                    <a:bodyPr/>
-                    <a:lstStyle/>
-                    <a:p>
-                      <a:r>
-                        <a:rPr lang="en-US" dirty="0"/>
-                        <a:t>john@example.com</a:t>
-                      </a:r>
-                    </a:p>
-                  </a:txBody>
-                  <a:tcPr/>
-                </a:tc>
-                <a:tc>
-                  <a:txBody>
-                    <a:bodyPr/>
-                    <a:lstStyle/>
-                    <a:p>
-                      <a:r>
-                        <a:rPr lang="en-US" dirty="0"/>
-                        <a:t>6</a:t>
-                      </a:r>
-                    </a:p>
-                  </a:txBody>
-                  <a:tcPr/>
-                </a:tc>
-                <a:extLst>
-                  <a:ext uri="{0D108BD9-81ED-4DB2-BD59-A6C34878D82A}">
-                    <a16:rowId xmlns:a16="http://schemas.microsoft.com/office/drawing/2014/main" val="1151712161"/>
-                  </a:ext>
-                </a:extLst>
-              </a:tr>
-              <a:tr h="550069">
-                <a:tc>
-                  <a:txBody>
-                    <a:bodyPr/>
-                    <a:lstStyle/>
-                    <a:p>
-                      <a:r>
-                        <a:rPr lang="en-US" dirty="0"/>
-                        <a:t>5</a:t>
-                      </a:r>
-                    </a:p>
-                  </a:txBody>
-                  <a:tcPr/>
-                </a:tc>
-                <a:tc>
-                  <a:txBody>
-                    <a:bodyPr/>
-                    <a:lstStyle/>
-                    <a:p>
-                      <a:r>
-                        <a:rPr lang="en-US" dirty="0"/>
-                        <a:t>sam@example.com</a:t>
-                      </a:r>
-                    </a:p>
-                  </a:txBody>
-                  <a:tcPr/>
-                </a:tc>
-                <a:tc>
-                  <a:txBody>
-                    <a:bodyPr/>
-                    <a:lstStyle/>
-                    <a:p>
-                      <a:r>
-                        <a:rPr lang="en-US" dirty="0"/>
-                        <a:t>7</a:t>
-                      </a:r>
-                    </a:p>
-                  </a:txBody>
-                  <a:tcPr/>
-                </a:tc>
-                <a:extLst>
-                  <a:ext uri="{0D108BD9-81ED-4DB2-BD59-A6C34878D82A}">
-                    <a16:rowId xmlns:a16="http://schemas.microsoft.com/office/drawing/2014/main" val="1895924153"/>
-                  </a:ext>
-                </a:extLst>
-              </a:tr>
-            </a:tbl>
-          </a:graphicData>
-        </a:graphic>
-      </p:graphicFrame>
-      <p:sp>
-        <p:nvSpPr>
-          <p:cNvPr id="12" name="TextBox 11">
-            <a:extLst>
-              <a:ext uri="{FF2B5EF4-FFF2-40B4-BE49-F238E27FC236}">
-                <a16:creationId xmlns:a16="http://schemas.microsoft.com/office/drawing/2014/main" id="{FC6DC9A1-82C1-994A-813A-5A2658AACA26}"/>
-              </a:ext>
-            </a:extLst>
-          </p:cNvPr>
-          <p:cNvSpPr txBox="1"/>
-          <p:nvPr/>
-        </p:nvSpPr>
-        <p:spPr>
-          <a:xfrm>
-            <a:off x="1945932" y="257175"/>
-            <a:ext cx="1500347" cy="584775"/>
-          </a:xfrm>
-          <a:prstGeom prst="rect">
-            <a:avLst/>
-          </a:prstGeom>
-          <a:noFill/>
-        </p:spPr>
-        <p:txBody>
-          <a:bodyPr wrap="none" rtlCol="0">
-            <a:spAutoFit/>
-          </a:bodyPr>
-          <a:lstStyle/>
-          <a:p>
-            <a:r>
-              <a:rPr lang="en-US" sz="3200" b="1" dirty="0"/>
-              <a:t>farmers</a:t>
-            </a:r>
-          </a:p>
-        </p:txBody>
-      </p:sp>
-      <p:sp>
-        <p:nvSpPr>
-          <p:cNvPr id="13" name="TextBox 12">
-            <a:extLst>
-              <a:ext uri="{FF2B5EF4-FFF2-40B4-BE49-F238E27FC236}">
-                <a16:creationId xmlns:a16="http://schemas.microsoft.com/office/drawing/2014/main" id="{28DCB725-B7B2-3445-A932-CECF62483DE8}"/>
-              </a:ext>
-            </a:extLst>
-          </p:cNvPr>
-          <p:cNvSpPr txBox="1"/>
-          <p:nvPr/>
-        </p:nvSpPr>
-        <p:spPr>
-          <a:xfrm>
-            <a:off x="6959923" y="257175"/>
-            <a:ext cx="2625078" cy="584775"/>
-          </a:xfrm>
-          <a:prstGeom prst="rect">
-            <a:avLst/>
-          </a:prstGeom>
-          <a:noFill/>
-        </p:spPr>
-        <p:txBody>
-          <a:bodyPr wrap="none" rtlCol="0">
-            <a:spAutoFit/>
-          </a:bodyPr>
-          <a:lstStyle/>
-          <a:p>
-            <a:r>
-              <a:rPr lang="en-US" sz="3200" b="1" dirty="0"/>
-              <a:t>web_accounts</a:t>
-            </a:r>
-          </a:p>
-        </p:txBody>
-      </p:sp>
-    </p:spTree>
-    <p:extLst>
-      <p:ext uri="{BB962C8B-B14F-4D97-AF65-F5344CB8AC3E}">
-        <p14:creationId xmlns:p14="http://schemas.microsoft.com/office/powerpoint/2010/main" val="3679400459"/>
-      </p:ext>
-    </p:extLst>
-  </p:cSld>
-  <p:clrMapOvr>
-    <a:masterClrMapping/>
-  </p:clrMapOvr>
-</p:sld>
-</file>
-
-<file path=ppt/slides/slide4.xml><?xml version="1.0" encoding="utf-8"?>
 <p:sld xmlns:a="http://schemas.openxmlformats.org/drawingml/2006/main" xmlns:r="http://schemas.openxmlformats.org/officeDocument/2006/relationships" xmlns:p="http://schemas.openxmlformats.org/presentationml/2006/main">
   <p:cSld>
     <p:spTree>

</xml_diff>